<commit_message>
Report and Presentation v1.1
</commit_message>
<xml_diff>
--- a/CSCI441 Project Presentation.pptx
+++ b/CSCI441 Project Presentation.pptx
@@ -5,7 +5,7 @@
     <p:sldMasterId id="2147483648" r:id="rId4"/>
   </p:sldMasterIdLst>
   <p:notesMasterIdLst>
-    <p:notesMasterId r:id="rId23"/>
+    <p:notesMasterId r:id="rId24"/>
   </p:notesMasterIdLst>
   <p:sldIdLst>
     <p:sldId id="530" r:id="rId5"/>
@@ -18,14 +18,15 @@
     <p:sldId id="534" r:id="rId12"/>
     <p:sldId id="546" r:id="rId13"/>
     <p:sldId id="536" r:id="rId14"/>
-    <p:sldId id="537" r:id="rId15"/>
-    <p:sldId id="545" r:id="rId16"/>
-    <p:sldId id="538" r:id="rId17"/>
-    <p:sldId id="539" r:id="rId18"/>
-    <p:sldId id="540" r:id="rId19"/>
-    <p:sldId id="541" r:id="rId20"/>
-    <p:sldId id="543" r:id="rId21"/>
-    <p:sldId id="544" r:id="rId22"/>
+    <p:sldId id="545" r:id="rId15"/>
+    <p:sldId id="550" r:id="rId16"/>
+    <p:sldId id="537" r:id="rId17"/>
+    <p:sldId id="538" r:id="rId18"/>
+    <p:sldId id="539" r:id="rId19"/>
+    <p:sldId id="540" r:id="rId20"/>
+    <p:sldId id="541" r:id="rId21"/>
+    <p:sldId id="543" r:id="rId22"/>
+    <p:sldId id="544" r:id="rId23"/>
   </p:sldIdLst>
   <p:sldSz cx="12192000" cy="6858000"/>
   <p:notesSz cx="6858000" cy="9144000"/>
@@ -226,7 +227,7 @@
           <a:p>
             <a:fld id="{3F00BCFC-AFFD-334C-A183-6116BAFDF92B}" type="datetimeFigureOut">
               <a:rPr lang="en-US" smtClean="0"/>
-              <a:t>1/4/2026</a:t>
+              <a:t>1/5/2026</a:t>
             </a:fld>
             <a:endParaRPr lang="en-US" dirty="0"/>
           </a:p>
@@ -13871,7 +13872,7 @@
         </p:nvCxnSpPr>
         <p:spPr>
           <a:xfrm>
-            <a:off x="1944007" y="3324115"/>
+            <a:off x="2654521" y="3342305"/>
             <a:ext cx="2170451" cy="0"/>
           </a:xfrm>
           <a:prstGeom prst="line">
@@ -13915,7 +13916,7 @@
         </p:nvCxnSpPr>
         <p:spPr>
           <a:xfrm>
-            <a:off x="4114458" y="3322646"/>
+            <a:off x="4824972" y="3340836"/>
             <a:ext cx="2171700" cy="0"/>
           </a:xfrm>
           <a:prstGeom prst="line">
@@ -13959,7 +13960,7 @@
         </p:nvCxnSpPr>
         <p:spPr>
           <a:xfrm>
-            <a:off x="6286158" y="3322646"/>
+            <a:off x="6996672" y="3340836"/>
             <a:ext cx="2161515" cy="14408"/>
           </a:xfrm>
           <a:prstGeom prst="line">
@@ -14003,7 +14004,7 @@
         </p:nvCxnSpPr>
         <p:spPr>
           <a:xfrm>
-            <a:off x="8447673" y="3333307"/>
+            <a:off x="9158187" y="3351497"/>
             <a:ext cx="2189197" cy="0"/>
           </a:xfrm>
           <a:prstGeom prst="line">
@@ -14045,7 +14046,7 @@
         </p:nvSpPr>
         <p:spPr>
           <a:xfrm>
-            <a:off x="1349145" y="2715964"/>
+            <a:off x="2059659" y="2734154"/>
             <a:ext cx="1218817" cy="1218817"/>
           </a:xfrm>
           <a:prstGeom prst="ellipse">
@@ -14097,7 +14098,7 @@
         </p:nvSpPr>
         <p:spPr>
           <a:xfrm>
-            <a:off x="3525168" y="2721004"/>
+            <a:off x="4235682" y="2739194"/>
             <a:ext cx="1218817" cy="1218817"/>
           </a:xfrm>
           <a:prstGeom prst="ellipse">
@@ -14149,7 +14150,7 @@
         </p:nvSpPr>
         <p:spPr>
           <a:xfrm>
-            <a:off x="5704017" y="2716977"/>
+            <a:off x="6414531" y="2735167"/>
             <a:ext cx="1218817" cy="1218817"/>
           </a:xfrm>
           <a:prstGeom prst="ellipse">
@@ -14201,7 +14202,7 @@
         </p:nvSpPr>
         <p:spPr>
           <a:xfrm>
-            <a:off x="7847695" y="2726015"/>
+            <a:off x="8558209" y="2744205"/>
             <a:ext cx="1218817" cy="1218817"/>
           </a:xfrm>
           <a:prstGeom prst="ellipse">
@@ -14253,7 +14254,7 @@
         </p:nvSpPr>
         <p:spPr>
           <a:xfrm>
-            <a:off x="10049319" y="2718520"/>
+            <a:off x="10759833" y="2736710"/>
             <a:ext cx="1218817" cy="1218817"/>
           </a:xfrm>
           <a:prstGeom prst="ellipse">
@@ -14305,7 +14306,7 @@
         </p:nvSpPr>
         <p:spPr>
           <a:xfrm flipH="1">
-            <a:off x="1418423" y="2786515"/>
+            <a:off x="2128937" y="2804705"/>
             <a:ext cx="1071564" cy="1071564"/>
           </a:xfrm>
           <a:prstGeom prst="ellipse">
@@ -14357,7 +14358,7 @@
         </p:nvSpPr>
         <p:spPr>
           <a:xfrm flipH="1">
-            <a:off x="3593035" y="2791555"/>
+            <a:off x="4303549" y="2809745"/>
             <a:ext cx="1071564" cy="1071564"/>
           </a:xfrm>
           <a:prstGeom prst="ellipse">
@@ -14409,7 +14410,7 @@
         </p:nvSpPr>
         <p:spPr>
           <a:xfrm flipH="1">
-            <a:off x="5771884" y="2787528"/>
+            <a:off x="6482398" y="2805718"/>
             <a:ext cx="1071564" cy="1071564"/>
           </a:xfrm>
           <a:prstGeom prst="ellipse">
@@ -14461,7 +14462,7 @@
         </p:nvSpPr>
         <p:spPr>
           <a:xfrm flipH="1">
-            <a:off x="7915562" y="2796566"/>
+            <a:off x="8626076" y="2814756"/>
             <a:ext cx="1071564" cy="1071564"/>
           </a:xfrm>
           <a:prstGeom prst="ellipse">
@@ -14513,7 +14514,7 @@
         </p:nvSpPr>
         <p:spPr>
           <a:xfrm flipH="1">
-            <a:off x="10129886" y="2789071"/>
+            <a:off x="10840400" y="2807261"/>
             <a:ext cx="1071564" cy="1071564"/>
           </a:xfrm>
           <a:prstGeom prst="ellipse">
@@ -14569,7 +14570,7 @@
         </p:nvSpPr>
         <p:spPr>
           <a:xfrm>
-            <a:off x="1380744" y="4114800"/>
+            <a:off x="2091258" y="4132990"/>
             <a:ext cx="1362456" cy="466344"/>
           </a:xfrm>
         </p:spPr>
@@ -14616,7 +14617,7 @@
         </p:nvSpPr>
         <p:spPr>
           <a:xfrm>
-            <a:off x="1380744" y="4599432"/>
+            <a:off x="2091258" y="4617622"/>
             <a:ext cx="1362456" cy="740664"/>
           </a:xfrm>
         </p:spPr>
@@ -14661,7 +14662,7 @@
         </p:nvSpPr>
         <p:spPr>
           <a:xfrm>
-            <a:off x="3538728" y="4114800"/>
+            <a:off x="4249242" y="4132990"/>
             <a:ext cx="1362456" cy="466344"/>
           </a:xfrm>
         </p:spPr>
@@ -14708,7 +14709,7 @@
         </p:nvSpPr>
         <p:spPr>
           <a:xfrm>
-            <a:off x="3538728" y="4599432"/>
+            <a:off x="4249242" y="4617622"/>
             <a:ext cx="1362456" cy="740664"/>
           </a:xfrm>
         </p:spPr>
@@ -14753,7 +14754,7 @@
         </p:nvSpPr>
         <p:spPr>
           <a:xfrm>
-            <a:off x="5724144" y="4114800"/>
+            <a:off x="6434658" y="4132990"/>
             <a:ext cx="1362456" cy="466344"/>
           </a:xfrm>
         </p:spPr>
@@ -14800,7 +14801,7 @@
         </p:nvSpPr>
         <p:spPr>
           <a:xfrm>
-            <a:off x="5724144" y="4599432"/>
+            <a:off x="6434658" y="4617622"/>
             <a:ext cx="1362456" cy="740664"/>
           </a:xfrm>
         </p:spPr>
@@ -14845,7 +14846,7 @@
         </p:nvSpPr>
         <p:spPr>
           <a:xfrm>
-            <a:off x="7872984" y="4114800"/>
+            <a:off x="8583498" y="4132990"/>
             <a:ext cx="1362456" cy="466344"/>
           </a:xfrm>
         </p:spPr>
@@ -14892,7 +14893,7 @@
         </p:nvSpPr>
         <p:spPr>
           <a:xfrm>
-            <a:off x="7872984" y="4599432"/>
+            <a:off x="8583498" y="4617622"/>
             <a:ext cx="1362456" cy="740664"/>
           </a:xfrm>
         </p:spPr>
@@ -15029,7 +15030,7 @@
         </p:nvSpPr>
         <p:spPr>
           <a:xfrm>
-            <a:off x="1648147" y="3018954"/>
+            <a:off x="2358661" y="3037144"/>
             <a:ext cx="621792" cy="621792"/>
           </a:xfrm>
         </p:spPr>
@@ -15072,7 +15073,7 @@
         </p:nvSpPr>
         <p:spPr>
           <a:xfrm>
-            <a:off x="3805117" y="3011109"/>
+            <a:off x="4515631" y="3029299"/>
             <a:ext cx="621792" cy="621792"/>
           </a:xfrm>
         </p:spPr>
@@ -15115,7 +15116,7 @@
         </p:nvSpPr>
         <p:spPr>
           <a:xfrm>
-            <a:off x="5995989" y="3026158"/>
+            <a:off x="6706503" y="3044348"/>
             <a:ext cx="621792" cy="621792"/>
           </a:xfrm>
         </p:spPr>
@@ -15158,7 +15159,7 @@
         </p:nvSpPr>
         <p:spPr>
           <a:xfrm>
-            <a:off x="8146207" y="3011109"/>
+            <a:off x="8856721" y="3029299"/>
             <a:ext cx="621792" cy="621792"/>
           </a:xfrm>
         </p:spPr>
@@ -15201,7 +15202,7 @@
         </p:nvSpPr>
         <p:spPr>
           <a:xfrm>
-            <a:off x="10347831" y="3017032"/>
+            <a:off x="11058345" y="3035222"/>
             <a:ext cx="621792" cy="621792"/>
           </a:xfrm>
         </p:spPr>
@@ -15244,7 +15245,7 @@
         </p:nvSpPr>
         <p:spPr>
           <a:xfrm>
-            <a:off x="2350008" y="4279392"/>
+            <a:off x="3060522" y="4297582"/>
             <a:ext cx="146304" cy="146304"/>
           </a:xfrm>
           <a:prstGeom prst="ellipse">
@@ -15299,7 +15300,7 @@
         </p:nvSpPr>
         <p:spPr>
           <a:xfrm>
-            <a:off x="4517136" y="4279392"/>
+            <a:off x="5227650" y="4297582"/>
             <a:ext cx="146304" cy="146304"/>
           </a:xfrm>
           <a:prstGeom prst="ellipse">
@@ -15354,7 +15355,7 @@
         </p:nvSpPr>
         <p:spPr>
           <a:xfrm>
-            <a:off x="6702552" y="4279392"/>
+            <a:off x="7413066" y="4297582"/>
             <a:ext cx="146304" cy="146304"/>
           </a:xfrm>
           <a:prstGeom prst="ellipse">
@@ -15409,7 +15410,7 @@
         </p:nvSpPr>
         <p:spPr>
           <a:xfrm>
-            <a:off x="8842248" y="4279392"/>
+            <a:off x="9552762" y="4297582"/>
             <a:ext cx="146304" cy="146304"/>
           </a:xfrm>
           <a:prstGeom prst="ellipse">
@@ -15464,7 +15465,7 @@
         </p:nvSpPr>
         <p:spPr>
           <a:xfrm>
-            <a:off x="11055096" y="4279392"/>
+            <a:off x="11765610" y="4297582"/>
             <a:ext cx="146304" cy="146304"/>
           </a:xfrm>
           <a:prstGeom prst="ellipse">
@@ -19103,6 +19104,908 @@
           <a:chExt cx="0" cy="0"/>
         </a:xfrm>
       </p:grpSpPr>
+      <p:sp>
+        <p:nvSpPr>
+          <p:cNvPr id="31" name="Rectangle 30">
+            <a:extLst>
+              <a:ext uri="{FF2B5EF4-FFF2-40B4-BE49-F238E27FC236}">
+                <a16:creationId xmlns:a16="http://schemas.microsoft.com/office/drawing/2014/main" id="{CC7F8962-79E5-C132-8DCE-ED09CDE257E0}"/>
+              </a:ext>
+            </a:extLst>
+          </p:cNvPr>
+          <p:cNvSpPr/>
+          <p:nvPr/>
+        </p:nvSpPr>
+        <p:spPr>
+          <a:xfrm>
+            <a:off x="9786731" y="1499714"/>
+            <a:ext cx="2067340" cy="4519570"/>
+          </a:xfrm>
+          <a:prstGeom prst="rect">
+            <a:avLst/>
+          </a:prstGeom>
+          <a:solidFill>
+            <a:srgbClr val="102857"/>
+          </a:solidFill>
+          <a:ln>
+            <a:solidFill>
+              <a:srgbClr val="102857"/>
+            </a:solidFill>
+          </a:ln>
+        </p:spPr>
+        <p:style>
+          <a:lnRef idx="2">
+            <a:schemeClr val="accent1">
+              <a:shade val="15000"/>
+            </a:schemeClr>
+          </a:lnRef>
+          <a:fillRef idx="1">
+            <a:schemeClr val="accent1"/>
+          </a:fillRef>
+          <a:effectRef idx="0">
+            <a:schemeClr val="accent1"/>
+          </a:effectRef>
+          <a:fontRef idx="minor">
+            <a:schemeClr val="lt1"/>
+          </a:fontRef>
+        </p:style>
+        <p:txBody>
+          <a:bodyPr rtlCol="0" anchor="ctr"/>
+          <a:lstStyle/>
+          <a:p>
+            <a:pPr algn="ctr"/>
+            <a:endParaRPr lang="en-US"/>
+          </a:p>
+        </p:txBody>
+      </p:sp>
+      <p:sp>
+        <p:nvSpPr>
+          <p:cNvPr id="139" name="Slide Number Placeholder 138">
+            <a:extLst>
+              <a:ext uri="{FF2B5EF4-FFF2-40B4-BE49-F238E27FC236}">
+                <a16:creationId xmlns:a16="http://schemas.microsoft.com/office/drawing/2014/main" id="{0C6CCCC3-BCC9-AE9B-C2AE-4D9986B5F8AE}"/>
+              </a:ext>
+            </a:extLst>
+          </p:cNvPr>
+          <p:cNvSpPr>
+            <a:spLocks noGrp="1"/>
+          </p:cNvSpPr>
+          <p:nvPr>
+            <p:ph type="sldNum" sz="quarter" idx="11"/>
+          </p:nvPr>
+        </p:nvSpPr>
+        <p:spPr/>
+        <p:txBody>
+          <a:bodyPr/>
+          <a:lstStyle/>
+          <a:p>
+            <a:fld id="{294A09A9-5501-47C1-A89A-A340965A2BE2}" type="slidenum">
+              <a:rPr lang="en-US" smtClean="0"/>
+              <a:pPr/>
+              <a:t>11</a:t>
+            </a:fld>
+            <a:endParaRPr lang="en-US" dirty="0"/>
+          </a:p>
+        </p:txBody>
+      </p:sp>
+      <p:pic>
+        <p:nvPicPr>
+          <p:cNvPr id="90" name="Picture Placeholder 89" descr="Exponential Graph outline">
+            <a:extLst>
+              <a:ext uri="{FF2B5EF4-FFF2-40B4-BE49-F238E27FC236}">
+                <a16:creationId xmlns:a16="http://schemas.microsoft.com/office/drawing/2014/main" id="{86472D92-CAA9-AF6F-549B-2EE170C70DD7}"/>
+              </a:ext>
+            </a:extLst>
+          </p:cNvPr>
+          <p:cNvPicPr>
+            <a:picLocks noGrp="1" noChangeAspect="1"/>
+          </p:cNvPicPr>
+          <p:nvPr>
+            <p:ph type="pic" sz="quarter" idx="26"/>
+          </p:nvPr>
+        </p:nvPicPr>
+        <p:blipFill rotWithShape="1">
+          <a:blip r:embed="rId2"/>
+          <a:srcRect/>
+          <a:stretch/>
+        </p:blipFill>
+        <p:spPr>
+          <a:xfrm>
+            <a:off x="10330245" y="3018954"/>
+            <a:ext cx="621792" cy="621792"/>
+          </a:xfrm>
+        </p:spPr>
+      </p:pic>
+      <p:sp>
+        <p:nvSpPr>
+          <p:cNvPr id="3" name="Text Placeholder 2">
+            <a:extLst>
+              <a:ext uri="{FF2B5EF4-FFF2-40B4-BE49-F238E27FC236}">
+                <a16:creationId xmlns:a16="http://schemas.microsoft.com/office/drawing/2014/main" id="{0CF4EECB-47E7-26A0-F3A1-ACAE7AEE5741}"/>
+              </a:ext>
+            </a:extLst>
+          </p:cNvPr>
+          <p:cNvSpPr>
+            <a:spLocks noGrp="1"/>
+          </p:cNvSpPr>
+          <p:nvPr>
+            <p:ph type="body" sz="quarter" idx="12"/>
+          </p:nvPr>
+        </p:nvSpPr>
+        <p:spPr>
+          <a:xfrm>
+            <a:off x="1863502" y="4097606"/>
+            <a:ext cx="1704797" cy="466344"/>
+          </a:xfrm>
+        </p:spPr>
+        <p:txBody>
+          <a:bodyPr/>
+          <a:lstStyle/>
+          <a:p>
+            <a:r>
+              <a:rPr lang="en-US" sz="2000" dirty="0"/>
+              <a:t>Decision Tree</a:t>
+            </a:r>
+          </a:p>
+        </p:txBody>
+      </p:sp>
+      <p:sp>
+        <p:nvSpPr>
+          <p:cNvPr id="5" name="Text Placeholder 4">
+            <a:extLst>
+              <a:ext uri="{FF2B5EF4-FFF2-40B4-BE49-F238E27FC236}">
+                <a16:creationId xmlns:a16="http://schemas.microsoft.com/office/drawing/2014/main" id="{AC2F0535-53EA-30FB-770D-0C92BEEF3F6D}"/>
+              </a:ext>
+            </a:extLst>
+          </p:cNvPr>
+          <p:cNvSpPr>
+            <a:spLocks noGrp="1"/>
+          </p:cNvSpPr>
+          <p:nvPr>
+            <p:ph type="body" sz="quarter" idx="14"/>
+          </p:nvPr>
+        </p:nvSpPr>
+        <p:spPr>
+          <a:xfrm>
+            <a:off x="3989566" y="4114206"/>
+            <a:ext cx="1881808" cy="466344"/>
+          </a:xfrm>
+        </p:spPr>
+        <p:txBody>
+          <a:bodyPr/>
+          <a:lstStyle/>
+          <a:p>
+            <a:pPr lvl="0"/>
+            <a:r>
+              <a:rPr lang="en-US" sz="2000" dirty="0"/>
+              <a:t>Random Forest</a:t>
+            </a:r>
+          </a:p>
+        </p:txBody>
+      </p:sp>
+      <p:sp>
+        <p:nvSpPr>
+          <p:cNvPr id="7" name="Text Placeholder 6">
+            <a:extLst>
+              <a:ext uri="{FF2B5EF4-FFF2-40B4-BE49-F238E27FC236}">
+                <a16:creationId xmlns:a16="http://schemas.microsoft.com/office/drawing/2014/main" id="{31511481-29C6-275B-963E-B5AF2E87ADA2}"/>
+              </a:ext>
+            </a:extLst>
+          </p:cNvPr>
+          <p:cNvSpPr>
+            <a:spLocks noGrp="1"/>
+          </p:cNvSpPr>
+          <p:nvPr>
+            <p:ph type="body" sz="quarter" idx="16"/>
+          </p:nvPr>
+        </p:nvSpPr>
+        <p:spPr>
+          <a:xfrm>
+            <a:off x="6662455" y="4090949"/>
+            <a:ext cx="947529" cy="466344"/>
+          </a:xfrm>
+        </p:spPr>
+        <p:txBody>
+          <a:bodyPr/>
+          <a:lstStyle/>
+          <a:p>
+            <a:pPr lvl="0"/>
+            <a:r>
+              <a:rPr lang="en-US" sz="2000" dirty="0"/>
+              <a:t>KNN</a:t>
+            </a:r>
+          </a:p>
+        </p:txBody>
+      </p:sp>
+      <p:sp>
+        <p:nvSpPr>
+          <p:cNvPr id="9" name="Text Placeholder 8">
+            <a:extLst>
+              <a:ext uri="{FF2B5EF4-FFF2-40B4-BE49-F238E27FC236}">
+                <a16:creationId xmlns:a16="http://schemas.microsoft.com/office/drawing/2014/main" id="{2F32973A-CF94-1C2B-BB12-B563173CC79A}"/>
+              </a:ext>
+            </a:extLst>
+          </p:cNvPr>
+          <p:cNvSpPr>
+            <a:spLocks noGrp="1"/>
+          </p:cNvSpPr>
+          <p:nvPr>
+            <p:ph type="body" sz="quarter" idx="18"/>
+          </p:nvPr>
+        </p:nvSpPr>
+        <p:spPr>
+          <a:xfrm>
+            <a:off x="8839202" y="4090949"/>
+            <a:ext cx="1362456" cy="466344"/>
+          </a:xfrm>
+        </p:spPr>
+        <p:txBody>
+          <a:bodyPr/>
+          <a:lstStyle/>
+          <a:p>
+            <a:pPr lvl="0"/>
+            <a:r>
+              <a:rPr lang="en-US" sz="2000" dirty="0"/>
+              <a:t>SVM</a:t>
+            </a:r>
+          </a:p>
+        </p:txBody>
+      </p:sp>
+      <p:sp>
+        <p:nvSpPr>
+          <p:cNvPr id="69" name="Text Placeholder 68">
+            <a:extLst>
+              <a:ext uri="{FF2B5EF4-FFF2-40B4-BE49-F238E27FC236}">
+                <a16:creationId xmlns:a16="http://schemas.microsoft.com/office/drawing/2014/main" id="{4BBDF45D-9B32-0154-7602-2C43DAF6C0A6}"/>
+              </a:ext>
+            </a:extLst>
+          </p:cNvPr>
+          <p:cNvSpPr>
+            <a:spLocks noGrp="1"/>
+          </p:cNvSpPr>
+          <p:nvPr>
+            <p:ph type="body" sz="quarter" idx="13"/>
+          </p:nvPr>
+        </p:nvSpPr>
+        <p:spPr>
+          <a:xfrm>
+            <a:off x="1901972" y="4617622"/>
+            <a:ext cx="1593109" cy="740664"/>
+          </a:xfrm>
+        </p:spPr>
+        <p:txBody>
+          <a:bodyPr/>
+          <a:lstStyle/>
+          <a:p>
+            <a:r>
+              <a:rPr lang="en-US" dirty="0"/>
+              <a:t>A single Decision Tree is not suitable for this dataset.</a:t>
+            </a:r>
+          </a:p>
+        </p:txBody>
+      </p:sp>
+      <p:sp>
+        <p:nvSpPr>
+          <p:cNvPr id="70" name="Text Placeholder 69">
+            <a:extLst>
+              <a:ext uri="{FF2B5EF4-FFF2-40B4-BE49-F238E27FC236}">
+                <a16:creationId xmlns:a16="http://schemas.microsoft.com/office/drawing/2014/main" id="{38FF6C9F-C7C5-37D5-4C61-BA14A636B732}"/>
+              </a:ext>
+            </a:extLst>
+          </p:cNvPr>
+          <p:cNvSpPr>
+            <a:spLocks noGrp="1"/>
+          </p:cNvSpPr>
+          <p:nvPr>
+            <p:ph type="body" sz="quarter" idx="15"/>
+          </p:nvPr>
+        </p:nvSpPr>
+        <p:spPr>
+          <a:xfrm>
+            <a:off x="3946496" y="4617622"/>
+            <a:ext cx="1967947" cy="1219961"/>
+          </a:xfrm>
+        </p:spPr>
+        <p:txBody>
+          <a:bodyPr/>
+          <a:lstStyle/>
+          <a:p>
+            <a:r>
+              <a:rPr lang="en-US" dirty="0"/>
+              <a:t>Despite being stronger than single trees, Random Forests were still unreliable for this task."</a:t>
+            </a:r>
+          </a:p>
+          <a:p>
+            <a:endParaRPr lang="en-US" dirty="0"/>
+          </a:p>
+        </p:txBody>
+      </p:sp>
+      <p:sp>
+        <p:nvSpPr>
+          <p:cNvPr id="71" name="Text Placeholder 70">
+            <a:extLst>
+              <a:ext uri="{FF2B5EF4-FFF2-40B4-BE49-F238E27FC236}">
+                <a16:creationId xmlns:a16="http://schemas.microsoft.com/office/drawing/2014/main" id="{5973BD56-1612-983E-EA67-F4039B062085}"/>
+              </a:ext>
+            </a:extLst>
+          </p:cNvPr>
+          <p:cNvSpPr>
+            <a:spLocks noGrp="1"/>
+          </p:cNvSpPr>
+          <p:nvPr>
+            <p:ph type="body" sz="quarter" idx="17"/>
+          </p:nvPr>
+        </p:nvSpPr>
+        <p:spPr>
+          <a:xfrm>
+            <a:off x="6277559" y="4617621"/>
+            <a:ext cx="1813631" cy="1531387"/>
+          </a:xfrm>
+        </p:spPr>
+        <p:txBody>
+          <a:bodyPr/>
+          <a:lstStyle/>
+          <a:p>
+            <a:r>
+              <a:rPr lang="en-US" dirty="0"/>
+              <a:t>KNN consistently traded balance for accuracy and failed to generalize. It is not suitable for this dataset.</a:t>
+            </a:r>
+          </a:p>
+        </p:txBody>
+      </p:sp>
+      <p:sp>
+        <p:nvSpPr>
+          <p:cNvPr id="72" name="Text Placeholder 71">
+            <a:extLst>
+              <a:ext uri="{FF2B5EF4-FFF2-40B4-BE49-F238E27FC236}">
+                <a16:creationId xmlns:a16="http://schemas.microsoft.com/office/drawing/2014/main" id="{840CFADA-CAD6-2A04-5B15-5DB4DD6A84E0}"/>
+              </a:ext>
+            </a:extLst>
+          </p:cNvPr>
+          <p:cNvSpPr>
+            <a:spLocks noGrp="1"/>
+          </p:cNvSpPr>
+          <p:nvPr>
+            <p:ph type="body" sz="quarter" idx="19"/>
+          </p:nvPr>
+        </p:nvSpPr>
+        <p:spPr>
+          <a:xfrm>
+            <a:off x="8399408" y="4617621"/>
+            <a:ext cx="1997720" cy="1279595"/>
+          </a:xfrm>
+        </p:spPr>
+        <p:txBody>
+          <a:bodyPr/>
+          <a:lstStyle/>
+          <a:p>
+            <a:r>
+              <a:rPr lang="en-US" dirty="0"/>
+              <a:t>The Balanced RBF SVM was the best-performing supervised model, though still not fully ideal.</a:t>
+            </a:r>
+          </a:p>
+        </p:txBody>
+      </p:sp>
+      <p:pic>
+        <p:nvPicPr>
+          <p:cNvPr id="18" name="Picture Placeholder 17" descr="Fir tree outline">
+            <a:extLst>
+              <a:ext uri="{FF2B5EF4-FFF2-40B4-BE49-F238E27FC236}">
+                <a16:creationId xmlns:a16="http://schemas.microsoft.com/office/drawing/2014/main" id="{3FD4BBC2-977A-BACD-41E6-A647FDC0FD94}"/>
+              </a:ext>
+            </a:extLst>
+          </p:cNvPr>
+          <p:cNvPicPr>
+            <a:picLocks noGrp="1" noChangeAspect="1"/>
+          </p:cNvPicPr>
+          <p:nvPr>
+            <p:ph type="pic" sz="quarter" idx="22"/>
+          </p:nvPr>
+        </p:nvPicPr>
+        <p:blipFill>
+          <a:blip r:embed="rId3">
+            <a:extLst>
+              <a:ext uri="{96DAC541-7B7A-43D3-8B79-37D633B846F1}">
+                <asvg:svgBlip xmlns:asvg="http://schemas.microsoft.com/office/drawing/2016/SVG/main" r:embed="rId4"/>
+              </a:ext>
+            </a:extLst>
+          </a:blip>
+          <a:srcRect t="128" b="128"/>
+          <a:stretch>
+            <a:fillRect/>
+          </a:stretch>
+        </p:blipFill>
+        <p:spPr/>
+      </p:pic>
+      <p:pic>
+        <p:nvPicPr>
+          <p:cNvPr id="22" name="Picture Placeholder 21" descr="Forest scene outline">
+            <a:extLst>
+              <a:ext uri="{FF2B5EF4-FFF2-40B4-BE49-F238E27FC236}">
+                <a16:creationId xmlns:a16="http://schemas.microsoft.com/office/drawing/2014/main" id="{BB73A2C8-6CF1-C603-0AF9-A784F9E8B31B}"/>
+              </a:ext>
+            </a:extLst>
+          </p:cNvPr>
+          <p:cNvPicPr>
+            <a:picLocks noGrp="1" noChangeAspect="1"/>
+          </p:cNvPicPr>
+          <p:nvPr>
+            <p:ph type="pic" sz="quarter" idx="23"/>
+          </p:nvPr>
+        </p:nvPicPr>
+        <p:blipFill>
+          <a:blip r:embed="rId5">
+            <a:extLst>
+              <a:ext uri="{96DAC541-7B7A-43D3-8B79-37D633B846F1}">
+                <asvg:svgBlip xmlns:asvg="http://schemas.microsoft.com/office/drawing/2016/SVG/main" r:embed="rId6"/>
+              </a:ext>
+            </a:extLst>
+          </a:blip>
+          <a:srcRect t="128" b="128"/>
+          <a:stretch>
+            <a:fillRect/>
+          </a:stretch>
+        </p:blipFill>
+        <p:spPr/>
+      </p:pic>
+      <p:pic>
+        <p:nvPicPr>
+          <p:cNvPr id="26" name="Picture Placeholder 25" descr="Neighborhood outline">
+            <a:extLst>
+              <a:ext uri="{FF2B5EF4-FFF2-40B4-BE49-F238E27FC236}">
+                <a16:creationId xmlns:a16="http://schemas.microsoft.com/office/drawing/2014/main" id="{A0088CBE-10FD-1537-4902-497079F63042}"/>
+              </a:ext>
+            </a:extLst>
+          </p:cNvPr>
+          <p:cNvPicPr>
+            <a:picLocks noGrp="1" noChangeAspect="1"/>
+          </p:cNvPicPr>
+          <p:nvPr>
+            <p:ph type="pic" sz="quarter" idx="24"/>
+          </p:nvPr>
+        </p:nvPicPr>
+        <p:blipFill>
+          <a:blip r:embed="rId7">
+            <a:extLst>
+              <a:ext uri="{96DAC541-7B7A-43D3-8B79-37D633B846F1}">
+                <asvg:svgBlip xmlns:asvg="http://schemas.microsoft.com/office/drawing/2016/SVG/main" r:embed="rId8"/>
+              </a:ext>
+            </a:extLst>
+          </a:blip>
+          <a:srcRect/>
+          <a:stretch>
+            <a:fillRect/>
+          </a:stretch>
+        </p:blipFill>
+        <p:spPr/>
+      </p:pic>
+      <p:pic>
+        <p:nvPicPr>
+          <p:cNvPr id="30" name="Picture Placeholder 29" descr="Illustrator outline">
+            <a:extLst>
+              <a:ext uri="{FF2B5EF4-FFF2-40B4-BE49-F238E27FC236}">
+                <a16:creationId xmlns:a16="http://schemas.microsoft.com/office/drawing/2014/main" id="{3F3362C4-8FE0-77D1-20A0-44C0B19C613F}"/>
+              </a:ext>
+            </a:extLst>
+          </p:cNvPr>
+          <p:cNvPicPr>
+            <a:picLocks noGrp="1" noChangeAspect="1"/>
+          </p:cNvPicPr>
+          <p:nvPr>
+            <p:ph type="pic" sz="quarter" idx="25"/>
+          </p:nvPr>
+        </p:nvPicPr>
+        <p:blipFill>
+          <a:blip r:embed="rId9">
+            <a:extLst>
+              <a:ext uri="{96DAC541-7B7A-43D3-8B79-37D633B846F1}">
+                <asvg:svgBlip xmlns:asvg="http://schemas.microsoft.com/office/drawing/2016/SVG/main" r:embed="rId10"/>
+              </a:ext>
+            </a:extLst>
+          </a:blip>
+          <a:srcRect t="128" b="128"/>
+          <a:stretch>
+            <a:fillRect/>
+          </a:stretch>
+        </p:blipFill>
+        <p:spPr/>
+      </p:pic>
+      <p:sp>
+        <p:nvSpPr>
+          <p:cNvPr id="32" name="Rectangle 31">
+            <a:extLst>
+              <a:ext uri="{FF2B5EF4-FFF2-40B4-BE49-F238E27FC236}">
+                <a16:creationId xmlns:a16="http://schemas.microsoft.com/office/drawing/2014/main" id="{AE213A69-E2EC-3C32-8CFD-F62BD27CB22D}"/>
+              </a:ext>
+            </a:extLst>
+          </p:cNvPr>
+          <p:cNvSpPr/>
+          <p:nvPr/>
+        </p:nvSpPr>
+        <p:spPr>
+          <a:xfrm>
+            <a:off x="11721527" y="2727863"/>
+            <a:ext cx="325315" cy="1202840"/>
+          </a:xfrm>
+          <a:prstGeom prst="rect">
+            <a:avLst/>
+          </a:prstGeom>
+          <a:solidFill>
+            <a:srgbClr val="102857"/>
+          </a:solidFill>
+          <a:ln>
+            <a:solidFill>
+              <a:srgbClr val="102857"/>
+            </a:solidFill>
+          </a:ln>
+        </p:spPr>
+        <p:style>
+          <a:lnRef idx="2">
+            <a:schemeClr val="accent1">
+              <a:shade val="15000"/>
+            </a:schemeClr>
+          </a:lnRef>
+          <a:fillRef idx="1">
+            <a:schemeClr val="accent1"/>
+          </a:fillRef>
+          <a:effectRef idx="0">
+            <a:schemeClr val="accent1"/>
+          </a:effectRef>
+          <a:fontRef idx="minor">
+            <a:schemeClr val="lt1"/>
+          </a:fontRef>
+        </p:style>
+        <p:txBody>
+          <a:bodyPr rtlCol="0" anchor="ctr"/>
+          <a:lstStyle/>
+          <a:p>
+            <a:pPr algn="ctr"/>
+            <a:endParaRPr lang="en-US"/>
+          </a:p>
+        </p:txBody>
+      </p:sp>
+      <p:sp>
+        <p:nvSpPr>
+          <p:cNvPr id="35" name="Title 68">
+            <a:extLst>
+              <a:ext uri="{FF2B5EF4-FFF2-40B4-BE49-F238E27FC236}">
+                <a16:creationId xmlns:a16="http://schemas.microsoft.com/office/drawing/2014/main" id="{F5DF6843-1D20-0BC0-D0FB-CD2F8F990F68}"/>
+              </a:ext>
+            </a:extLst>
+          </p:cNvPr>
+          <p:cNvSpPr txBox="1">
+            <a:spLocks/>
+          </p:cNvSpPr>
+          <p:nvPr/>
+        </p:nvSpPr>
+        <p:spPr>
+          <a:xfrm>
+            <a:off x="1656588" y="136365"/>
+            <a:ext cx="8878824" cy="1069848"/>
+          </a:xfrm>
+          <a:prstGeom prst="rect">
+            <a:avLst/>
+          </a:prstGeom>
+        </p:spPr>
+        <p:txBody>
+          <a:bodyPr vert="horz" lIns="91440" tIns="45720" rIns="91440" bIns="45720" rtlCol="0" anchor="b">
+            <a:noAutofit/>
+          </a:bodyPr>
+          <a:lstStyle>
+            <a:lvl1pPr algn="ctr" defTabSz="914400" rtl="0" eaLnBrk="1" latinLnBrk="0" hangingPunct="1">
+              <a:lnSpc>
+                <a:spcPct val="90000"/>
+              </a:lnSpc>
+              <a:spcBef>
+                <a:spcPct val="0"/>
+              </a:spcBef>
+              <a:buNone/>
+              <a:defRPr sz="4000" b="1" kern="1200" cap="all" spc="600" baseline="0">
+                <a:solidFill>
+                  <a:schemeClr val="bg1"/>
+                </a:solidFill>
+                <a:latin typeface="+mj-lt"/>
+                <a:ea typeface="+mj-ea"/>
+                <a:cs typeface="+mj-cs"/>
+              </a:defRPr>
+            </a:lvl1pPr>
+          </a:lstStyle>
+          <a:p>
+            <a:r>
+              <a:rPr lang="en-US" dirty="0"/>
+              <a:t>Supervised Models 3</a:t>
+            </a:r>
+          </a:p>
+        </p:txBody>
+      </p:sp>
+      <p:sp>
+        <p:nvSpPr>
+          <p:cNvPr id="44" name="Title 68">
+            <a:extLst>
+              <a:ext uri="{FF2B5EF4-FFF2-40B4-BE49-F238E27FC236}">
+                <a16:creationId xmlns:a16="http://schemas.microsoft.com/office/drawing/2014/main" id="{43CDEA61-5F6B-6B36-9E5E-165429EB9648}"/>
+              </a:ext>
+            </a:extLst>
+          </p:cNvPr>
+          <p:cNvSpPr txBox="1">
+            <a:spLocks/>
+          </p:cNvSpPr>
+          <p:nvPr/>
+        </p:nvSpPr>
+        <p:spPr>
+          <a:xfrm>
+            <a:off x="1632204" y="903268"/>
+            <a:ext cx="8878824" cy="1069848"/>
+          </a:xfrm>
+          <a:prstGeom prst="rect">
+            <a:avLst/>
+          </a:prstGeom>
+        </p:spPr>
+        <p:txBody>
+          <a:bodyPr vert="horz" lIns="91440" tIns="45720" rIns="91440" bIns="45720" rtlCol="0" anchor="b">
+            <a:noAutofit/>
+          </a:bodyPr>
+          <a:lstStyle>
+            <a:lvl1pPr algn="ctr" defTabSz="914400" rtl="0" eaLnBrk="1" latinLnBrk="0" hangingPunct="1">
+              <a:lnSpc>
+                <a:spcPct val="90000"/>
+              </a:lnSpc>
+              <a:spcBef>
+                <a:spcPct val="0"/>
+              </a:spcBef>
+              <a:buNone/>
+              <a:defRPr sz="4000" b="1" kern="1200" cap="all" spc="600" baseline="0">
+                <a:solidFill>
+                  <a:schemeClr val="bg1"/>
+                </a:solidFill>
+                <a:latin typeface="+mj-lt"/>
+                <a:ea typeface="+mj-ea"/>
+                <a:cs typeface="+mj-cs"/>
+              </a:defRPr>
+            </a:lvl1pPr>
+          </a:lstStyle>
+          <a:p>
+            <a:r>
+              <a:rPr lang="en-US" sz="2800" dirty="0"/>
+              <a:t>Conclusions</a:t>
+            </a:r>
+          </a:p>
+        </p:txBody>
+      </p:sp>
+    </p:spTree>
+    <p:extLst>
+      <p:ext uri="{BB962C8B-B14F-4D97-AF65-F5344CB8AC3E}">
+        <p14:creationId xmlns:p14="http://schemas.microsoft.com/office/powerpoint/2010/main" val="3510130985"/>
+      </p:ext>
+    </p:extLst>
+  </p:cSld>
+  <p:clrMapOvr>
+    <a:masterClrMapping/>
+  </p:clrMapOvr>
+</p:sld>
+</file>
+
+<file path=ppt/slides/slide12.xml><?xml version="1.0" encoding="utf-8"?>
+<p:sld xmlns:a="http://schemas.openxmlformats.org/drawingml/2006/main" xmlns:r="http://schemas.openxmlformats.org/officeDocument/2006/relationships" xmlns:p="http://schemas.openxmlformats.org/presentationml/2006/main">
+  <p:cSld>
+    <p:spTree>
+      <p:nvGrpSpPr>
+        <p:cNvPr id="1" name="">
+          <a:extLst>
+            <a:ext uri="{FF2B5EF4-FFF2-40B4-BE49-F238E27FC236}">
+              <a16:creationId xmlns:a16="http://schemas.microsoft.com/office/drawing/2014/main" id="{C68A1F4F-6727-2547-F9FB-4E29691E7377}"/>
+            </a:ext>
+          </a:extLst>
+        </p:cNvPr>
+        <p:cNvGrpSpPr/>
+        <p:nvPr/>
+      </p:nvGrpSpPr>
+      <p:grpSpPr>
+        <a:xfrm>
+          <a:off x="0" y="0"/>
+          <a:ext cx="0" cy="0"/>
+          <a:chOff x="0" y="0"/>
+          <a:chExt cx="0" cy="0"/>
+        </a:xfrm>
+      </p:grpSpPr>
+      <p:sp>
+        <p:nvSpPr>
+          <p:cNvPr id="5" name="Slide Number Placeholder 4">
+            <a:extLst>
+              <a:ext uri="{FF2B5EF4-FFF2-40B4-BE49-F238E27FC236}">
+                <a16:creationId xmlns:a16="http://schemas.microsoft.com/office/drawing/2014/main" id="{9A60C8CE-F6D0-87C1-EF74-CE0C84210712}"/>
+              </a:ext>
+            </a:extLst>
+          </p:cNvPr>
+          <p:cNvSpPr>
+            <a:spLocks noGrp="1"/>
+          </p:cNvSpPr>
+          <p:nvPr>
+            <p:ph type="sldNum" sz="quarter" idx="11"/>
+          </p:nvPr>
+        </p:nvSpPr>
+        <p:spPr/>
+        <p:txBody>
+          <a:bodyPr/>
+          <a:lstStyle/>
+          <a:p>
+            <a:fld id="{294A09A9-5501-47C1-A89A-A340965A2BE2}" type="slidenum">
+              <a:rPr lang="en-US" smtClean="0"/>
+              <a:pPr/>
+              <a:t>12</a:t>
+            </a:fld>
+            <a:endParaRPr lang="en-US" dirty="0"/>
+          </a:p>
+        </p:txBody>
+      </p:sp>
+      <p:sp>
+        <p:nvSpPr>
+          <p:cNvPr id="6" name="Title 68">
+            <a:extLst>
+              <a:ext uri="{FF2B5EF4-FFF2-40B4-BE49-F238E27FC236}">
+                <a16:creationId xmlns:a16="http://schemas.microsoft.com/office/drawing/2014/main" id="{5CEB102C-4324-40FC-4FBC-45884EEF60C7}"/>
+              </a:ext>
+            </a:extLst>
+          </p:cNvPr>
+          <p:cNvSpPr txBox="1">
+            <a:spLocks/>
+          </p:cNvSpPr>
+          <p:nvPr/>
+        </p:nvSpPr>
+        <p:spPr>
+          <a:xfrm>
+            <a:off x="1656588" y="136365"/>
+            <a:ext cx="8878824" cy="1069848"/>
+          </a:xfrm>
+          <a:prstGeom prst="rect">
+            <a:avLst/>
+          </a:prstGeom>
+        </p:spPr>
+        <p:txBody>
+          <a:bodyPr vert="horz" lIns="91440" tIns="45720" rIns="91440" bIns="45720" rtlCol="0" anchor="b">
+            <a:noAutofit/>
+          </a:bodyPr>
+          <a:lstStyle>
+            <a:lvl1pPr algn="ctr" defTabSz="914400" rtl="0" eaLnBrk="1" latinLnBrk="0" hangingPunct="1">
+              <a:lnSpc>
+                <a:spcPct val="90000"/>
+              </a:lnSpc>
+              <a:spcBef>
+                <a:spcPct val="0"/>
+              </a:spcBef>
+              <a:buNone/>
+              <a:defRPr sz="4000" b="1" kern="1200" cap="all" spc="600" baseline="0">
+                <a:solidFill>
+                  <a:schemeClr val="bg1"/>
+                </a:solidFill>
+                <a:latin typeface="+mj-lt"/>
+                <a:ea typeface="+mj-ea"/>
+                <a:cs typeface="+mj-cs"/>
+              </a:defRPr>
+            </a:lvl1pPr>
+          </a:lstStyle>
+          <a:p>
+            <a:r>
+              <a:rPr lang="en-US" dirty="0"/>
+              <a:t>Supervised Models 4</a:t>
+            </a:r>
+          </a:p>
+        </p:txBody>
+      </p:sp>
+      <p:sp>
+        <p:nvSpPr>
+          <p:cNvPr id="9" name="Title 68">
+            <a:extLst>
+              <a:ext uri="{FF2B5EF4-FFF2-40B4-BE49-F238E27FC236}">
+                <a16:creationId xmlns:a16="http://schemas.microsoft.com/office/drawing/2014/main" id="{1B016062-2B86-449A-8B55-0029F7CC78E3}"/>
+              </a:ext>
+            </a:extLst>
+          </p:cNvPr>
+          <p:cNvSpPr txBox="1">
+            <a:spLocks/>
+          </p:cNvSpPr>
+          <p:nvPr/>
+        </p:nvSpPr>
+        <p:spPr>
+          <a:xfrm>
+            <a:off x="1632204" y="903268"/>
+            <a:ext cx="8878824" cy="1069848"/>
+          </a:xfrm>
+          <a:prstGeom prst="rect">
+            <a:avLst/>
+          </a:prstGeom>
+        </p:spPr>
+        <p:txBody>
+          <a:bodyPr vert="horz" lIns="91440" tIns="45720" rIns="91440" bIns="45720" rtlCol="0" anchor="b">
+            <a:noAutofit/>
+          </a:bodyPr>
+          <a:lstStyle>
+            <a:lvl1pPr algn="ctr" defTabSz="914400" rtl="0" eaLnBrk="1" latinLnBrk="0" hangingPunct="1">
+              <a:lnSpc>
+                <a:spcPct val="90000"/>
+              </a:lnSpc>
+              <a:spcBef>
+                <a:spcPct val="0"/>
+              </a:spcBef>
+              <a:buNone/>
+              <a:defRPr sz="4000" b="1" kern="1200" cap="all" spc="600" baseline="0">
+                <a:solidFill>
+                  <a:schemeClr val="bg1"/>
+                </a:solidFill>
+                <a:latin typeface="+mj-lt"/>
+                <a:ea typeface="+mj-ea"/>
+                <a:cs typeface="+mj-cs"/>
+              </a:defRPr>
+            </a:lvl1pPr>
+          </a:lstStyle>
+          <a:p>
+            <a:r>
+              <a:rPr lang="en-US" sz="2800" dirty="0"/>
+              <a:t>Confusion Matrix</a:t>
+            </a:r>
+          </a:p>
+        </p:txBody>
+      </p:sp>
+      <p:pic>
+        <p:nvPicPr>
+          <p:cNvPr id="15" name="Picture 14" descr="A screenshot of a color chart&#10;&#10;AI-generated content may be incorrect.">
+            <a:extLst>
+              <a:ext uri="{FF2B5EF4-FFF2-40B4-BE49-F238E27FC236}">
+                <a16:creationId xmlns:a16="http://schemas.microsoft.com/office/drawing/2014/main" id="{1D5BCF86-8111-B883-9BE8-DE97A2336D66}"/>
+              </a:ext>
+            </a:extLst>
+          </p:cNvPr>
+          <p:cNvPicPr>
+            <a:picLocks noChangeAspect="1"/>
+          </p:cNvPicPr>
+          <p:nvPr/>
+        </p:nvPicPr>
+        <p:blipFill>
+          <a:blip r:embed="rId2"/>
+          <a:stretch>
+            <a:fillRect/>
+          </a:stretch>
+        </p:blipFill>
+        <p:spPr>
+          <a:xfrm>
+            <a:off x="0" y="0"/>
+            <a:ext cx="6168018" cy="6858000"/>
+          </a:xfrm>
+          <a:prstGeom prst="rect">
+            <a:avLst/>
+          </a:prstGeom>
+        </p:spPr>
+      </p:pic>
+    </p:spTree>
+    <p:extLst>
+      <p:ext uri="{BB962C8B-B14F-4D97-AF65-F5344CB8AC3E}">
+        <p14:creationId xmlns:p14="http://schemas.microsoft.com/office/powerpoint/2010/main" val="2627658711"/>
+      </p:ext>
+    </p:extLst>
+  </p:cSld>
+  <p:clrMapOvr>
+    <a:masterClrMapping/>
+  </p:clrMapOvr>
+</p:sld>
+</file>
+
+<file path=ppt/slides/slide13.xml><?xml version="1.0" encoding="utf-8"?>
+<p:sld xmlns:a="http://schemas.openxmlformats.org/drawingml/2006/main" xmlns:r="http://schemas.openxmlformats.org/officeDocument/2006/relationships" xmlns:p="http://schemas.openxmlformats.org/presentationml/2006/main">
+  <p:cSld>
+    <p:spTree>
+      <p:nvGrpSpPr>
+        <p:cNvPr id="1" name=""/>
+        <p:cNvGrpSpPr/>
+        <p:nvPr/>
+      </p:nvGrpSpPr>
+      <p:grpSpPr>
+        <a:xfrm>
+          <a:off x="0" y="0"/>
+          <a:ext cx="0" cy="0"/>
+          <a:chOff x="0" y="0"/>
+          <a:chExt cx="0" cy="0"/>
+        </a:xfrm>
+      </p:grpSpPr>
       <p:grpSp>
         <p:nvGrpSpPr>
           <p:cNvPr id="4" name="Group 3">
@@ -19846,926 +20749,6 @@
 </p:sld>
 </file>
 
-<file path=ppt/slides/slide12.xml><?xml version="1.0" encoding="utf-8"?>
-<p:sld xmlns:a="http://schemas.openxmlformats.org/drawingml/2006/main" xmlns:r="http://schemas.openxmlformats.org/officeDocument/2006/relationships" xmlns:p="http://schemas.openxmlformats.org/presentationml/2006/main">
-  <p:cSld>
-    <p:spTree>
-      <p:nvGrpSpPr>
-        <p:cNvPr id="1" name=""/>
-        <p:cNvGrpSpPr/>
-        <p:nvPr/>
-      </p:nvGrpSpPr>
-      <p:grpSpPr>
-        <a:xfrm>
-          <a:off x="0" y="0"/>
-          <a:ext cx="0" cy="0"/>
-          <a:chOff x="0" y="0"/>
-          <a:chExt cx="0" cy="0"/>
-        </a:xfrm>
-      </p:grpSpPr>
-      <p:sp>
-        <p:nvSpPr>
-          <p:cNvPr id="106" name="Title 105">
-            <a:extLst>
-              <a:ext uri="{FF2B5EF4-FFF2-40B4-BE49-F238E27FC236}">
-                <a16:creationId xmlns:a16="http://schemas.microsoft.com/office/drawing/2014/main" id="{734F8B63-0C1D-770B-CA9D-EE7ACF817C1F}"/>
-              </a:ext>
-            </a:extLst>
-          </p:cNvPr>
-          <p:cNvSpPr>
-            <a:spLocks noGrp="1"/>
-          </p:cNvSpPr>
-          <p:nvPr>
-            <p:ph type="title"/>
-          </p:nvPr>
-        </p:nvSpPr>
-        <p:spPr/>
-        <p:txBody>
-          <a:bodyPr/>
-          <a:lstStyle/>
-          <a:p>
-            <a:r>
-              <a:rPr lang="en-US" dirty="0"/>
-              <a:t>PORTFOLIO BUILDUP</a:t>
-            </a:r>
-          </a:p>
-        </p:txBody>
-      </p:sp>
-      <p:sp>
-        <p:nvSpPr>
-          <p:cNvPr id="139" name="Slide Number Placeholder 138">
-            <a:extLst>
-              <a:ext uri="{FF2B5EF4-FFF2-40B4-BE49-F238E27FC236}">
-                <a16:creationId xmlns:a16="http://schemas.microsoft.com/office/drawing/2014/main" id="{0C6CCCC3-BCC9-AE9B-C2AE-4D9986B5F8AE}"/>
-              </a:ext>
-            </a:extLst>
-          </p:cNvPr>
-          <p:cNvSpPr>
-            <a:spLocks noGrp="1"/>
-          </p:cNvSpPr>
-          <p:nvPr>
-            <p:ph type="sldNum" sz="quarter" idx="11"/>
-          </p:nvPr>
-        </p:nvSpPr>
-        <p:spPr/>
-        <p:txBody>
-          <a:bodyPr/>
-          <a:lstStyle/>
-          <a:p>
-            <a:fld id="{294A09A9-5501-47C1-A89A-A340965A2BE2}" type="slidenum">
-              <a:rPr lang="en-US" smtClean="0"/>
-              <a:pPr/>
-              <a:t>12</a:t>
-            </a:fld>
-            <a:endParaRPr lang="en-US" dirty="0"/>
-          </a:p>
-        </p:txBody>
-      </p:sp>
-      <p:pic>
-        <p:nvPicPr>
-          <p:cNvPr id="85" name="Picture Placeholder 84" descr="Continuous Improvement outline">
-            <a:extLst>
-              <a:ext uri="{FF2B5EF4-FFF2-40B4-BE49-F238E27FC236}">
-                <a16:creationId xmlns:a16="http://schemas.microsoft.com/office/drawing/2014/main" id="{D65F5CE9-1D9A-9BF0-5ADD-C4E2693DA4CB}"/>
-              </a:ext>
-            </a:extLst>
-          </p:cNvPr>
-          <p:cNvPicPr>
-            <a:picLocks noGrp="1" noChangeAspect="1"/>
-          </p:cNvPicPr>
-          <p:nvPr>
-            <p:ph type="pic" sz="quarter" idx="22"/>
-          </p:nvPr>
-        </p:nvPicPr>
-        <p:blipFill rotWithShape="1">
-          <a:blip r:embed="rId2"/>
-          <a:srcRect t="517" b="517"/>
-          <a:stretch/>
-        </p:blipFill>
-        <p:spPr>
-          <a:xfrm>
-            <a:off x="1583555" y="2980517"/>
-            <a:ext cx="713074" cy="713074"/>
-          </a:xfrm>
-        </p:spPr>
-      </p:pic>
-      <p:pic>
-        <p:nvPicPr>
-          <p:cNvPr id="86" name="Picture Placeholder 85" descr="Wallet outline">
-            <a:extLst>
-              <a:ext uri="{FF2B5EF4-FFF2-40B4-BE49-F238E27FC236}">
-                <a16:creationId xmlns:a16="http://schemas.microsoft.com/office/drawing/2014/main" id="{EDC60F06-D73E-F719-14FA-A6F1ECF09300}"/>
-              </a:ext>
-            </a:extLst>
-          </p:cNvPr>
-          <p:cNvPicPr>
-            <a:picLocks noGrp="1" noChangeAspect="1"/>
-          </p:cNvPicPr>
-          <p:nvPr>
-            <p:ph type="pic" sz="quarter" idx="23"/>
-          </p:nvPr>
-        </p:nvPicPr>
-        <p:blipFill rotWithShape="1">
-          <a:blip r:embed="rId3"/>
-          <a:srcRect t="128" b="128"/>
-          <a:stretch/>
-        </p:blipFill>
-        <p:spPr/>
-      </p:pic>
-      <p:pic>
-        <p:nvPicPr>
-          <p:cNvPr id="87" name="Picture Placeholder 86" descr="Piggy Bank outline">
-            <a:extLst>
-              <a:ext uri="{FF2B5EF4-FFF2-40B4-BE49-F238E27FC236}">
-                <a16:creationId xmlns:a16="http://schemas.microsoft.com/office/drawing/2014/main" id="{ED53247D-56A2-6AB9-6FF9-0313BD7DB9E8}"/>
-              </a:ext>
-            </a:extLst>
-          </p:cNvPr>
-          <p:cNvPicPr>
-            <a:picLocks noGrp="1" noChangeAspect="1"/>
-          </p:cNvPicPr>
-          <p:nvPr>
-            <p:ph type="pic" sz="quarter" idx="24"/>
-          </p:nvPr>
-        </p:nvPicPr>
-        <p:blipFill rotWithShape="1">
-          <a:blip r:embed="rId4"/>
-          <a:srcRect/>
-          <a:stretch/>
-        </p:blipFill>
-        <p:spPr/>
-      </p:pic>
-      <p:pic>
-        <p:nvPicPr>
-          <p:cNvPr id="88" name="Picture Placeholder 87" descr="Bitcoin outline">
-            <a:extLst>
-              <a:ext uri="{FF2B5EF4-FFF2-40B4-BE49-F238E27FC236}">
-                <a16:creationId xmlns:a16="http://schemas.microsoft.com/office/drawing/2014/main" id="{32BC0F61-A0C8-5BEF-A6E9-0E7ADE645FA6}"/>
-              </a:ext>
-            </a:extLst>
-          </p:cNvPr>
-          <p:cNvPicPr>
-            <a:picLocks noGrp="1" noChangeAspect="1"/>
-          </p:cNvPicPr>
-          <p:nvPr>
-            <p:ph type="pic" sz="quarter" idx="25"/>
-          </p:nvPr>
-        </p:nvPicPr>
-        <p:blipFill rotWithShape="1">
-          <a:blip r:embed="rId5"/>
-          <a:srcRect l="345" r="345"/>
-          <a:stretch/>
-        </p:blipFill>
-        <p:spPr/>
-      </p:pic>
-      <p:pic>
-        <p:nvPicPr>
-          <p:cNvPr id="90" name="Picture Placeholder 89" descr="Exponential Graph outline">
-            <a:extLst>
-              <a:ext uri="{FF2B5EF4-FFF2-40B4-BE49-F238E27FC236}">
-                <a16:creationId xmlns:a16="http://schemas.microsoft.com/office/drawing/2014/main" id="{86472D92-CAA9-AF6F-549B-2EE170C70DD7}"/>
-              </a:ext>
-            </a:extLst>
-          </p:cNvPr>
-          <p:cNvPicPr>
-            <a:picLocks noGrp="1" noChangeAspect="1"/>
-          </p:cNvPicPr>
-          <p:nvPr>
-            <p:ph type="pic" sz="quarter" idx="26"/>
-          </p:nvPr>
-        </p:nvPicPr>
-        <p:blipFill rotWithShape="1">
-          <a:blip r:embed="rId6"/>
-          <a:srcRect/>
-          <a:stretch/>
-        </p:blipFill>
-        <p:spPr/>
-      </p:pic>
-      <p:sp>
-        <p:nvSpPr>
-          <p:cNvPr id="3" name="Text Placeholder 2">
-            <a:extLst>
-              <a:ext uri="{FF2B5EF4-FFF2-40B4-BE49-F238E27FC236}">
-                <a16:creationId xmlns:a16="http://schemas.microsoft.com/office/drawing/2014/main" id="{0CF4EECB-47E7-26A0-F3A1-ACAE7AEE5741}"/>
-              </a:ext>
-            </a:extLst>
-          </p:cNvPr>
-          <p:cNvSpPr>
-            <a:spLocks noGrp="1"/>
-          </p:cNvSpPr>
-          <p:nvPr>
-            <p:ph type="body" sz="quarter" idx="12"/>
-          </p:nvPr>
-        </p:nvSpPr>
-        <p:spPr/>
-        <p:txBody>
-          <a:bodyPr/>
-          <a:lstStyle/>
-          <a:p>
-            <a:r>
-              <a:rPr lang="en-US" dirty="0"/>
-              <a:t>Step 1</a:t>
-            </a:r>
-          </a:p>
-        </p:txBody>
-      </p:sp>
-      <p:sp>
-        <p:nvSpPr>
-          <p:cNvPr id="133" name="Text Placeholder 132">
-            <a:extLst>
-              <a:ext uri="{FF2B5EF4-FFF2-40B4-BE49-F238E27FC236}">
-                <a16:creationId xmlns:a16="http://schemas.microsoft.com/office/drawing/2014/main" id="{0D7DF893-CDC1-A213-86BF-C9C73F979CC5}"/>
-              </a:ext>
-            </a:extLst>
-          </p:cNvPr>
-          <p:cNvSpPr>
-            <a:spLocks noGrp="1"/>
-          </p:cNvSpPr>
-          <p:nvPr>
-            <p:ph type="body" sz="quarter" idx="28"/>
-          </p:nvPr>
-        </p:nvSpPr>
-        <p:spPr/>
-        <p:txBody>
-          <a:bodyPr/>
-          <a:lstStyle/>
-          <a:p>
-            <a:endParaRPr lang="en-US" dirty="0"/>
-          </a:p>
-        </p:txBody>
-      </p:sp>
-      <p:sp>
-        <p:nvSpPr>
-          <p:cNvPr id="5" name="Text Placeholder 4">
-            <a:extLst>
-              <a:ext uri="{FF2B5EF4-FFF2-40B4-BE49-F238E27FC236}">
-                <a16:creationId xmlns:a16="http://schemas.microsoft.com/office/drawing/2014/main" id="{AC2F0535-53EA-30FB-770D-0C92BEEF3F6D}"/>
-              </a:ext>
-            </a:extLst>
-          </p:cNvPr>
-          <p:cNvSpPr>
-            <a:spLocks noGrp="1"/>
-          </p:cNvSpPr>
-          <p:nvPr>
-            <p:ph type="body" sz="quarter" idx="14"/>
-          </p:nvPr>
-        </p:nvSpPr>
-        <p:spPr/>
-        <p:txBody>
-          <a:bodyPr/>
-          <a:lstStyle/>
-          <a:p>
-            <a:pPr lvl="0"/>
-            <a:r>
-              <a:rPr lang="en-US" dirty="0"/>
-              <a:t>Step 2</a:t>
-            </a:r>
-          </a:p>
-        </p:txBody>
-      </p:sp>
-      <p:sp>
-        <p:nvSpPr>
-          <p:cNvPr id="134" name="Text Placeholder 133">
-            <a:extLst>
-              <a:ext uri="{FF2B5EF4-FFF2-40B4-BE49-F238E27FC236}">
-                <a16:creationId xmlns:a16="http://schemas.microsoft.com/office/drawing/2014/main" id="{9CE100CE-4574-F901-234D-B9BEED642B9B}"/>
-              </a:ext>
-            </a:extLst>
-          </p:cNvPr>
-          <p:cNvSpPr>
-            <a:spLocks noGrp="1"/>
-          </p:cNvSpPr>
-          <p:nvPr>
-            <p:ph type="body" sz="quarter" idx="29"/>
-          </p:nvPr>
-        </p:nvSpPr>
-        <p:spPr/>
-        <p:txBody>
-          <a:bodyPr/>
-          <a:lstStyle/>
-          <a:p>
-            <a:endParaRPr lang="en-US" dirty="0"/>
-          </a:p>
-        </p:txBody>
-      </p:sp>
-      <p:sp>
-        <p:nvSpPr>
-          <p:cNvPr id="7" name="Text Placeholder 6">
-            <a:extLst>
-              <a:ext uri="{FF2B5EF4-FFF2-40B4-BE49-F238E27FC236}">
-                <a16:creationId xmlns:a16="http://schemas.microsoft.com/office/drawing/2014/main" id="{31511481-29C6-275B-963E-B5AF2E87ADA2}"/>
-              </a:ext>
-            </a:extLst>
-          </p:cNvPr>
-          <p:cNvSpPr>
-            <a:spLocks noGrp="1"/>
-          </p:cNvSpPr>
-          <p:nvPr>
-            <p:ph type="body" sz="quarter" idx="16"/>
-          </p:nvPr>
-        </p:nvSpPr>
-        <p:spPr/>
-        <p:txBody>
-          <a:bodyPr/>
-          <a:lstStyle/>
-          <a:p>
-            <a:pPr lvl="0"/>
-            <a:r>
-              <a:rPr lang="en-US" dirty="0"/>
-              <a:t>Step 3</a:t>
-            </a:r>
-          </a:p>
-        </p:txBody>
-      </p:sp>
-      <p:sp>
-        <p:nvSpPr>
-          <p:cNvPr id="135" name="Text Placeholder 134">
-            <a:extLst>
-              <a:ext uri="{FF2B5EF4-FFF2-40B4-BE49-F238E27FC236}">
-                <a16:creationId xmlns:a16="http://schemas.microsoft.com/office/drawing/2014/main" id="{288EBDBE-0ABC-82CE-4598-09F65E315AD7}"/>
-              </a:ext>
-            </a:extLst>
-          </p:cNvPr>
-          <p:cNvSpPr>
-            <a:spLocks noGrp="1"/>
-          </p:cNvSpPr>
-          <p:nvPr>
-            <p:ph type="body" sz="quarter" idx="30"/>
-          </p:nvPr>
-        </p:nvSpPr>
-        <p:spPr/>
-        <p:txBody>
-          <a:bodyPr/>
-          <a:lstStyle/>
-          <a:p>
-            <a:endParaRPr lang="en-US" dirty="0"/>
-          </a:p>
-        </p:txBody>
-      </p:sp>
-      <p:sp>
-        <p:nvSpPr>
-          <p:cNvPr id="9" name="Text Placeholder 8">
-            <a:extLst>
-              <a:ext uri="{FF2B5EF4-FFF2-40B4-BE49-F238E27FC236}">
-                <a16:creationId xmlns:a16="http://schemas.microsoft.com/office/drawing/2014/main" id="{2F32973A-CF94-1C2B-BB12-B563173CC79A}"/>
-              </a:ext>
-            </a:extLst>
-          </p:cNvPr>
-          <p:cNvSpPr>
-            <a:spLocks noGrp="1"/>
-          </p:cNvSpPr>
-          <p:nvPr>
-            <p:ph type="body" sz="quarter" idx="18"/>
-          </p:nvPr>
-        </p:nvSpPr>
-        <p:spPr/>
-        <p:txBody>
-          <a:bodyPr/>
-          <a:lstStyle/>
-          <a:p>
-            <a:pPr lvl="0"/>
-            <a:r>
-              <a:rPr lang="en-US" dirty="0"/>
-              <a:t>Step 4</a:t>
-            </a:r>
-          </a:p>
-        </p:txBody>
-      </p:sp>
-      <p:sp>
-        <p:nvSpPr>
-          <p:cNvPr id="136" name="Text Placeholder 135">
-            <a:extLst>
-              <a:ext uri="{FF2B5EF4-FFF2-40B4-BE49-F238E27FC236}">
-                <a16:creationId xmlns:a16="http://schemas.microsoft.com/office/drawing/2014/main" id="{14F6CD04-2A18-A6BD-AAB9-1D30D1563399}"/>
-              </a:ext>
-            </a:extLst>
-          </p:cNvPr>
-          <p:cNvSpPr>
-            <a:spLocks noGrp="1"/>
-          </p:cNvSpPr>
-          <p:nvPr>
-            <p:ph type="body" sz="quarter" idx="31"/>
-          </p:nvPr>
-        </p:nvSpPr>
-        <p:spPr/>
-        <p:txBody>
-          <a:bodyPr/>
-          <a:lstStyle/>
-          <a:p>
-            <a:endParaRPr lang="en-US" dirty="0"/>
-          </a:p>
-        </p:txBody>
-      </p:sp>
-      <p:sp>
-        <p:nvSpPr>
-          <p:cNvPr id="11" name="Text Placeholder 10">
-            <a:extLst>
-              <a:ext uri="{FF2B5EF4-FFF2-40B4-BE49-F238E27FC236}">
-                <a16:creationId xmlns:a16="http://schemas.microsoft.com/office/drawing/2014/main" id="{CE7AA813-84F0-DB50-F6B6-A29A94662DAD}"/>
-              </a:ext>
-            </a:extLst>
-          </p:cNvPr>
-          <p:cNvSpPr>
-            <a:spLocks noGrp="1"/>
-          </p:cNvSpPr>
-          <p:nvPr>
-            <p:ph type="body" sz="quarter" idx="20"/>
-          </p:nvPr>
-        </p:nvSpPr>
-        <p:spPr/>
-        <p:txBody>
-          <a:bodyPr/>
-          <a:lstStyle/>
-          <a:p>
-            <a:pPr lvl="0"/>
-            <a:r>
-              <a:rPr lang="en-US" dirty="0"/>
-              <a:t>Step 5</a:t>
-            </a:r>
-          </a:p>
-        </p:txBody>
-      </p:sp>
-      <p:sp>
-        <p:nvSpPr>
-          <p:cNvPr id="137" name="Text Placeholder 136">
-            <a:extLst>
-              <a:ext uri="{FF2B5EF4-FFF2-40B4-BE49-F238E27FC236}">
-                <a16:creationId xmlns:a16="http://schemas.microsoft.com/office/drawing/2014/main" id="{C171CBDB-4593-F4D1-30E9-A47F4C7CADAF}"/>
-              </a:ext>
-            </a:extLst>
-          </p:cNvPr>
-          <p:cNvSpPr>
-            <a:spLocks noGrp="1"/>
-          </p:cNvSpPr>
-          <p:nvPr>
-            <p:ph type="body" sz="quarter" idx="32"/>
-          </p:nvPr>
-        </p:nvSpPr>
-        <p:spPr/>
-        <p:txBody>
-          <a:bodyPr/>
-          <a:lstStyle/>
-          <a:p>
-            <a:endParaRPr lang="en-US" dirty="0"/>
-          </a:p>
-        </p:txBody>
-      </p:sp>
-      <p:sp>
-        <p:nvSpPr>
-          <p:cNvPr id="69" name="Text Placeholder 68">
-            <a:extLst>
-              <a:ext uri="{FF2B5EF4-FFF2-40B4-BE49-F238E27FC236}">
-                <a16:creationId xmlns:a16="http://schemas.microsoft.com/office/drawing/2014/main" id="{4BBDF45D-9B32-0154-7602-2C43DAF6C0A6}"/>
-              </a:ext>
-            </a:extLst>
-          </p:cNvPr>
-          <p:cNvSpPr>
-            <a:spLocks noGrp="1"/>
-          </p:cNvSpPr>
-          <p:nvPr>
-            <p:ph type="body" sz="quarter" idx="13"/>
-          </p:nvPr>
-        </p:nvSpPr>
-        <p:spPr/>
-        <p:txBody>
-          <a:bodyPr/>
-          <a:lstStyle/>
-          <a:p>
-            <a:r>
-              <a:rPr lang="en-US" dirty="0"/>
-              <a:t>Choose a cryptocurrency exchange</a:t>
-            </a:r>
-          </a:p>
-          <a:p>
-            <a:endParaRPr lang="en-US" dirty="0"/>
-          </a:p>
-        </p:txBody>
-      </p:sp>
-      <p:sp>
-        <p:nvSpPr>
-          <p:cNvPr id="70" name="Text Placeholder 69">
-            <a:extLst>
-              <a:ext uri="{FF2B5EF4-FFF2-40B4-BE49-F238E27FC236}">
-                <a16:creationId xmlns:a16="http://schemas.microsoft.com/office/drawing/2014/main" id="{38FF6C9F-C7C5-37D5-4C61-BA14A636B732}"/>
-              </a:ext>
-            </a:extLst>
-          </p:cNvPr>
-          <p:cNvSpPr>
-            <a:spLocks noGrp="1"/>
-          </p:cNvSpPr>
-          <p:nvPr>
-            <p:ph type="body" sz="quarter" idx="15"/>
-          </p:nvPr>
-        </p:nvSpPr>
-        <p:spPr/>
-        <p:txBody>
-          <a:bodyPr/>
-          <a:lstStyle/>
-          <a:p>
-            <a:r>
-              <a:rPr lang="en-US" dirty="0"/>
-              <a:t>Purchase preferred coins &amp; create "wallet"</a:t>
-            </a:r>
-          </a:p>
-          <a:p>
-            <a:endParaRPr lang="en-US" dirty="0"/>
-          </a:p>
-        </p:txBody>
-      </p:sp>
-      <p:sp>
-        <p:nvSpPr>
-          <p:cNvPr id="71" name="Text Placeholder 70">
-            <a:extLst>
-              <a:ext uri="{FF2B5EF4-FFF2-40B4-BE49-F238E27FC236}">
-                <a16:creationId xmlns:a16="http://schemas.microsoft.com/office/drawing/2014/main" id="{5973BD56-1612-983E-EA67-F4039B062085}"/>
-              </a:ext>
-            </a:extLst>
-          </p:cNvPr>
-          <p:cNvSpPr>
-            <a:spLocks noGrp="1"/>
-          </p:cNvSpPr>
-          <p:nvPr>
-            <p:ph type="body" sz="quarter" idx="17"/>
-          </p:nvPr>
-        </p:nvSpPr>
-        <p:spPr/>
-        <p:txBody>
-          <a:bodyPr/>
-          <a:lstStyle/>
-          <a:p>
-            <a:r>
-              <a:rPr lang="en-US" dirty="0"/>
-              <a:t>Research investment and trading options</a:t>
-            </a:r>
-          </a:p>
-          <a:p>
-            <a:endParaRPr lang="en-US" dirty="0"/>
-          </a:p>
-        </p:txBody>
-      </p:sp>
-      <p:sp>
-        <p:nvSpPr>
-          <p:cNvPr id="72" name="Text Placeholder 71">
-            <a:extLst>
-              <a:ext uri="{FF2B5EF4-FFF2-40B4-BE49-F238E27FC236}">
-                <a16:creationId xmlns:a16="http://schemas.microsoft.com/office/drawing/2014/main" id="{840CFADA-CAD6-2A04-5B15-5DB4DD6A84E0}"/>
-              </a:ext>
-            </a:extLst>
-          </p:cNvPr>
-          <p:cNvSpPr>
-            <a:spLocks noGrp="1"/>
-          </p:cNvSpPr>
-          <p:nvPr>
-            <p:ph type="body" sz="quarter" idx="19"/>
-          </p:nvPr>
-        </p:nvSpPr>
-        <p:spPr/>
-        <p:txBody>
-          <a:bodyPr/>
-          <a:lstStyle/>
-          <a:p>
-            <a:r>
-              <a:rPr lang="en-US" dirty="0"/>
-              <a:t>Stake preferred coins in chosen company</a:t>
-            </a:r>
-          </a:p>
-          <a:p>
-            <a:endParaRPr lang="en-US" dirty="0"/>
-          </a:p>
-        </p:txBody>
-      </p:sp>
-      <p:sp>
-        <p:nvSpPr>
-          <p:cNvPr id="73" name="Text Placeholder 72">
-            <a:extLst>
-              <a:ext uri="{FF2B5EF4-FFF2-40B4-BE49-F238E27FC236}">
-                <a16:creationId xmlns:a16="http://schemas.microsoft.com/office/drawing/2014/main" id="{DB3347BB-2913-A230-8362-2B778394E7CE}"/>
-              </a:ext>
-            </a:extLst>
-          </p:cNvPr>
-          <p:cNvSpPr>
-            <a:spLocks noGrp="1"/>
-          </p:cNvSpPr>
-          <p:nvPr>
-            <p:ph type="body" sz="quarter" idx="21"/>
-          </p:nvPr>
-        </p:nvSpPr>
-        <p:spPr/>
-        <p:txBody>
-          <a:bodyPr/>
-          <a:lstStyle/>
-          <a:p>
-            <a:pPr lvl="0"/>
-            <a:r>
-              <a:rPr lang="en-US" dirty="0"/>
-              <a:t>Set exponential growth goals</a:t>
-            </a:r>
-          </a:p>
-        </p:txBody>
-      </p:sp>
-      <p:sp>
-        <p:nvSpPr>
-          <p:cNvPr id="138" name="Footer Placeholder 137">
-            <a:extLst>
-              <a:ext uri="{FF2B5EF4-FFF2-40B4-BE49-F238E27FC236}">
-                <a16:creationId xmlns:a16="http://schemas.microsoft.com/office/drawing/2014/main" id="{8BC11123-4B26-8100-E85C-F218651524A5}"/>
-              </a:ext>
-            </a:extLst>
-          </p:cNvPr>
-          <p:cNvSpPr>
-            <a:spLocks noGrp="1"/>
-          </p:cNvSpPr>
-          <p:nvPr>
-            <p:ph type="ftr" sz="quarter" idx="10"/>
-          </p:nvPr>
-        </p:nvSpPr>
-        <p:spPr/>
-        <p:txBody>
-          <a:bodyPr/>
-          <a:lstStyle/>
-          <a:p>
-            <a:r>
-              <a:rPr lang="en-US"/>
-              <a:t>Crypto: investing &amp; trading</a:t>
-            </a:r>
-            <a:endParaRPr lang="en-US" dirty="0"/>
-          </a:p>
-        </p:txBody>
-      </p:sp>
-    </p:spTree>
-    <p:extLst>
-      <p:ext uri="{BB962C8B-B14F-4D97-AF65-F5344CB8AC3E}">
-        <p14:creationId xmlns:p14="http://schemas.microsoft.com/office/powerpoint/2010/main" val="3510130985"/>
-      </p:ext>
-    </p:extLst>
-  </p:cSld>
-  <p:clrMapOvr>
-    <a:masterClrMapping/>
-  </p:clrMapOvr>
-</p:sld>
-</file>
-
-<file path=ppt/slides/slide13.xml><?xml version="1.0" encoding="utf-8"?>
-<p:sld xmlns:a="http://schemas.openxmlformats.org/drawingml/2006/main" xmlns:r="http://schemas.openxmlformats.org/officeDocument/2006/relationships" xmlns:p="http://schemas.openxmlformats.org/presentationml/2006/main">
-  <p:cSld>
-    <p:spTree>
-      <p:nvGrpSpPr>
-        <p:cNvPr id="1" name=""/>
-        <p:cNvGrpSpPr/>
-        <p:nvPr/>
-      </p:nvGrpSpPr>
-      <p:grpSpPr>
-        <a:xfrm>
-          <a:off x="0" y="0"/>
-          <a:ext cx="0" cy="0"/>
-          <a:chOff x="0" y="0"/>
-          <a:chExt cx="0" cy="0"/>
-        </a:xfrm>
-      </p:grpSpPr>
-      <p:sp>
-        <p:nvSpPr>
-          <p:cNvPr id="2" name="Title 1">
-            <a:extLst>
-              <a:ext uri="{FF2B5EF4-FFF2-40B4-BE49-F238E27FC236}">
-                <a16:creationId xmlns:a16="http://schemas.microsoft.com/office/drawing/2014/main" id="{D249E45E-D6A7-9780-F652-BAF86DFBCC00}"/>
-              </a:ext>
-            </a:extLst>
-          </p:cNvPr>
-          <p:cNvSpPr>
-            <a:spLocks noGrp="1"/>
-          </p:cNvSpPr>
-          <p:nvPr>
-            <p:ph type="title"/>
-          </p:nvPr>
-        </p:nvSpPr>
-        <p:spPr/>
-        <p:txBody>
-          <a:bodyPr/>
-          <a:lstStyle/>
-          <a:p>
-            <a:r>
-              <a:rPr lang="en-US" dirty="0"/>
-              <a:t>AREAS OF FOCUS</a:t>
-            </a:r>
-          </a:p>
-        </p:txBody>
-      </p:sp>
-      <p:sp>
-        <p:nvSpPr>
-          <p:cNvPr id="8" name="Slide Number Placeholder 7">
-            <a:extLst>
-              <a:ext uri="{FF2B5EF4-FFF2-40B4-BE49-F238E27FC236}">
-                <a16:creationId xmlns:a16="http://schemas.microsoft.com/office/drawing/2014/main" id="{85577A64-4E94-69E1-3180-1E014BD06B3C}"/>
-              </a:ext>
-            </a:extLst>
-          </p:cNvPr>
-          <p:cNvSpPr>
-            <a:spLocks noGrp="1"/>
-          </p:cNvSpPr>
-          <p:nvPr>
-            <p:ph type="sldNum" sz="quarter" idx="12"/>
-          </p:nvPr>
-        </p:nvSpPr>
-        <p:spPr/>
-        <p:txBody>
-          <a:bodyPr/>
-          <a:lstStyle/>
-          <a:p>
-            <a:fld id="{294A09A9-5501-47C1-A89A-A340965A2BE2}" type="slidenum">
-              <a:rPr lang="en-US" smtClean="0"/>
-              <a:t>13</a:t>
-            </a:fld>
-            <a:endParaRPr lang="en-US" dirty="0"/>
-          </a:p>
-        </p:txBody>
-      </p:sp>
-      <p:sp>
-        <p:nvSpPr>
-          <p:cNvPr id="3" name="Text Placeholder 2">
-            <a:extLst>
-              <a:ext uri="{FF2B5EF4-FFF2-40B4-BE49-F238E27FC236}">
-                <a16:creationId xmlns:a16="http://schemas.microsoft.com/office/drawing/2014/main" id="{C31605EE-24B6-95D8-DE5E-BEC2F03ECECA}"/>
-              </a:ext>
-            </a:extLst>
-          </p:cNvPr>
-          <p:cNvSpPr>
-            <a:spLocks noGrp="1"/>
-          </p:cNvSpPr>
-          <p:nvPr>
-            <p:ph type="body" idx="1"/>
-          </p:nvPr>
-        </p:nvSpPr>
-        <p:spPr/>
-        <p:txBody>
-          <a:bodyPr/>
-          <a:lstStyle/>
-          <a:p>
-            <a:r>
-              <a:rPr lang="en-US" dirty="0"/>
-              <a:t>Portfolio diversification</a:t>
-            </a:r>
-          </a:p>
-        </p:txBody>
-      </p:sp>
-      <p:sp>
-        <p:nvSpPr>
-          <p:cNvPr id="4" name="Content Placeholder 3">
-            <a:extLst>
-              <a:ext uri="{FF2B5EF4-FFF2-40B4-BE49-F238E27FC236}">
-                <a16:creationId xmlns:a16="http://schemas.microsoft.com/office/drawing/2014/main" id="{BE22F651-7ABC-015D-B5C4-622708A64CB1}"/>
-              </a:ext>
-            </a:extLst>
-          </p:cNvPr>
-          <p:cNvSpPr>
-            <a:spLocks noGrp="1"/>
-          </p:cNvSpPr>
-          <p:nvPr>
-            <p:ph sz="half" idx="2"/>
-          </p:nvPr>
-        </p:nvSpPr>
-        <p:spPr/>
-        <p:txBody>
-          <a:bodyPr/>
-          <a:lstStyle/>
-          <a:p>
-            <a:r>
-              <a:rPr lang="en-US" dirty="0"/>
-              <a:t>Develop winning combinations to stay ahead of the market</a:t>
-            </a:r>
-          </a:p>
-          <a:p>
-            <a:r>
-              <a:rPr lang="en-US" dirty="0"/>
-              <a:t>Capitalize on direct ownership of digital coins</a:t>
-            </a:r>
-          </a:p>
-          <a:p>
-            <a:r>
-              <a:rPr lang="en-US" dirty="0"/>
-              <a:t>Invest in multiple blockchains​</a:t>
-            </a:r>
-          </a:p>
-          <a:p>
-            <a:endParaRPr lang="en-US" dirty="0"/>
-          </a:p>
-        </p:txBody>
-      </p:sp>
-      <p:sp>
-        <p:nvSpPr>
-          <p:cNvPr id="5" name="Text Placeholder 4">
-            <a:extLst>
-              <a:ext uri="{FF2B5EF4-FFF2-40B4-BE49-F238E27FC236}">
-                <a16:creationId xmlns:a16="http://schemas.microsoft.com/office/drawing/2014/main" id="{6A1E0F07-3291-4EE2-1286-04C97165BA68}"/>
-              </a:ext>
-            </a:extLst>
-          </p:cNvPr>
-          <p:cNvSpPr>
-            <a:spLocks noGrp="1"/>
-          </p:cNvSpPr>
-          <p:nvPr>
-            <p:ph type="body" sz="quarter" idx="3"/>
-          </p:nvPr>
-        </p:nvSpPr>
-        <p:spPr/>
-        <p:txBody>
-          <a:bodyPr/>
-          <a:lstStyle/>
-          <a:p>
-            <a:r>
-              <a:rPr lang="en-US" dirty="0"/>
-              <a:t>Short and long-term goals</a:t>
-            </a:r>
-          </a:p>
-        </p:txBody>
-      </p:sp>
-      <p:sp>
-        <p:nvSpPr>
-          <p:cNvPr id="6" name="Content Placeholder 5">
-            <a:extLst>
-              <a:ext uri="{FF2B5EF4-FFF2-40B4-BE49-F238E27FC236}">
-                <a16:creationId xmlns:a16="http://schemas.microsoft.com/office/drawing/2014/main" id="{3DF22CC9-1295-2B21-05A9-68A44E669B8F}"/>
-              </a:ext>
-            </a:extLst>
-          </p:cNvPr>
-          <p:cNvSpPr>
-            <a:spLocks noGrp="1"/>
-          </p:cNvSpPr>
-          <p:nvPr>
-            <p:ph sz="quarter" idx="4"/>
-          </p:nvPr>
-        </p:nvSpPr>
-        <p:spPr/>
-        <p:txBody>
-          <a:bodyPr/>
-          <a:lstStyle/>
-          <a:p>
-            <a:r>
-              <a:rPr lang="en-US" dirty="0"/>
-              <a:t>Create an emergency fund</a:t>
-            </a:r>
-          </a:p>
-          <a:p>
-            <a:r>
-              <a:rPr lang="en-US" dirty="0"/>
-              <a:t>Add a second stream of income</a:t>
-            </a:r>
-          </a:p>
-          <a:p>
-            <a:r>
-              <a:rPr lang="en-US" dirty="0"/>
-              <a:t>Buy a house</a:t>
-            </a:r>
-          </a:p>
-          <a:p>
-            <a:r>
-              <a:rPr lang="en-US" dirty="0"/>
-              <a:t>Supplement retirement fund</a:t>
-            </a:r>
-          </a:p>
-        </p:txBody>
-      </p:sp>
-      <p:sp>
-        <p:nvSpPr>
-          <p:cNvPr id="7" name="Footer Placeholder 6">
-            <a:extLst>
-              <a:ext uri="{FF2B5EF4-FFF2-40B4-BE49-F238E27FC236}">
-                <a16:creationId xmlns:a16="http://schemas.microsoft.com/office/drawing/2014/main" id="{A9F57080-19CA-8BBA-6050-8494551D4615}"/>
-              </a:ext>
-            </a:extLst>
-          </p:cNvPr>
-          <p:cNvSpPr>
-            <a:spLocks noGrp="1"/>
-          </p:cNvSpPr>
-          <p:nvPr>
-            <p:ph type="ftr" sz="quarter" idx="11"/>
-          </p:nvPr>
-        </p:nvSpPr>
-        <p:spPr/>
-        <p:txBody>
-          <a:bodyPr/>
-          <a:lstStyle/>
-          <a:p>
-            <a:r>
-              <a:rPr lang="en-US"/>
-              <a:t>Crypto: investing &amp; trading</a:t>
-            </a:r>
-            <a:endParaRPr lang="en-US" dirty="0"/>
-          </a:p>
-        </p:txBody>
-      </p:sp>
-    </p:spTree>
-    <p:extLst>
-      <p:ext uri="{BB962C8B-B14F-4D97-AF65-F5344CB8AC3E}">
-        <p14:creationId xmlns:p14="http://schemas.microsoft.com/office/powerpoint/2010/main" val="765210901"/>
-      </p:ext>
-    </p:extLst>
-  </p:cSld>
-  <p:clrMapOvr>
-    <a:masterClrMapping/>
-  </p:clrMapOvr>
-</p:sld>
-</file>
-
 <file path=ppt/slides/slide14.xml><?xml version="1.0" encoding="utf-8"?>
 <p:sld xmlns:a="http://schemas.openxmlformats.org/drawingml/2006/main" xmlns:r="http://schemas.openxmlformats.org/officeDocument/2006/relationships" xmlns:p="http://schemas.openxmlformats.org/presentationml/2006/main">
   <p:cSld>
@@ -20788,7 +20771,7 @@
           <p:cNvPr id="2" name="Title 1">
             <a:extLst>
               <a:ext uri="{FF2B5EF4-FFF2-40B4-BE49-F238E27FC236}">
-                <a16:creationId xmlns:a16="http://schemas.microsoft.com/office/drawing/2014/main" id="{189E73D4-535B-6DCC-2268-43A5E9E12C45}"/>
+                <a16:creationId xmlns:a16="http://schemas.microsoft.com/office/drawing/2014/main" id="{D249E45E-D6A7-9780-F652-BAF86DFBCC00}"/>
               </a:ext>
             </a:extLst>
           </p:cNvPr>
@@ -20806,17 +20789,17 @@
           <a:p>
             <a:r>
               <a:rPr lang="en-US" dirty="0"/>
-              <a:t>HOW TO GET THERE</a:t>
-            </a:r>
-          </a:p>
-        </p:txBody>
-      </p:sp>
-      <p:sp>
-        <p:nvSpPr>
-          <p:cNvPr id="6" name="Slide Number Placeholder 5">
-            <a:extLst>
-              <a:ext uri="{FF2B5EF4-FFF2-40B4-BE49-F238E27FC236}">
-                <a16:creationId xmlns:a16="http://schemas.microsoft.com/office/drawing/2014/main" id="{6459FCA3-0124-0FA6-220B-D72E8F8034C8}"/>
+              <a:t>AREAS OF FOCUS</a:t>
+            </a:r>
+          </a:p>
+        </p:txBody>
+      </p:sp>
+      <p:sp>
+        <p:nvSpPr>
+          <p:cNvPr id="8" name="Slide Number Placeholder 7">
+            <a:extLst>
+              <a:ext uri="{FF2B5EF4-FFF2-40B4-BE49-F238E27FC236}">
+                <a16:creationId xmlns:a16="http://schemas.microsoft.com/office/drawing/2014/main" id="{85577A64-4E94-69E1-3180-1E014BD06B3C}"/>
               </a:ext>
             </a:extLst>
           </p:cNvPr>
@@ -20845,7 +20828,7 @@
           <p:cNvPr id="3" name="Text Placeholder 2">
             <a:extLst>
               <a:ext uri="{FF2B5EF4-FFF2-40B4-BE49-F238E27FC236}">
-                <a16:creationId xmlns:a16="http://schemas.microsoft.com/office/drawing/2014/main" id="{5830852F-3FB7-6D2E-F6AC-1F6B9CAD2158}"/>
+                <a16:creationId xmlns:a16="http://schemas.microsoft.com/office/drawing/2014/main" id="{C31605EE-24B6-95D8-DE5E-BEC2F03ECECA}"/>
               </a:ext>
             </a:extLst>
           </p:cNvPr>
@@ -20863,20 +20846,17 @@
           <a:p>
             <a:r>
               <a:rPr lang="en-US" dirty="0"/>
-              <a:t>Strategize</a:t>
-            </a:r>
-          </a:p>
-          <a:p>
-            <a:endParaRPr lang="en-US" dirty="0"/>
-          </a:p>
-        </p:txBody>
-      </p:sp>
-      <p:sp>
-        <p:nvSpPr>
-          <p:cNvPr id="10" name="Content Placeholder 9">
-            <a:extLst>
-              <a:ext uri="{FF2B5EF4-FFF2-40B4-BE49-F238E27FC236}">
-                <a16:creationId xmlns:a16="http://schemas.microsoft.com/office/drawing/2014/main" id="{E135D3F1-0C33-3404-5D49-E70C9D100F2A}"/>
+              <a:t>Portfolio diversification</a:t>
+            </a:r>
+          </a:p>
+        </p:txBody>
+      </p:sp>
+      <p:sp>
+        <p:nvSpPr>
+          <p:cNvPr id="4" name="Content Placeholder 3">
+            <a:extLst>
+              <a:ext uri="{FF2B5EF4-FFF2-40B4-BE49-F238E27FC236}">
+                <a16:creationId xmlns:a16="http://schemas.microsoft.com/office/drawing/2014/main" id="{BE22F651-7ABC-015D-B5C4-622708A64CB1}"/>
               </a:ext>
             </a:extLst>
           </p:cNvPr>
@@ -20894,30 +20874,24 @@
           <a:p>
             <a:r>
               <a:rPr lang="en-US" dirty="0"/>
-              <a:t>Do your research and develop a plan with goals</a:t>
+              <a:t>Develop winning combinations to stay ahead of the market</a:t>
             </a:r>
           </a:p>
           <a:p>
             <a:r>
               <a:rPr lang="en-US" dirty="0"/>
-              <a:t>Diversify your portfolio through coin ownership​</a:t>
+              <a:t>Capitalize on direct ownership of digital coins</a:t>
             </a:r>
           </a:p>
           <a:p>
             <a:r>
               <a:rPr lang="en-US" dirty="0"/>
-              <a:t>Follow the markets closely​</a:t>
+              <a:t>Invest in multiple blockchains​</a:t>
             </a:r>
           </a:p>
           <a:p>
             <a:endParaRPr lang="en-US" dirty="0"/>
           </a:p>
-          <a:p>
-            <a:endParaRPr lang="en-US" dirty="0"/>
-          </a:p>
-          <a:p>
-            <a:endParaRPr lang="en-US" dirty="0"/>
-          </a:p>
         </p:txBody>
       </p:sp>
       <p:sp>
@@ -20925,7 +20899,7 @@
           <p:cNvPr id="5" name="Text Placeholder 4">
             <a:extLst>
               <a:ext uri="{FF2B5EF4-FFF2-40B4-BE49-F238E27FC236}">
-                <a16:creationId xmlns:a16="http://schemas.microsoft.com/office/drawing/2014/main" id="{BE5F7BD8-DA37-58AB-1F45-D0F045DF4B7B}"/>
+                <a16:creationId xmlns:a16="http://schemas.microsoft.com/office/drawing/2014/main" id="{6A1E0F07-3291-4EE2-1286-04C97165BA68}"/>
               </a:ext>
             </a:extLst>
           </p:cNvPr>
@@ -20943,17 +20917,17 @@
           <a:p>
             <a:r>
               <a:rPr lang="en-US" dirty="0"/>
-              <a:t>Minimize risk</a:t>
-            </a:r>
-          </a:p>
-        </p:txBody>
-      </p:sp>
-      <p:sp>
-        <p:nvSpPr>
-          <p:cNvPr id="11" name="Content Placeholder 10">
-            <a:extLst>
-              <a:ext uri="{FF2B5EF4-FFF2-40B4-BE49-F238E27FC236}">
-                <a16:creationId xmlns:a16="http://schemas.microsoft.com/office/drawing/2014/main" id="{724F2AAC-B18D-1D49-15F1-2D69101664AA}"/>
+              <a:t>Short and long-term goals</a:t>
+            </a:r>
+          </a:p>
+        </p:txBody>
+      </p:sp>
+      <p:sp>
+        <p:nvSpPr>
+          <p:cNvPr id="6" name="Content Placeholder 5">
+            <a:extLst>
+              <a:ext uri="{FF2B5EF4-FFF2-40B4-BE49-F238E27FC236}">
+                <a16:creationId xmlns:a16="http://schemas.microsoft.com/office/drawing/2014/main" id="{3DF22CC9-1295-2B21-05A9-68A44E669B8F}"/>
               </a:ext>
             </a:extLst>
           </p:cNvPr>
@@ -20971,105 +20945,35 @@
           <a:p>
             <a:r>
               <a:rPr lang="en-US" dirty="0"/>
-              <a:t>Be cautious of scams and "too good to be true" scenarios</a:t>
+              <a:t>Create an emergency fund</a:t>
             </a:r>
           </a:p>
           <a:p>
             <a:r>
               <a:rPr lang="en-US" dirty="0"/>
-              <a:t>Avoid "all-in" strategies</a:t>
-            </a:r>
-          </a:p>
-          <a:p>
-            <a:endParaRPr lang="en-US" dirty="0"/>
-          </a:p>
-          <a:p>
-            <a:endParaRPr lang="en-US" dirty="0"/>
-          </a:p>
-          <a:p>
-            <a:endParaRPr lang="en-US" dirty="0"/>
-          </a:p>
-        </p:txBody>
-      </p:sp>
-      <p:sp>
-        <p:nvSpPr>
-          <p:cNvPr id="12" name="Text Placeholder 11">
-            <a:extLst>
-              <a:ext uri="{FF2B5EF4-FFF2-40B4-BE49-F238E27FC236}">
-                <a16:creationId xmlns:a16="http://schemas.microsoft.com/office/drawing/2014/main" id="{5E68EFF0-69C3-F9AE-1107-E08A22BCF938}"/>
-              </a:ext>
-            </a:extLst>
-          </p:cNvPr>
-          <p:cNvSpPr>
-            <a:spLocks noGrp="1"/>
-          </p:cNvSpPr>
-          <p:nvPr>
-            <p:ph type="body" sz="quarter" idx="13"/>
-          </p:nvPr>
-        </p:nvSpPr>
-        <p:spPr/>
-        <p:txBody>
-          <a:bodyPr/>
-          <a:lstStyle/>
+              <a:t>Add a second stream of income</a:t>
+            </a:r>
+          </a:p>
           <a:p>
             <a:r>
               <a:rPr lang="en-US" dirty="0"/>
-              <a:t>Utilize resources</a:t>
-            </a:r>
-          </a:p>
-        </p:txBody>
-      </p:sp>
-      <p:sp>
-        <p:nvSpPr>
-          <p:cNvPr id="13" name="Content Placeholder 12">
-            <a:extLst>
-              <a:ext uri="{FF2B5EF4-FFF2-40B4-BE49-F238E27FC236}">
-                <a16:creationId xmlns:a16="http://schemas.microsoft.com/office/drawing/2014/main" id="{4D6980BD-0225-0DD6-3D62-B0B1E983AB52}"/>
-              </a:ext>
-            </a:extLst>
-          </p:cNvPr>
-          <p:cNvSpPr>
-            <a:spLocks noGrp="1"/>
-          </p:cNvSpPr>
-          <p:nvPr>
-            <p:ph sz="quarter" idx="14"/>
-          </p:nvPr>
-        </p:nvSpPr>
-        <p:spPr>
-          <a:xfrm>
-            <a:off x="7973568" y="2743200"/>
-            <a:ext cx="3068680" cy="2578608"/>
-          </a:xfrm>
-        </p:spPr>
-        <p:txBody>
-          <a:bodyPr/>
-          <a:lstStyle/>
+              <a:t>Buy a house</a:t>
+            </a:r>
+          </a:p>
           <a:p>
             <a:r>
               <a:rPr lang="en-US" dirty="0"/>
-              <a:t>Apps and platforms help streamline user experience</a:t>
-            </a:r>
-          </a:p>
-          <a:p>
-            <a:r>
-              <a:rPr lang="en-US" dirty="0"/>
-              <a:t>Seek expert guidance from Krypto Logics team members​</a:t>
-            </a:r>
-          </a:p>
-          <a:p>
-            <a:endParaRPr lang="en-US" dirty="0"/>
-          </a:p>
-          <a:p>
-            <a:endParaRPr lang="en-US" dirty="0"/>
-          </a:p>
-        </p:txBody>
-      </p:sp>
-      <p:sp>
-        <p:nvSpPr>
-          <p:cNvPr id="4" name="Footer Placeholder 3">
-            <a:extLst>
-              <a:ext uri="{FF2B5EF4-FFF2-40B4-BE49-F238E27FC236}">
-                <a16:creationId xmlns:a16="http://schemas.microsoft.com/office/drawing/2014/main" id="{A107ABA7-FC97-4D42-C4BC-897A88CF39AF}"/>
+              <a:t>Supplement retirement fund</a:t>
+            </a:r>
+          </a:p>
+        </p:txBody>
+      </p:sp>
+      <p:sp>
+        <p:nvSpPr>
+          <p:cNvPr id="7" name="Footer Placeholder 6">
+            <a:extLst>
+              <a:ext uri="{FF2B5EF4-FFF2-40B4-BE49-F238E27FC236}">
+                <a16:creationId xmlns:a16="http://schemas.microsoft.com/office/drawing/2014/main" id="{A9F57080-19CA-8BBA-6050-8494551D4615}"/>
               </a:ext>
             </a:extLst>
           </p:cNvPr>
@@ -21096,7 +21000,7 @@
     </p:spTree>
     <p:extLst>
       <p:ext uri="{BB962C8B-B14F-4D97-AF65-F5344CB8AC3E}">
-        <p14:creationId xmlns:p14="http://schemas.microsoft.com/office/powerpoint/2010/main" val="1877080978"/>
+        <p14:creationId xmlns:p14="http://schemas.microsoft.com/office/powerpoint/2010/main" val="765210901"/>
       </p:ext>
     </p:extLst>
   </p:cSld>
@@ -21125,10 +21029,10 @@
       </p:grpSpPr>
       <p:sp>
         <p:nvSpPr>
-          <p:cNvPr id="33" name="Title 32">
-            <a:extLst>
-              <a:ext uri="{FF2B5EF4-FFF2-40B4-BE49-F238E27FC236}">
-                <a16:creationId xmlns:a16="http://schemas.microsoft.com/office/drawing/2014/main" id="{57144164-5503-9D11-4F68-81F4CD378333}"/>
+          <p:cNvPr id="2" name="Title 1">
+            <a:extLst>
+              <a:ext uri="{FF2B5EF4-FFF2-40B4-BE49-F238E27FC236}">
+                <a16:creationId xmlns:a16="http://schemas.microsoft.com/office/drawing/2014/main" id="{189E73D4-535B-6DCC-2268-43A5E9E12C45}"/>
               </a:ext>
             </a:extLst>
           </p:cNvPr>
@@ -21146,17 +21050,17 @@
           <a:p>
             <a:r>
               <a:rPr lang="en-US" dirty="0"/>
-              <a:t>MEET OUR TEAM</a:t>
-            </a:r>
-          </a:p>
-        </p:txBody>
-      </p:sp>
-      <p:sp>
-        <p:nvSpPr>
-          <p:cNvPr id="11" name="Slide Number Placeholder 10">
-            <a:extLst>
-              <a:ext uri="{FF2B5EF4-FFF2-40B4-BE49-F238E27FC236}">
-                <a16:creationId xmlns:a16="http://schemas.microsoft.com/office/drawing/2014/main" id="{9816FD90-6ABD-5EA8-0870-E27733B9F685}"/>
+              <a:t>HOW TO GET THERE</a:t>
+            </a:r>
+          </a:p>
+        </p:txBody>
+      </p:sp>
+      <p:sp>
+        <p:nvSpPr>
+          <p:cNvPr id="6" name="Slide Number Placeholder 5">
+            <a:extLst>
+              <a:ext uri="{FF2B5EF4-FFF2-40B4-BE49-F238E27FC236}">
+                <a16:creationId xmlns:a16="http://schemas.microsoft.com/office/drawing/2014/main" id="{6459FCA3-0124-0FA6-220B-D72E8F8034C8}"/>
               </a:ext>
             </a:extLst>
           </p:cNvPr>
@@ -21164,7 +21068,7 @@
             <a:spLocks noGrp="1"/>
           </p:cNvSpPr>
           <p:nvPr>
-            <p:ph type="sldNum" sz="quarter" idx="11"/>
+            <p:ph type="sldNum" sz="quarter" idx="12"/>
           </p:nvPr>
         </p:nvSpPr>
         <p:spPr/>
@@ -21174,42 +21078,18 @@
           <a:p>
             <a:fld id="{294A09A9-5501-47C1-A89A-A340965A2BE2}" type="slidenum">
               <a:rPr lang="en-US" smtClean="0"/>
-              <a:pPr/>
               <a:t>15</a:t>
             </a:fld>
             <a:endParaRPr lang="en-US" dirty="0"/>
           </a:p>
         </p:txBody>
       </p:sp>
-      <p:pic>
-        <p:nvPicPr>
-          <p:cNvPr id="16" name="Picture Placeholder 15" descr="Team member head shot&#10;">
-            <a:extLst>
-              <a:ext uri="{FF2B5EF4-FFF2-40B4-BE49-F238E27FC236}">
-                <a16:creationId xmlns:a16="http://schemas.microsoft.com/office/drawing/2014/main" id="{675FEA7C-5201-0219-EAA4-51C8A3B8185E}"/>
-              </a:ext>
-            </a:extLst>
-          </p:cNvPr>
-          <p:cNvPicPr>
-            <a:picLocks noGrp="1" noChangeAspect="1"/>
-          </p:cNvPicPr>
-          <p:nvPr>
-            <p:ph type="pic" sz="quarter" idx="20"/>
-          </p:nvPr>
-        </p:nvPicPr>
-        <p:blipFill rotWithShape="1">
-          <a:blip r:embed="rId2"/>
-          <a:srcRect t="45" b="45"/>
-          <a:stretch/>
-        </p:blipFill>
-        <p:spPr/>
-      </p:pic>
       <p:sp>
         <p:nvSpPr>
           <p:cNvPr id="3" name="Text Placeholder 2">
             <a:extLst>
               <a:ext uri="{FF2B5EF4-FFF2-40B4-BE49-F238E27FC236}">
-                <a16:creationId xmlns:a16="http://schemas.microsoft.com/office/drawing/2014/main" id="{CFC225EB-9239-A8F4-48C2-D2E44A245C26}"/>
+                <a16:creationId xmlns:a16="http://schemas.microsoft.com/office/drawing/2014/main" id="{5830852F-3FB7-6D2E-F6AC-1F6B9CAD2158}"/>
               </a:ext>
             </a:extLst>
           </p:cNvPr>
@@ -21217,7 +21097,7 @@
             <a:spLocks noGrp="1"/>
           </p:cNvSpPr>
           <p:nvPr>
-            <p:ph type="body" sz="quarter" idx="12"/>
+            <p:ph type="body" idx="1"/>
           </p:nvPr>
         </p:nvSpPr>
         <p:spPr/>
@@ -21227,17 +21107,140 @@
           <a:p>
             <a:r>
               <a:rPr lang="en-US" dirty="0"/>
-              <a:t>Takuma Hayashi​</a:t>
-            </a:r>
-          </a:p>
-        </p:txBody>
-      </p:sp>
-      <p:sp>
-        <p:nvSpPr>
-          <p:cNvPr id="4" name="Text Placeholder 3">
-            <a:extLst>
-              <a:ext uri="{FF2B5EF4-FFF2-40B4-BE49-F238E27FC236}">
-                <a16:creationId xmlns:a16="http://schemas.microsoft.com/office/drawing/2014/main" id="{BF63BCC4-AF80-8D3B-413B-3F80C74503EE}"/>
+              <a:t>Strategize</a:t>
+            </a:r>
+          </a:p>
+          <a:p>
+            <a:endParaRPr lang="en-US" dirty="0"/>
+          </a:p>
+        </p:txBody>
+      </p:sp>
+      <p:sp>
+        <p:nvSpPr>
+          <p:cNvPr id="10" name="Content Placeholder 9">
+            <a:extLst>
+              <a:ext uri="{FF2B5EF4-FFF2-40B4-BE49-F238E27FC236}">
+                <a16:creationId xmlns:a16="http://schemas.microsoft.com/office/drawing/2014/main" id="{E135D3F1-0C33-3404-5D49-E70C9D100F2A}"/>
+              </a:ext>
+            </a:extLst>
+          </p:cNvPr>
+          <p:cNvSpPr>
+            <a:spLocks noGrp="1"/>
+          </p:cNvSpPr>
+          <p:nvPr>
+            <p:ph sz="half" idx="2"/>
+          </p:nvPr>
+        </p:nvSpPr>
+        <p:spPr/>
+        <p:txBody>
+          <a:bodyPr/>
+          <a:lstStyle/>
+          <a:p>
+            <a:r>
+              <a:rPr lang="en-US" dirty="0"/>
+              <a:t>Do your research and develop a plan with goals</a:t>
+            </a:r>
+          </a:p>
+          <a:p>
+            <a:r>
+              <a:rPr lang="en-US" dirty="0"/>
+              <a:t>Diversify your portfolio through coin ownership​</a:t>
+            </a:r>
+          </a:p>
+          <a:p>
+            <a:r>
+              <a:rPr lang="en-US" dirty="0"/>
+              <a:t>Follow the markets closely​</a:t>
+            </a:r>
+          </a:p>
+          <a:p>
+            <a:endParaRPr lang="en-US" dirty="0"/>
+          </a:p>
+          <a:p>
+            <a:endParaRPr lang="en-US" dirty="0"/>
+          </a:p>
+          <a:p>
+            <a:endParaRPr lang="en-US" dirty="0"/>
+          </a:p>
+        </p:txBody>
+      </p:sp>
+      <p:sp>
+        <p:nvSpPr>
+          <p:cNvPr id="5" name="Text Placeholder 4">
+            <a:extLst>
+              <a:ext uri="{FF2B5EF4-FFF2-40B4-BE49-F238E27FC236}">
+                <a16:creationId xmlns:a16="http://schemas.microsoft.com/office/drawing/2014/main" id="{BE5F7BD8-DA37-58AB-1F45-D0F045DF4B7B}"/>
+              </a:ext>
+            </a:extLst>
+          </p:cNvPr>
+          <p:cNvSpPr>
+            <a:spLocks noGrp="1"/>
+          </p:cNvSpPr>
+          <p:nvPr>
+            <p:ph type="body" sz="quarter" idx="3"/>
+          </p:nvPr>
+        </p:nvSpPr>
+        <p:spPr/>
+        <p:txBody>
+          <a:bodyPr/>
+          <a:lstStyle/>
+          <a:p>
+            <a:r>
+              <a:rPr lang="en-US" dirty="0"/>
+              <a:t>Minimize risk</a:t>
+            </a:r>
+          </a:p>
+        </p:txBody>
+      </p:sp>
+      <p:sp>
+        <p:nvSpPr>
+          <p:cNvPr id="11" name="Content Placeholder 10">
+            <a:extLst>
+              <a:ext uri="{FF2B5EF4-FFF2-40B4-BE49-F238E27FC236}">
+                <a16:creationId xmlns:a16="http://schemas.microsoft.com/office/drawing/2014/main" id="{724F2AAC-B18D-1D49-15F1-2D69101664AA}"/>
+              </a:ext>
+            </a:extLst>
+          </p:cNvPr>
+          <p:cNvSpPr>
+            <a:spLocks noGrp="1"/>
+          </p:cNvSpPr>
+          <p:nvPr>
+            <p:ph sz="quarter" idx="4"/>
+          </p:nvPr>
+        </p:nvSpPr>
+        <p:spPr/>
+        <p:txBody>
+          <a:bodyPr/>
+          <a:lstStyle/>
+          <a:p>
+            <a:r>
+              <a:rPr lang="en-US" dirty="0"/>
+              <a:t>Be cautious of scams and "too good to be true" scenarios</a:t>
+            </a:r>
+          </a:p>
+          <a:p>
+            <a:r>
+              <a:rPr lang="en-US" dirty="0"/>
+              <a:t>Avoid "all-in" strategies</a:t>
+            </a:r>
+          </a:p>
+          <a:p>
+            <a:endParaRPr lang="en-US" dirty="0"/>
+          </a:p>
+          <a:p>
+            <a:endParaRPr lang="en-US" dirty="0"/>
+          </a:p>
+          <a:p>
+            <a:endParaRPr lang="en-US" dirty="0"/>
+          </a:p>
+        </p:txBody>
+      </p:sp>
+      <p:sp>
+        <p:nvSpPr>
+          <p:cNvPr id="12" name="Text Placeholder 11">
+            <a:extLst>
+              <a:ext uri="{FF2B5EF4-FFF2-40B4-BE49-F238E27FC236}">
+                <a16:creationId xmlns:a16="http://schemas.microsoft.com/office/drawing/2014/main" id="{5E68EFF0-69C3-F9AE-1107-E08A22BCF938}"/>
               </a:ext>
             </a:extLst>
           </p:cNvPr>
@@ -21255,40 +21258,17 @@
           <a:p>
             <a:r>
               <a:rPr lang="en-US" dirty="0"/>
-              <a:t>President</a:t>
-            </a:r>
-          </a:p>
-        </p:txBody>
-      </p:sp>
-      <p:pic>
-        <p:nvPicPr>
-          <p:cNvPr id="17" name="Picture Placeholder 16" descr="Team member head shot&#10;">
-            <a:extLst>
-              <a:ext uri="{FF2B5EF4-FFF2-40B4-BE49-F238E27FC236}">
-                <a16:creationId xmlns:a16="http://schemas.microsoft.com/office/drawing/2014/main" id="{8B1E138F-E5F8-7188-0E7F-C61CC315F3CA}"/>
-              </a:ext>
-            </a:extLst>
-          </p:cNvPr>
-          <p:cNvPicPr>
-            <a:picLocks noGrp="1" noChangeAspect="1"/>
-          </p:cNvPicPr>
-          <p:nvPr>
-            <p:ph type="pic" sz="quarter" idx="21"/>
-          </p:nvPr>
-        </p:nvPicPr>
-        <p:blipFill rotWithShape="1">
-          <a:blip r:embed="rId3"/>
-          <a:srcRect/>
-          <a:stretch/>
-        </p:blipFill>
-        <p:spPr/>
-      </p:pic>
-      <p:sp>
-        <p:nvSpPr>
-          <p:cNvPr id="5" name="Text Placeholder 4">
-            <a:extLst>
-              <a:ext uri="{FF2B5EF4-FFF2-40B4-BE49-F238E27FC236}">
-                <a16:creationId xmlns:a16="http://schemas.microsoft.com/office/drawing/2014/main" id="{664EAAE3-47A6-DF8C-088B-8353E312893A}"/>
+              <a:t>Utilize resources</a:t>
+            </a:r>
+          </a:p>
+        </p:txBody>
+      </p:sp>
+      <p:sp>
+        <p:nvSpPr>
+          <p:cNvPr id="13" name="Content Placeholder 12">
+            <a:extLst>
+              <a:ext uri="{FF2B5EF4-FFF2-40B4-BE49-F238E27FC236}">
+                <a16:creationId xmlns:a16="http://schemas.microsoft.com/office/drawing/2014/main" id="{4D6980BD-0225-0DD6-3D62-B0B1E983AB52}"/>
               </a:ext>
             </a:extLst>
           </p:cNvPr>
@@ -21296,27 +21276,44 @@
             <a:spLocks noGrp="1"/>
           </p:cNvSpPr>
           <p:nvPr>
-            <p:ph type="body" sz="quarter" idx="14"/>
+            <p:ph sz="quarter" idx="14"/>
           </p:nvPr>
         </p:nvSpPr>
-        <p:spPr/>
+        <p:spPr>
+          <a:xfrm>
+            <a:off x="7973568" y="2743200"/>
+            <a:ext cx="3068680" cy="2578608"/>
+          </a:xfrm>
+        </p:spPr>
         <p:txBody>
           <a:bodyPr/>
           <a:lstStyle/>
           <a:p>
             <a:r>
               <a:rPr lang="en-US" dirty="0"/>
-              <a:t>Mirjam Nilsson​</a:t>
-            </a:r>
-          </a:p>
-        </p:txBody>
-      </p:sp>
-      <p:sp>
-        <p:nvSpPr>
-          <p:cNvPr id="6" name="Text Placeholder 5">
-            <a:extLst>
-              <a:ext uri="{FF2B5EF4-FFF2-40B4-BE49-F238E27FC236}">
-                <a16:creationId xmlns:a16="http://schemas.microsoft.com/office/drawing/2014/main" id="{8E956031-A8E2-FF88-2769-10FEB7B754A7}"/>
+              <a:t>Apps and platforms help streamline user experience</a:t>
+            </a:r>
+          </a:p>
+          <a:p>
+            <a:r>
+              <a:rPr lang="en-US" dirty="0"/>
+              <a:t>Seek expert guidance from Krypto Logics team members​</a:t>
+            </a:r>
+          </a:p>
+          <a:p>
+            <a:endParaRPr lang="en-US" dirty="0"/>
+          </a:p>
+          <a:p>
+            <a:endParaRPr lang="en-US" dirty="0"/>
+          </a:p>
+        </p:txBody>
+      </p:sp>
+      <p:sp>
+        <p:nvSpPr>
+          <p:cNvPr id="4" name="Footer Placeholder 3">
+            <a:extLst>
+              <a:ext uri="{FF2B5EF4-FFF2-40B4-BE49-F238E27FC236}">
+                <a16:creationId xmlns:a16="http://schemas.microsoft.com/office/drawing/2014/main" id="{A107ABA7-FC97-4D42-C4BC-897A88CF39AF}"/>
               </a:ext>
             </a:extLst>
           </p:cNvPr>
@@ -21324,193 +21321,7 @@
             <a:spLocks noGrp="1"/>
           </p:cNvSpPr>
           <p:nvPr>
-            <p:ph type="body" sz="quarter" idx="15"/>
-          </p:nvPr>
-        </p:nvSpPr>
-        <p:spPr/>
-        <p:txBody>
-          <a:bodyPr/>
-          <a:lstStyle/>
-          <a:p>
-            <a:r>
-              <a:rPr lang="en-US" dirty="0"/>
-              <a:t>Chief Executive Officer</a:t>
-            </a:r>
-          </a:p>
-        </p:txBody>
-      </p:sp>
-      <p:pic>
-        <p:nvPicPr>
-          <p:cNvPr id="18" name="Picture Placeholder 17" descr="Team member head shot&#10;">
-            <a:extLst>
-              <a:ext uri="{FF2B5EF4-FFF2-40B4-BE49-F238E27FC236}">
-                <a16:creationId xmlns:a16="http://schemas.microsoft.com/office/drawing/2014/main" id="{F4608F53-148D-4D2F-6672-8A90E230C68A}"/>
-              </a:ext>
-            </a:extLst>
-          </p:cNvPr>
-          <p:cNvPicPr>
-            <a:picLocks noGrp="1" noChangeAspect="1"/>
-          </p:cNvPicPr>
-          <p:nvPr>
-            <p:ph type="pic" sz="quarter" idx="22"/>
-          </p:nvPr>
-        </p:nvPicPr>
-        <p:blipFill rotWithShape="1">
-          <a:blip r:embed="rId4"/>
-          <a:srcRect/>
-          <a:stretch/>
-        </p:blipFill>
-        <p:spPr/>
-      </p:pic>
-      <p:sp>
-        <p:nvSpPr>
-          <p:cNvPr id="7" name="Text Placeholder 6">
-            <a:extLst>
-              <a:ext uri="{FF2B5EF4-FFF2-40B4-BE49-F238E27FC236}">
-                <a16:creationId xmlns:a16="http://schemas.microsoft.com/office/drawing/2014/main" id="{24AD9EB9-CF0D-0D70-D541-05E1A813D00F}"/>
-              </a:ext>
-            </a:extLst>
-          </p:cNvPr>
-          <p:cNvSpPr>
-            <a:spLocks noGrp="1"/>
-          </p:cNvSpPr>
-          <p:nvPr>
-            <p:ph type="body" sz="quarter" idx="16"/>
-          </p:nvPr>
-        </p:nvSpPr>
-        <p:spPr/>
-        <p:txBody>
-          <a:bodyPr/>
-          <a:lstStyle/>
-          <a:p>
-            <a:r>
-              <a:rPr lang="en-US" dirty="0"/>
-              <a:t>Flora Berggren​</a:t>
-            </a:r>
-          </a:p>
-        </p:txBody>
-      </p:sp>
-      <p:sp>
-        <p:nvSpPr>
-          <p:cNvPr id="8" name="Text Placeholder 7">
-            <a:extLst>
-              <a:ext uri="{FF2B5EF4-FFF2-40B4-BE49-F238E27FC236}">
-                <a16:creationId xmlns:a16="http://schemas.microsoft.com/office/drawing/2014/main" id="{869DE758-CE4B-6136-04AE-85B544CA6F5B}"/>
-              </a:ext>
-            </a:extLst>
-          </p:cNvPr>
-          <p:cNvSpPr>
-            <a:spLocks noGrp="1"/>
-          </p:cNvSpPr>
-          <p:nvPr>
-            <p:ph type="body" sz="quarter" idx="17"/>
-          </p:nvPr>
-        </p:nvSpPr>
-        <p:spPr/>
-        <p:txBody>
-          <a:bodyPr/>
-          <a:lstStyle/>
-          <a:p>
-            <a:r>
-              <a:rPr lang="en-US" dirty="0"/>
-              <a:t>Chief Operations Officer</a:t>
-            </a:r>
-          </a:p>
-        </p:txBody>
-      </p:sp>
-      <p:pic>
-        <p:nvPicPr>
-          <p:cNvPr id="19" name="Picture Placeholder 18" descr="Team member head shot&#10;">
-            <a:extLst>
-              <a:ext uri="{FF2B5EF4-FFF2-40B4-BE49-F238E27FC236}">
-                <a16:creationId xmlns:a16="http://schemas.microsoft.com/office/drawing/2014/main" id="{34C21939-A4DB-0F96-83D8-AD8FFB45359F}"/>
-              </a:ext>
-            </a:extLst>
-          </p:cNvPr>
-          <p:cNvPicPr>
-            <a:picLocks noGrp="1" noChangeAspect="1"/>
-          </p:cNvPicPr>
-          <p:nvPr>
-            <p:ph type="pic" sz="quarter" idx="23"/>
-          </p:nvPr>
-        </p:nvPicPr>
-        <p:blipFill rotWithShape="1">
-          <a:blip r:embed="rId5"/>
-          <a:srcRect l="174" r="174"/>
-          <a:stretch/>
-        </p:blipFill>
-        <p:spPr/>
-      </p:pic>
-      <p:sp>
-        <p:nvSpPr>
-          <p:cNvPr id="9" name="Text Placeholder 8">
-            <a:extLst>
-              <a:ext uri="{FF2B5EF4-FFF2-40B4-BE49-F238E27FC236}">
-                <a16:creationId xmlns:a16="http://schemas.microsoft.com/office/drawing/2014/main" id="{22A99FBE-9850-5F5D-04D9-E3A83DEEA928}"/>
-              </a:ext>
-            </a:extLst>
-          </p:cNvPr>
-          <p:cNvSpPr>
-            <a:spLocks noGrp="1"/>
-          </p:cNvSpPr>
-          <p:nvPr>
-            <p:ph type="body" sz="quarter" idx="18"/>
-          </p:nvPr>
-        </p:nvSpPr>
-        <p:spPr/>
-        <p:txBody>
-          <a:bodyPr/>
-          <a:lstStyle/>
-          <a:p>
-            <a:r>
-              <a:rPr lang="en-US" dirty="0"/>
-              <a:t>Rajesh Santoshi​</a:t>
-            </a:r>
-          </a:p>
-        </p:txBody>
-      </p:sp>
-      <p:sp>
-        <p:nvSpPr>
-          <p:cNvPr id="10" name="Text Placeholder 9">
-            <a:extLst>
-              <a:ext uri="{FF2B5EF4-FFF2-40B4-BE49-F238E27FC236}">
-                <a16:creationId xmlns:a16="http://schemas.microsoft.com/office/drawing/2014/main" id="{19AAB49A-6730-B2CF-9537-FF9551D4EB80}"/>
-              </a:ext>
-            </a:extLst>
-          </p:cNvPr>
-          <p:cNvSpPr>
-            <a:spLocks noGrp="1"/>
-          </p:cNvSpPr>
-          <p:nvPr>
-            <p:ph type="body" sz="quarter" idx="19"/>
-          </p:nvPr>
-        </p:nvSpPr>
-        <p:spPr/>
-        <p:txBody>
-          <a:bodyPr/>
-          <a:lstStyle/>
-          <a:p>
-            <a:r>
-              <a:rPr lang="en-US" dirty="0"/>
-              <a:t>VP Marketing</a:t>
-            </a:r>
-          </a:p>
-        </p:txBody>
-      </p:sp>
-      <p:sp>
-        <p:nvSpPr>
-          <p:cNvPr id="2" name="Footer Placeholder 1">
-            <a:extLst>
-              <a:ext uri="{FF2B5EF4-FFF2-40B4-BE49-F238E27FC236}">
-                <a16:creationId xmlns:a16="http://schemas.microsoft.com/office/drawing/2014/main" id="{23DFDBA5-4CFB-88D0-C90E-69D151F5BFCA}"/>
-              </a:ext>
-            </a:extLst>
-          </p:cNvPr>
-          <p:cNvSpPr>
-            <a:spLocks noGrp="1"/>
-          </p:cNvSpPr>
-          <p:nvPr>
-            <p:ph type="ftr" sz="quarter" idx="10"/>
+            <p:ph type="ftr" sz="quarter" idx="11"/>
           </p:nvPr>
         </p:nvSpPr>
         <p:spPr/>
@@ -21529,7 +21340,7 @@
     </p:spTree>
     <p:extLst>
       <p:ext uri="{BB962C8B-B14F-4D97-AF65-F5344CB8AC3E}">
-        <p14:creationId xmlns:p14="http://schemas.microsoft.com/office/powerpoint/2010/main" val="1579562137"/>
+        <p14:creationId xmlns:p14="http://schemas.microsoft.com/office/powerpoint/2010/main" val="1877080978"/>
       </p:ext>
     </p:extLst>
   </p:cSld>
@@ -21579,7 +21390,7 @@
           <a:p>
             <a:r>
               <a:rPr lang="en-US" dirty="0"/>
-              <a:t>MEET OUR EXTENDED TEAM</a:t>
+              <a:t>MEET OUR TEAM</a:t>
             </a:r>
           </a:p>
         </p:txBody>
@@ -21589,7 +21400,7 @@
           <p:cNvPr id="11" name="Slide Number Placeholder 10">
             <a:extLst>
               <a:ext uri="{FF2B5EF4-FFF2-40B4-BE49-F238E27FC236}">
-                <a16:creationId xmlns:a16="http://schemas.microsoft.com/office/drawing/2014/main" id="{F02CA379-5C0D-5E21-B070-E880A01BB9A7}"/>
+                <a16:creationId xmlns:a16="http://schemas.microsoft.com/office/drawing/2014/main" id="{9816FD90-6ABD-5EA8-0870-E27733B9F685}"/>
               </a:ext>
             </a:extLst>
           </p:cNvPr>
@@ -21632,7 +21443,7 @@
         </p:nvPicPr>
         <p:blipFill rotWithShape="1">
           <a:blip r:embed="rId2"/>
-          <a:srcRect/>
+          <a:srcRect t="45" b="45"/>
           <a:stretch/>
         </p:blipFill>
         <p:spPr/>
@@ -21695,10 +21506,10 @@
       </p:sp>
       <p:pic>
         <p:nvPicPr>
-          <p:cNvPr id="139" name="Picture Placeholder 138" descr="Team member head shot&#10;">
-            <a:extLst>
-              <a:ext uri="{FF2B5EF4-FFF2-40B4-BE49-F238E27FC236}">
-                <a16:creationId xmlns:a16="http://schemas.microsoft.com/office/drawing/2014/main" id="{40505ADD-6A41-FEA2-952B-68B8652C37DD}"/>
+          <p:cNvPr id="17" name="Picture Placeholder 16" descr="Team member head shot&#10;">
+            <a:extLst>
+              <a:ext uri="{FF2B5EF4-FFF2-40B4-BE49-F238E27FC236}">
+                <a16:creationId xmlns:a16="http://schemas.microsoft.com/office/drawing/2014/main" id="{8B1E138F-E5F8-7188-0E7F-C61CC315F3CA}"/>
               </a:ext>
             </a:extLst>
           </p:cNvPr>
@@ -21706,7 +21517,7 @@
             <a:picLocks noGrp="1" noChangeAspect="1"/>
           </p:cNvPicPr>
           <p:nvPr>
-            <p:ph type="pic" sz="quarter" idx="24"/>
+            <p:ph type="pic" sz="quarter" idx="21"/>
           </p:nvPr>
         </p:nvPicPr>
         <p:blipFill rotWithShape="1">
@@ -21718,85 +21529,6 @@
       </p:pic>
       <p:sp>
         <p:nvSpPr>
-          <p:cNvPr id="131" name="Text Placeholder 130">
-            <a:extLst>
-              <a:ext uri="{FF2B5EF4-FFF2-40B4-BE49-F238E27FC236}">
-                <a16:creationId xmlns:a16="http://schemas.microsoft.com/office/drawing/2014/main" id="{29B0FDD4-0C9D-9FEE-0CB5-5341E9A67D6A}"/>
-              </a:ext>
-            </a:extLst>
-          </p:cNvPr>
-          <p:cNvSpPr>
-            <a:spLocks noGrp="1"/>
-          </p:cNvSpPr>
-          <p:nvPr>
-            <p:ph type="body" sz="quarter" idx="28"/>
-          </p:nvPr>
-        </p:nvSpPr>
-        <p:spPr/>
-        <p:txBody>
-          <a:bodyPr/>
-          <a:lstStyle/>
-          <a:p>
-            <a:r>
-              <a:rPr lang="en-US" dirty="0"/>
-              <a:t>Graham Barnes</a:t>
-            </a:r>
-          </a:p>
-        </p:txBody>
-      </p:sp>
-      <p:sp>
-        <p:nvSpPr>
-          <p:cNvPr id="132" name="Text Placeholder 131">
-            <a:extLst>
-              <a:ext uri="{FF2B5EF4-FFF2-40B4-BE49-F238E27FC236}">
-                <a16:creationId xmlns:a16="http://schemas.microsoft.com/office/drawing/2014/main" id="{0E6B790C-A9A2-BF33-11DC-2AA2B45ADDDE}"/>
-              </a:ext>
-            </a:extLst>
-          </p:cNvPr>
-          <p:cNvSpPr>
-            <a:spLocks noGrp="1"/>
-          </p:cNvSpPr>
-          <p:nvPr>
-            <p:ph type="body" sz="quarter" idx="29"/>
-          </p:nvPr>
-        </p:nvSpPr>
-        <p:spPr/>
-        <p:txBody>
-          <a:bodyPr/>
-          <a:lstStyle/>
-          <a:p>
-            <a:r>
-              <a:rPr lang="en-US" dirty="0"/>
-              <a:t>VP Product</a:t>
-            </a:r>
-          </a:p>
-        </p:txBody>
-      </p:sp>
-      <p:pic>
-        <p:nvPicPr>
-          <p:cNvPr id="17" name="Picture Placeholder 16" descr="Team member head shot&#10;">
-            <a:extLst>
-              <a:ext uri="{FF2B5EF4-FFF2-40B4-BE49-F238E27FC236}">
-                <a16:creationId xmlns:a16="http://schemas.microsoft.com/office/drawing/2014/main" id="{8B1E138F-E5F8-7188-0E7F-C61CC315F3CA}"/>
-              </a:ext>
-            </a:extLst>
-          </p:cNvPr>
-          <p:cNvPicPr>
-            <a:picLocks noGrp="1" noChangeAspect="1"/>
-          </p:cNvPicPr>
-          <p:nvPr>
-            <p:ph type="pic" sz="quarter" idx="21"/>
-          </p:nvPr>
-        </p:nvPicPr>
-        <p:blipFill rotWithShape="1">
-          <a:blip r:embed="rId4"/>
-          <a:srcRect t="75" b="75"/>
-          <a:stretch/>
-        </p:blipFill>
-        <p:spPr/>
-      </p:pic>
-      <p:sp>
-        <p:nvSpPr>
           <p:cNvPr id="5" name="Text Placeholder 4">
             <a:extLst>
               <a:ext uri="{FF2B5EF4-FFF2-40B4-BE49-F238E27FC236}">
@@ -21847,85 +21579,6 @@
             <a:r>
               <a:rPr lang="en-US" dirty="0"/>
               <a:t>Chief Executive Officer</a:t>
-            </a:r>
-          </a:p>
-        </p:txBody>
-      </p:sp>
-      <p:pic>
-        <p:nvPicPr>
-          <p:cNvPr id="140" name="Picture Placeholder 139" descr="Team member head shot&#10;">
-            <a:extLst>
-              <a:ext uri="{FF2B5EF4-FFF2-40B4-BE49-F238E27FC236}">
-                <a16:creationId xmlns:a16="http://schemas.microsoft.com/office/drawing/2014/main" id="{DAE46AC2-4E04-644A-503C-188DFB2C3463}"/>
-              </a:ext>
-            </a:extLst>
-          </p:cNvPr>
-          <p:cNvPicPr>
-            <a:picLocks noGrp="1" noChangeAspect="1"/>
-          </p:cNvPicPr>
-          <p:nvPr>
-            <p:ph type="pic" sz="quarter" idx="25"/>
-          </p:nvPr>
-        </p:nvPicPr>
-        <p:blipFill rotWithShape="1">
-          <a:blip r:embed="rId5"/>
-          <a:srcRect t="75" b="75"/>
-          <a:stretch/>
-        </p:blipFill>
-        <p:spPr/>
-      </p:pic>
-      <p:sp>
-        <p:nvSpPr>
-          <p:cNvPr id="133" name="Text Placeholder 132">
-            <a:extLst>
-              <a:ext uri="{FF2B5EF4-FFF2-40B4-BE49-F238E27FC236}">
-                <a16:creationId xmlns:a16="http://schemas.microsoft.com/office/drawing/2014/main" id="{F73428BF-556B-39B3-A2E1-A3479B7A4368}"/>
-              </a:ext>
-            </a:extLst>
-          </p:cNvPr>
-          <p:cNvSpPr>
-            <a:spLocks noGrp="1"/>
-          </p:cNvSpPr>
-          <p:nvPr>
-            <p:ph type="body" sz="quarter" idx="30"/>
-          </p:nvPr>
-        </p:nvSpPr>
-        <p:spPr/>
-        <p:txBody>
-          <a:bodyPr/>
-          <a:lstStyle/>
-          <a:p>
-            <a:r>
-              <a:rPr lang="en-US" dirty="0"/>
-              <a:t>Rowan Murphy</a:t>
-            </a:r>
-          </a:p>
-        </p:txBody>
-      </p:sp>
-      <p:sp>
-        <p:nvSpPr>
-          <p:cNvPr id="134" name="Text Placeholder 133">
-            <a:extLst>
-              <a:ext uri="{FF2B5EF4-FFF2-40B4-BE49-F238E27FC236}">
-                <a16:creationId xmlns:a16="http://schemas.microsoft.com/office/drawing/2014/main" id="{3519B91A-73EE-B2B8-4875-2C6A0113D333}"/>
-              </a:ext>
-            </a:extLst>
-          </p:cNvPr>
-          <p:cNvSpPr>
-            <a:spLocks noGrp="1"/>
-          </p:cNvSpPr>
-          <p:nvPr>
-            <p:ph type="body" sz="quarter" idx="31"/>
-          </p:nvPr>
-        </p:nvSpPr>
-        <p:spPr/>
-        <p:txBody>
-          <a:bodyPr/>
-          <a:lstStyle/>
-          <a:p>
-            <a:r>
-              <a:rPr lang="en-US" dirty="0"/>
-              <a:t>SEO Strategist</a:t>
             </a:r>
           </a:p>
         </p:txBody>
@@ -21947,8 +21600,8 @@
           </p:nvPr>
         </p:nvPicPr>
         <p:blipFill rotWithShape="1">
-          <a:blip r:embed="rId6"/>
-          <a:srcRect t="75" b="75"/>
+          <a:blip r:embed="rId4"/>
+          <a:srcRect/>
           <a:stretch/>
         </p:blipFill>
         <p:spPr/>
@@ -22005,85 +21658,6 @@
             <a:r>
               <a:rPr lang="en-US" dirty="0"/>
               <a:t>Chief Operations Officer</a:t>
-            </a:r>
-          </a:p>
-        </p:txBody>
-      </p:sp>
-      <p:pic>
-        <p:nvPicPr>
-          <p:cNvPr id="141" name="Picture Placeholder 140" descr="Team member head shot&#10;">
-            <a:extLst>
-              <a:ext uri="{FF2B5EF4-FFF2-40B4-BE49-F238E27FC236}">
-                <a16:creationId xmlns:a16="http://schemas.microsoft.com/office/drawing/2014/main" id="{105B8828-F685-63DD-6F9F-62F8A8DA6D06}"/>
-              </a:ext>
-            </a:extLst>
-          </p:cNvPr>
-          <p:cNvPicPr>
-            <a:picLocks noGrp="1" noChangeAspect="1"/>
-          </p:cNvPicPr>
-          <p:nvPr>
-            <p:ph type="pic" sz="quarter" idx="26"/>
-          </p:nvPr>
-        </p:nvPicPr>
-        <p:blipFill rotWithShape="1">
-          <a:blip r:embed="rId7"/>
-          <a:srcRect l="291" r="291"/>
-          <a:stretch/>
-        </p:blipFill>
-        <p:spPr/>
-      </p:pic>
-      <p:sp>
-        <p:nvSpPr>
-          <p:cNvPr id="135" name="Text Placeholder 134">
-            <a:extLst>
-              <a:ext uri="{FF2B5EF4-FFF2-40B4-BE49-F238E27FC236}">
-                <a16:creationId xmlns:a16="http://schemas.microsoft.com/office/drawing/2014/main" id="{747BF9B3-DF8F-789C-9AF6-94771E1AF5FE}"/>
-              </a:ext>
-            </a:extLst>
-          </p:cNvPr>
-          <p:cNvSpPr>
-            <a:spLocks noGrp="1"/>
-          </p:cNvSpPr>
-          <p:nvPr>
-            <p:ph type="body" sz="quarter" idx="32"/>
-          </p:nvPr>
-        </p:nvSpPr>
-        <p:spPr/>
-        <p:txBody>
-          <a:bodyPr/>
-          <a:lstStyle/>
-          <a:p>
-            <a:r>
-              <a:rPr lang="en-US" dirty="0"/>
-              <a:t>Elizabeth Moore</a:t>
-            </a:r>
-          </a:p>
-        </p:txBody>
-      </p:sp>
-      <p:sp>
-        <p:nvSpPr>
-          <p:cNvPr id="136" name="Text Placeholder 135">
-            <a:extLst>
-              <a:ext uri="{FF2B5EF4-FFF2-40B4-BE49-F238E27FC236}">
-                <a16:creationId xmlns:a16="http://schemas.microsoft.com/office/drawing/2014/main" id="{A2297428-B6BC-F5B5-C82D-3BC4408EC576}"/>
-              </a:ext>
-            </a:extLst>
-          </p:cNvPr>
-          <p:cNvSpPr>
-            <a:spLocks noGrp="1"/>
-          </p:cNvSpPr>
-          <p:nvPr>
-            <p:ph type="body" sz="quarter" idx="33"/>
-          </p:nvPr>
-        </p:nvSpPr>
-        <p:spPr/>
-        <p:txBody>
-          <a:bodyPr/>
-          <a:lstStyle/>
-          <a:p>
-            <a:r>
-              <a:rPr lang="en-US" dirty="0"/>
-              <a:t>Product Designer</a:t>
             </a:r>
           </a:p>
         </p:txBody>
@@ -22105,8 +21679,8 @@
           </p:nvPr>
         </p:nvPicPr>
         <p:blipFill rotWithShape="1">
-          <a:blip r:embed="rId8"/>
-          <a:srcRect l="99" r="99"/>
+          <a:blip r:embed="rId5"/>
+          <a:srcRect l="174" r="174"/>
           <a:stretch/>
         </p:blipFill>
         <p:spPr/>
@@ -22167,91 +21741,12 @@
           </a:p>
         </p:txBody>
       </p:sp>
-      <p:pic>
-        <p:nvPicPr>
-          <p:cNvPr id="142" name="Picture Placeholder 141" descr="Team member head shot&#10;">
-            <a:extLst>
-              <a:ext uri="{FF2B5EF4-FFF2-40B4-BE49-F238E27FC236}">
-                <a16:creationId xmlns:a16="http://schemas.microsoft.com/office/drawing/2014/main" id="{E6A455C2-70F1-6DAE-26E6-C7AAE0CFA814}"/>
-              </a:ext>
-            </a:extLst>
-          </p:cNvPr>
-          <p:cNvPicPr>
-            <a:picLocks noGrp="1" noChangeAspect="1"/>
-          </p:cNvPicPr>
-          <p:nvPr>
-            <p:ph type="pic" sz="quarter" idx="27"/>
-          </p:nvPr>
-        </p:nvPicPr>
-        <p:blipFill rotWithShape="1">
-          <a:blip r:embed="rId9"/>
-          <a:srcRect l="291" r="291"/>
-          <a:stretch/>
-        </p:blipFill>
-        <p:spPr/>
-      </p:pic>
-      <p:sp>
-        <p:nvSpPr>
-          <p:cNvPr id="137" name="Text Placeholder 136">
-            <a:extLst>
-              <a:ext uri="{FF2B5EF4-FFF2-40B4-BE49-F238E27FC236}">
-                <a16:creationId xmlns:a16="http://schemas.microsoft.com/office/drawing/2014/main" id="{651B92A3-1DB6-8A7F-09B7-C7969D53FB3A}"/>
-              </a:ext>
-            </a:extLst>
-          </p:cNvPr>
-          <p:cNvSpPr>
-            <a:spLocks noGrp="1"/>
-          </p:cNvSpPr>
-          <p:nvPr>
-            <p:ph type="body" sz="quarter" idx="34"/>
-          </p:nvPr>
-        </p:nvSpPr>
-        <p:spPr/>
-        <p:txBody>
-          <a:bodyPr/>
-          <a:lstStyle/>
-          <a:p>
-            <a:r>
-              <a:rPr lang="en-US" dirty="0"/>
-              <a:t>Robin Kline</a:t>
-            </a:r>
-          </a:p>
-        </p:txBody>
-      </p:sp>
-      <p:sp>
-        <p:nvSpPr>
-          <p:cNvPr id="138" name="Text Placeholder 137">
-            <a:extLst>
-              <a:ext uri="{FF2B5EF4-FFF2-40B4-BE49-F238E27FC236}">
-                <a16:creationId xmlns:a16="http://schemas.microsoft.com/office/drawing/2014/main" id="{462B07C6-5B4D-AB97-3376-C4F8BFC2C143}"/>
-              </a:ext>
-            </a:extLst>
-          </p:cNvPr>
-          <p:cNvSpPr>
-            <a:spLocks noGrp="1"/>
-          </p:cNvSpPr>
-          <p:nvPr>
-            <p:ph type="body" sz="quarter" idx="35"/>
-          </p:nvPr>
-        </p:nvSpPr>
-        <p:spPr/>
-        <p:txBody>
-          <a:bodyPr/>
-          <a:lstStyle/>
-          <a:p>
-            <a:r>
-              <a:rPr lang="en-US" dirty="0"/>
-              <a:t>Content Developer</a:t>
-            </a:r>
-          </a:p>
-        </p:txBody>
-      </p:sp>
       <p:sp>
         <p:nvSpPr>
           <p:cNvPr id="2" name="Footer Placeholder 1">
             <a:extLst>
               <a:ext uri="{FF2B5EF4-FFF2-40B4-BE49-F238E27FC236}">
-                <a16:creationId xmlns:a16="http://schemas.microsoft.com/office/drawing/2014/main" id="{E0C0AB0C-E0B6-7838-D865-2AB638122FD9}"/>
+                <a16:creationId xmlns:a16="http://schemas.microsoft.com/office/drawing/2014/main" id="{23DFDBA5-4CFB-88D0-C90E-69D151F5BFCA}"/>
               </a:ext>
             </a:extLst>
           </p:cNvPr>
@@ -22278,7 +21773,7 @@
     </p:spTree>
     <p:extLst>
       <p:ext uri="{BB962C8B-B14F-4D97-AF65-F5344CB8AC3E}">
-        <p14:creationId xmlns:p14="http://schemas.microsoft.com/office/powerpoint/2010/main" val="840605972"/>
+        <p14:creationId xmlns:p14="http://schemas.microsoft.com/office/powerpoint/2010/main" val="1579562137"/>
       </p:ext>
     </p:extLst>
   </p:cSld>
@@ -22307,6 +21802,755 @@
       </p:grpSpPr>
       <p:sp>
         <p:nvSpPr>
+          <p:cNvPr id="33" name="Title 32">
+            <a:extLst>
+              <a:ext uri="{FF2B5EF4-FFF2-40B4-BE49-F238E27FC236}">
+                <a16:creationId xmlns:a16="http://schemas.microsoft.com/office/drawing/2014/main" id="{57144164-5503-9D11-4F68-81F4CD378333}"/>
+              </a:ext>
+            </a:extLst>
+          </p:cNvPr>
+          <p:cNvSpPr>
+            <a:spLocks noGrp="1"/>
+          </p:cNvSpPr>
+          <p:nvPr>
+            <p:ph type="title"/>
+          </p:nvPr>
+        </p:nvSpPr>
+        <p:spPr/>
+        <p:txBody>
+          <a:bodyPr/>
+          <a:lstStyle/>
+          <a:p>
+            <a:r>
+              <a:rPr lang="en-US" dirty="0"/>
+              <a:t>MEET OUR EXTENDED TEAM</a:t>
+            </a:r>
+          </a:p>
+        </p:txBody>
+      </p:sp>
+      <p:sp>
+        <p:nvSpPr>
+          <p:cNvPr id="11" name="Slide Number Placeholder 10">
+            <a:extLst>
+              <a:ext uri="{FF2B5EF4-FFF2-40B4-BE49-F238E27FC236}">
+                <a16:creationId xmlns:a16="http://schemas.microsoft.com/office/drawing/2014/main" id="{F02CA379-5C0D-5E21-B070-E880A01BB9A7}"/>
+              </a:ext>
+            </a:extLst>
+          </p:cNvPr>
+          <p:cNvSpPr>
+            <a:spLocks noGrp="1"/>
+          </p:cNvSpPr>
+          <p:nvPr>
+            <p:ph type="sldNum" sz="quarter" idx="11"/>
+          </p:nvPr>
+        </p:nvSpPr>
+        <p:spPr/>
+        <p:txBody>
+          <a:bodyPr/>
+          <a:lstStyle/>
+          <a:p>
+            <a:fld id="{294A09A9-5501-47C1-A89A-A340965A2BE2}" type="slidenum">
+              <a:rPr lang="en-US" smtClean="0"/>
+              <a:pPr/>
+              <a:t>17</a:t>
+            </a:fld>
+            <a:endParaRPr lang="en-US" dirty="0"/>
+          </a:p>
+        </p:txBody>
+      </p:sp>
+      <p:pic>
+        <p:nvPicPr>
+          <p:cNvPr id="16" name="Picture Placeholder 15" descr="Team member head shot&#10;">
+            <a:extLst>
+              <a:ext uri="{FF2B5EF4-FFF2-40B4-BE49-F238E27FC236}">
+                <a16:creationId xmlns:a16="http://schemas.microsoft.com/office/drawing/2014/main" id="{675FEA7C-5201-0219-EAA4-51C8A3B8185E}"/>
+              </a:ext>
+            </a:extLst>
+          </p:cNvPr>
+          <p:cNvPicPr>
+            <a:picLocks noGrp="1" noChangeAspect="1"/>
+          </p:cNvPicPr>
+          <p:nvPr>
+            <p:ph type="pic" sz="quarter" idx="20"/>
+          </p:nvPr>
+        </p:nvPicPr>
+        <p:blipFill rotWithShape="1">
+          <a:blip r:embed="rId2"/>
+          <a:srcRect/>
+          <a:stretch/>
+        </p:blipFill>
+        <p:spPr/>
+      </p:pic>
+      <p:sp>
+        <p:nvSpPr>
+          <p:cNvPr id="3" name="Text Placeholder 2">
+            <a:extLst>
+              <a:ext uri="{FF2B5EF4-FFF2-40B4-BE49-F238E27FC236}">
+                <a16:creationId xmlns:a16="http://schemas.microsoft.com/office/drawing/2014/main" id="{CFC225EB-9239-A8F4-48C2-D2E44A245C26}"/>
+              </a:ext>
+            </a:extLst>
+          </p:cNvPr>
+          <p:cNvSpPr>
+            <a:spLocks noGrp="1"/>
+          </p:cNvSpPr>
+          <p:nvPr>
+            <p:ph type="body" sz="quarter" idx="12"/>
+          </p:nvPr>
+        </p:nvSpPr>
+        <p:spPr/>
+        <p:txBody>
+          <a:bodyPr/>
+          <a:lstStyle/>
+          <a:p>
+            <a:r>
+              <a:rPr lang="en-US" dirty="0"/>
+              <a:t>Takuma Hayashi​</a:t>
+            </a:r>
+          </a:p>
+        </p:txBody>
+      </p:sp>
+      <p:sp>
+        <p:nvSpPr>
+          <p:cNvPr id="4" name="Text Placeholder 3">
+            <a:extLst>
+              <a:ext uri="{FF2B5EF4-FFF2-40B4-BE49-F238E27FC236}">
+                <a16:creationId xmlns:a16="http://schemas.microsoft.com/office/drawing/2014/main" id="{BF63BCC4-AF80-8D3B-413B-3F80C74503EE}"/>
+              </a:ext>
+            </a:extLst>
+          </p:cNvPr>
+          <p:cNvSpPr>
+            <a:spLocks noGrp="1"/>
+          </p:cNvSpPr>
+          <p:nvPr>
+            <p:ph type="body" sz="quarter" idx="13"/>
+          </p:nvPr>
+        </p:nvSpPr>
+        <p:spPr/>
+        <p:txBody>
+          <a:bodyPr/>
+          <a:lstStyle/>
+          <a:p>
+            <a:r>
+              <a:rPr lang="en-US" dirty="0"/>
+              <a:t>President</a:t>
+            </a:r>
+          </a:p>
+        </p:txBody>
+      </p:sp>
+      <p:pic>
+        <p:nvPicPr>
+          <p:cNvPr id="139" name="Picture Placeholder 138" descr="Team member head shot&#10;">
+            <a:extLst>
+              <a:ext uri="{FF2B5EF4-FFF2-40B4-BE49-F238E27FC236}">
+                <a16:creationId xmlns:a16="http://schemas.microsoft.com/office/drawing/2014/main" id="{40505ADD-6A41-FEA2-952B-68B8652C37DD}"/>
+              </a:ext>
+            </a:extLst>
+          </p:cNvPr>
+          <p:cNvPicPr>
+            <a:picLocks noGrp="1" noChangeAspect="1"/>
+          </p:cNvPicPr>
+          <p:nvPr>
+            <p:ph type="pic" sz="quarter" idx="24"/>
+          </p:nvPr>
+        </p:nvPicPr>
+        <p:blipFill rotWithShape="1">
+          <a:blip r:embed="rId3"/>
+          <a:srcRect/>
+          <a:stretch/>
+        </p:blipFill>
+        <p:spPr/>
+      </p:pic>
+      <p:sp>
+        <p:nvSpPr>
+          <p:cNvPr id="131" name="Text Placeholder 130">
+            <a:extLst>
+              <a:ext uri="{FF2B5EF4-FFF2-40B4-BE49-F238E27FC236}">
+                <a16:creationId xmlns:a16="http://schemas.microsoft.com/office/drawing/2014/main" id="{29B0FDD4-0C9D-9FEE-0CB5-5341E9A67D6A}"/>
+              </a:ext>
+            </a:extLst>
+          </p:cNvPr>
+          <p:cNvSpPr>
+            <a:spLocks noGrp="1"/>
+          </p:cNvSpPr>
+          <p:nvPr>
+            <p:ph type="body" sz="quarter" idx="28"/>
+          </p:nvPr>
+        </p:nvSpPr>
+        <p:spPr/>
+        <p:txBody>
+          <a:bodyPr/>
+          <a:lstStyle/>
+          <a:p>
+            <a:r>
+              <a:rPr lang="en-US" dirty="0"/>
+              <a:t>Graham Barnes</a:t>
+            </a:r>
+          </a:p>
+        </p:txBody>
+      </p:sp>
+      <p:sp>
+        <p:nvSpPr>
+          <p:cNvPr id="132" name="Text Placeholder 131">
+            <a:extLst>
+              <a:ext uri="{FF2B5EF4-FFF2-40B4-BE49-F238E27FC236}">
+                <a16:creationId xmlns:a16="http://schemas.microsoft.com/office/drawing/2014/main" id="{0E6B790C-A9A2-BF33-11DC-2AA2B45ADDDE}"/>
+              </a:ext>
+            </a:extLst>
+          </p:cNvPr>
+          <p:cNvSpPr>
+            <a:spLocks noGrp="1"/>
+          </p:cNvSpPr>
+          <p:nvPr>
+            <p:ph type="body" sz="quarter" idx="29"/>
+          </p:nvPr>
+        </p:nvSpPr>
+        <p:spPr/>
+        <p:txBody>
+          <a:bodyPr/>
+          <a:lstStyle/>
+          <a:p>
+            <a:r>
+              <a:rPr lang="en-US" dirty="0"/>
+              <a:t>VP Product</a:t>
+            </a:r>
+          </a:p>
+        </p:txBody>
+      </p:sp>
+      <p:pic>
+        <p:nvPicPr>
+          <p:cNvPr id="17" name="Picture Placeholder 16" descr="Team member head shot&#10;">
+            <a:extLst>
+              <a:ext uri="{FF2B5EF4-FFF2-40B4-BE49-F238E27FC236}">
+                <a16:creationId xmlns:a16="http://schemas.microsoft.com/office/drawing/2014/main" id="{8B1E138F-E5F8-7188-0E7F-C61CC315F3CA}"/>
+              </a:ext>
+            </a:extLst>
+          </p:cNvPr>
+          <p:cNvPicPr>
+            <a:picLocks noGrp="1" noChangeAspect="1"/>
+          </p:cNvPicPr>
+          <p:nvPr>
+            <p:ph type="pic" sz="quarter" idx="21"/>
+          </p:nvPr>
+        </p:nvPicPr>
+        <p:blipFill rotWithShape="1">
+          <a:blip r:embed="rId4"/>
+          <a:srcRect t="75" b="75"/>
+          <a:stretch/>
+        </p:blipFill>
+        <p:spPr/>
+      </p:pic>
+      <p:sp>
+        <p:nvSpPr>
+          <p:cNvPr id="5" name="Text Placeholder 4">
+            <a:extLst>
+              <a:ext uri="{FF2B5EF4-FFF2-40B4-BE49-F238E27FC236}">
+                <a16:creationId xmlns:a16="http://schemas.microsoft.com/office/drawing/2014/main" id="{664EAAE3-47A6-DF8C-088B-8353E312893A}"/>
+              </a:ext>
+            </a:extLst>
+          </p:cNvPr>
+          <p:cNvSpPr>
+            <a:spLocks noGrp="1"/>
+          </p:cNvSpPr>
+          <p:nvPr>
+            <p:ph type="body" sz="quarter" idx="14"/>
+          </p:nvPr>
+        </p:nvSpPr>
+        <p:spPr/>
+        <p:txBody>
+          <a:bodyPr/>
+          <a:lstStyle/>
+          <a:p>
+            <a:r>
+              <a:rPr lang="en-US" dirty="0"/>
+              <a:t>Mirjam Nilsson​</a:t>
+            </a:r>
+          </a:p>
+        </p:txBody>
+      </p:sp>
+      <p:sp>
+        <p:nvSpPr>
+          <p:cNvPr id="6" name="Text Placeholder 5">
+            <a:extLst>
+              <a:ext uri="{FF2B5EF4-FFF2-40B4-BE49-F238E27FC236}">
+                <a16:creationId xmlns:a16="http://schemas.microsoft.com/office/drawing/2014/main" id="{8E956031-A8E2-FF88-2769-10FEB7B754A7}"/>
+              </a:ext>
+            </a:extLst>
+          </p:cNvPr>
+          <p:cNvSpPr>
+            <a:spLocks noGrp="1"/>
+          </p:cNvSpPr>
+          <p:nvPr>
+            <p:ph type="body" sz="quarter" idx="15"/>
+          </p:nvPr>
+        </p:nvSpPr>
+        <p:spPr/>
+        <p:txBody>
+          <a:bodyPr/>
+          <a:lstStyle/>
+          <a:p>
+            <a:r>
+              <a:rPr lang="en-US" dirty="0"/>
+              <a:t>Chief Executive Officer</a:t>
+            </a:r>
+          </a:p>
+        </p:txBody>
+      </p:sp>
+      <p:pic>
+        <p:nvPicPr>
+          <p:cNvPr id="140" name="Picture Placeholder 139" descr="Team member head shot&#10;">
+            <a:extLst>
+              <a:ext uri="{FF2B5EF4-FFF2-40B4-BE49-F238E27FC236}">
+                <a16:creationId xmlns:a16="http://schemas.microsoft.com/office/drawing/2014/main" id="{DAE46AC2-4E04-644A-503C-188DFB2C3463}"/>
+              </a:ext>
+            </a:extLst>
+          </p:cNvPr>
+          <p:cNvPicPr>
+            <a:picLocks noGrp="1" noChangeAspect="1"/>
+          </p:cNvPicPr>
+          <p:nvPr>
+            <p:ph type="pic" sz="quarter" idx="25"/>
+          </p:nvPr>
+        </p:nvPicPr>
+        <p:blipFill rotWithShape="1">
+          <a:blip r:embed="rId5"/>
+          <a:srcRect t="75" b="75"/>
+          <a:stretch/>
+        </p:blipFill>
+        <p:spPr/>
+      </p:pic>
+      <p:sp>
+        <p:nvSpPr>
+          <p:cNvPr id="133" name="Text Placeholder 132">
+            <a:extLst>
+              <a:ext uri="{FF2B5EF4-FFF2-40B4-BE49-F238E27FC236}">
+                <a16:creationId xmlns:a16="http://schemas.microsoft.com/office/drawing/2014/main" id="{F73428BF-556B-39B3-A2E1-A3479B7A4368}"/>
+              </a:ext>
+            </a:extLst>
+          </p:cNvPr>
+          <p:cNvSpPr>
+            <a:spLocks noGrp="1"/>
+          </p:cNvSpPr>
+          <p:nvPr>
+            <p:ph type="body" sz="quarter" idx="30"/>
+          </p:nvPr>
+        </p:nvSpPr>
+        <p:spPr/>
+        <p:txBody>
+          <a:bodyPr/>
+          <a:lstStyle/>
+          <a:p>
+            <a:r>
+              <a:rPr lang="en-US" dirty="0"/>
+              <a:t>Rowan Murphy</a:t>
+            </a:r>
+          </a:p>
+        </p:txBody>
+      </p:sp>
+      <p:sp>
+        <p:nvSpPr>
+          <p:cNvPr id="134" name="Text Placeholder 133">
+            <a:extLst>
+              <a:ext uri="{FF2B5EF4-FFF2-40B4-BE49-F238E27FC236}">
+                <a16:creationId xmlns:a16="http://schemas.microsoft.com/office/drawing/2014/main" id="{3519B91A-73EE-B2B8-4875-2C6A0113D333}"/>
+              </a:ext>
+            </a:extLst>
+          </p:cNvPr>
+          <p:cNvSpPr>
+            <a:spLocks noGrp="1"/>
+          </p:cNvSpPr>
+          <p:nvPr>
+            <p:ph type="body" sz="quarter" idx="31"/>
+          </p:nvPr>
+        </p:nvSpPr>
+        <p:spPr/>
+        <p:txBody>
+          <a:bodyPr/>
+          <a:lstStyle/>
+          <a:p>
+            <a:r>
+              <a:rPr lang="en-US" dirty="0"/>
+              <a:t>SEO Strategist</a:t>
+            </a:r>
+          </a:p>
+        </p:txBody>
+      </p:sp>
+      <p:pic>
+        <p:nvPicPr>
+          <p:cNvPr id="18" name="Picture Placeholder 17" descr="Team member head shot&#10;">
+            <a:extLst>
+              <a:ext uri="{FF2B5EF4-FFF2-40B4-BE49-F238E27FC236}">
+                <a16:creationId xmlns:a16="http://schemas.microsoft.com/office/drawing/2014/main" id="{F4608F53-148D-4D2F-6672-8A90E230C68A}"/>
+              </a:ext>
+            </a:extLst>
+          </p:cNvPr>
+          <p:cNvPicPr>
+            <a:picLocks noGrp="1" noChangeAspect="1"/>
+          </p:cNvPicPr>
+          <p:nvPr>
+            <p:ph type="pic" sz="quarter" idx="22"/>
+          </p:nvPr>
+        </p:nvPicPr>
+        <p:blipFill rotWithShape="1">
+          <a:blip r:embed="rId6"/>
+          <a:srcRect t="75" b="75"/>
+          <a:stretch/>
+        </p:blipFill>
+        <p:spPr/>
+      </p:pic>
+      <p:sp>
+        <p:nvSpPr>
+          <p:cNvPr id="7" name="Text Placeholder 6">
+            <a:extLst>
+              <a:ext uri="{FF2B5EF4-FFF2-40B4-BE49-F238E27FC236}">
+                <a16:creationId xmlns:a16="http://schemas.microsoft.com/office/drawing/2014/main" id="{24AD9EB9-CF0D-0D70-D541-05E1A813D00F}"/>
+              </a:ext>
+            </a:extLst>
+          </p:cNvPr>
+          <p:cNvSpPr>
+            <a:spLocks noGrp="1"/>
+          </p:cNvSpPr>
+          <p:nvPr>
+            <p:ph type="body" sz="quarter" idx="16"/>
+          </p:nvPr>
+        </p:nvSpPr>
+        <p:spPr/>
+        <p:txBody>
+          <a:bodyPr/>
+          <a:lstStyle/>
+          <a:p>
+            <a:r>
+              <a:rPr lang="en-US" dirty="0"/>
+              <a:t>Flora Berggren​</a:t>
+            </a:r>
+          </a:p>
+        </p:txBody>
+      </p:sp>
+      <p:sp>
+        <p:nvSpPr>
+          <p:cNvPr id="8" name="Text Placeholder 7">
+            <a:extLst>
+              <a:ext uri="{FF2B5EF4-FFF2-40B4-BE49-F238E27FC236}">
+                <a16:creationId xmlns:a16="http://schemas.microsoft.com/office/drawing/2014/main" id="{869DE758-CE4B-6136-04AE-85B544CA6F5B}"/>
+              </a:ext>
+            </a:extLst>
+          </p:cNvPr>
+          <p:cNvSpPr>
+            <a:spLocks noGrp="1"/>
+          </p:cNvSpPr>
+          <p:nvPr>
+            <p:ph type="body" sz="quarter" idx="17"/>
+          </p:nvPr>
+        </p:nvSpPr>
+        <p:spPr/>
+        <p:txBody>
+          <a:bodyPr/>
+          <a:lstStyle/>
+          <a:p>
+            <a:r>
+              <a:rPr lang="en-US" dirty="0"/>
+              <a:t>Chief Operations Officer</a:t>
+            </a:r>
+          </a:p>
+        </p:txBody>
+      </p:sp>
+      <p:pic>
+        <p:nvPicPr>
+          <p:cNvPr id="141" name="Picture Placeholder 140" descr="Team member head shot&#10;">
+            <a:extLst>
+              <a:ext uri="{FF2B5EF4-FFF2-40B4-BE49-F238E27FC236}">
+                <a16:creationId xmlns:a16="http://schemas.microsoft.com/office/drawing/2014/main" id="{105B8828-F685-63DD-6F9F-62F8A8DA6D06}"/>
+              </a:ext>
+            </a:extLst>
+          </p:cNvPr>
+          <p:cNvPicPr>
+            <a:picLocks noGrp="1" noChangeAspect="1"/>
+          </p:cNvPicPr>
+          <p:nvPr>
+            <p:ph type="pic" sz="quarter" idx="26"/>
+          </p:nvPr>
+        </p:nvPicPr>
+        <p:blipFill rotWithShape="1">
+          <a:blip r:embed="rId7"/>
+          <a:srcRect l="291" r="291"/>
+          <a:stretch/>
+        </p:blipFill>
+        <p:spPr/>
+      </p:pic>
+      <p:sp>
+        <p:nvSpPr>
+          <p:cNvPr id="135" name="Text Placeholder 134">
+            <a:extLst>
+              <a:ext uri="{FF2B5EF4-FFF2-40B4-BE49-F238E27FC236}">
+                <a16:creationId xmlns:a16="http://schemas.microsoft.com/office/drawing/2014/main" id="{747BF9B3-DF8F-789C-9AF6-94771E1AF5FE}"/>
+              </a:ext>
+            </a:extLst>
+          </p:cNvPr>
+          <p:cNvSpPr>
+            <a:spLocks noGrp="1"/>
+          </p:cNvSpPr>
+          <p:nvPr>
+            <p:ph type="body" sz="quarter" idx="32"/>
+          </p:nvPr>
+        </p:nvSpPr>
+        <p:spPr/>
+        <p:txBody>
+          <a:bodyPr/>
+          <a:lstStyle/>
+          <a:p>
+            <a:r>
+              <a:rPr lang="en-US" dirty="0"/>
+              <a:t>Elizabeth Moore</a:t>
+            </a:r>
+          </a:p>
+        </p:txBody>
+      </p:sp>
+      <p:sp>
+        <p:nvSpPr>
+          <p:cNvPr id="136" name="Text Placeholder 135">
+            <a:extLst>
+              <a:ext uri="{FF2B5EF4-FFF2-40B4-BE49-F238E27FC236}">
+                <a16:creationId xmlns:a16="http://schemas.microsoft.com/office/drawing/2014/main" id="{A2297428-B6BC-F5B5-C82D-3BC4408EC576}"/>
+              </a:ext>
+            </a:extLst>
+          </p:cNvPr>
+          <p:cNvSpPr>
+            <a:spLocks noGrp="1"/>
+          </p:cNvSpPr>
+          <p:nvPr>
+            <p:ph type="body" sz="quarter" idx="33"/>
+          </p:nvPr>
+        </p:nvSpPr>
+        <p:spPr/>
+        <p:txBody>
+          <a:bodyPr/>
+          <a:lstStyle/>
+          <a:p>
+            <a:r>
+              <a:rPr lang="en-US" dirty="0"/>
+              <a:t>Product Designer</a:t>
+            </a:r>
+          </a:p>
+        </p:txBody>
+      </p:sp>
+      <p:pic>
+        <p:nvPicPr>
+          <p:cNvPr id="19" name="Picture Placeholder 18" descr="Team member head shot&#10;">
+            <a:extLst>
+              <a:ext uri="{FF2B5EF4-FFF2-40B4-BE49-F238E27FC236}">
+                <a16:creationId xmlns:a16="http://schemas.microsoft.com/office/drawing/2014/main" id="{34C21939-A4DB-0F96-83D8-AD8FFB45359F}"/>
+              </a:ext>
+            </a:extLst>
+          </p:cNvPr>
+          <p:cNvPicPr>
+            <a:picLocks noGrp="1" noChangeAspect="1"/>
+          </p:cNvPicPr>
+          <p:nvPr>
+            <p:ph type="pic" sz="quarter" idx="23"/>
+          </p:nvPr>
+        </p:nvPicPr>
+        <p:blipFill rotWithShape="1">
+          <a:blip r:embed="rId8"/>
+          <a:srcRect l="99" r="99"/>
+          <a:stretch/>
+        </p:blipFill>
+        <p:spPr/>
+      </p:pic>
+      <p:sp>
+        <p:nvSpPr>
+          <p:cNvPr id="9" name="Text Placeholder 8">
+            <a:extLst>
+              <a:ext uri="{FF2B5EF4-FFF2-40B4-BE49-F238E27FC236}">
+                <a16:creationId xmlns:a16="http://schemas.microsoft.com/office/drawing/2014/main" id="{22A99FBE-9850-5F5D-04D9-E3A83DEEA928}"/>
+              </a:ext>
+            </a:extLst>
+          </p:cNvPr>
+          <p:cNvSpPr>
+            <a:spLocks noGrp="1"/>
+          </p:cNvSpPr>
+          <p:nvPr>
+            <p:ph type="body" sz="quarter" idx="18"/>
+          </p:nvPr>
+        </p:nvSpPr>
+        <p:spPr/>
+        <p:txBody>
+          <a:bodyPr/>
+          <a:lstStyle/>
+          <a:p>
+            <a:r>
+              <a:rPr lang="en-US" dirty="0"/>
+              <a:t>Rajesh Santoshi​</a:t>
+            </a:r>
+          </a:p>
+        </p:txBody>
+      </p:sp>
+      <p:sp>
+        <p:nvSpPr>
+          <p:cNvPr id="10" name="Text Placeholder 9">
+            <a:extLst>
+              <a:ext uri="{FF2B5EF4-FFF2-40B4-BE49-F238E27FC236}">
+                <a16:creationId xmlns:a16="http://schemas.microsoft.com/office/drawing/2014/main" id="{19AAB49A-6730-B2CF-9537-FF9551D4EB80}"/>
+              </a:ext>
+            </a:extLst>
+          </p:cNvPr>
+          <p:cNvSpPr>
+            <a:spLocks noGrp="1"/>
+          </p:cNvSpPr>
+          <p:nvPr>
+            <p:ph type="body" sz="quarter" idx="19"/>
+          </p:nvPr>
+        </p:nvSpPr>
+        <p:spPr/>
+        <p:txBody>
+          <a:bodyPr/>
+          <a:lstStyle/>
+          <a:p>
+            <a:r>
+              <a:rPr lang="en-US" dirty="0"/>
+              <a:t>VP Marketing</a:t>
+            </a:r>
+          </a:p>
+        </p:txBody>
+      </p:sp>
+      <p:pic>
+        <p:nvPicPr>
+          <p:cNvPr id="142" name="Picture Placeholder 141" descr="Team member head shot&#10;">
+            <a:extLst>
+              <a:ext uri="{FF2B5EF4-FFF2-40B4-BE49-F238E27FC236}">
+                <a16:creationId xmlns:a16="http://schemas.microsoft.com/office/drawing/2014/main" id="{E6A455C2-70F1-6DAE-26E6-C7AAE0CFA814}"/>
+              </a:ext>
+            </a:extLst>
+          </p:cNvPr>
+          <p:cNvPicPr>
+            <a:picLocks noGrp="1" noChangeAspect="1"/>
+          </p:cNvPicPr>
+          <p:nvPr>
+            <p:ph type="pic" sz="quarter" idx="27"/>
+          </p:nvPr>
+        </p:nvPicPr>
+        <p:blipFill rotWithShape="1">
+          <a:blip r:embed="rId9"/>
+          <a:srcRect l="291" r="291"/>
+          <a:stretch/>
+        </p:blipFill>
+        <p:spPr/>
+      </p:pic>
+      <p:sp>
+        <p:nvSpPr>
+          <p:cNvPr id="137" name="Text Placeholder 136">
+            <a:extLst>
+              <a:ext uri="{FF2B5EF4-FFF2-40B4-BE49-F238E27FC236}">
+                <a16:creationId xmlns:a16="http://schemas.microsoft.com/office/drawing/2014/main" id="{651B92A3-1DB6-8A7F-09B7-C7969D53FB3A}"/>
+              </a:ext>
+            </a:extLst>
+          </p:cNvPr>
+          <p:cNvSpPr>
+            <a:spLocks noGrp="1"/>
+          </p:cNvSpPr>
+          <p:nvPr>
+            <p:ph type="body" sz="quarter" idx="34"/>
+          </p:nvPr>
+        </p:nvSpPr>
+        <p:spPr/>
+        <p:txBody>
+          <a:bodyPr/>
+          <a:lstStyle/>
+          <a:p>
+            <a:r>
+              <a:rPr lang="en-US" dirty="0"/>
+              <a:t>Robin Kline</a:t>
+            </a:r>
+          </a:p>
+        </p:txBody>
+      </p:sp>
+      <p:sp>
+        <p:nvSpPr>
+          <p:cNvPr id="138" name="Text Placeholder 137">
+            <a:extLst>
+              <a:ext uri="{FF2B5EF4-FFF2-40B4-BE49-F238E27FC236}">
+                <a16:creationId xmlns:a16="http://schemas.microsoft.com/office/drawing/2014/main" id="{462B07C6-5B4D-AB97-3376-C4F8BFC2C143}"/>
+              </a:ext>
+            </a:extLst>
+          </p:cNvPr>
+          <p:cNvSpPr>
+            <a:spLocks noGrp="1"/>
+          </p:cNvSpPr>
+          <p:nvPr>
+            <p:ph type="body" sz="quarter" idx="35"/>
+          </p:nvPr>
+        </p:nvSpPr>
+        <p:spPr/>
+        <p:txBody>
+          <a:bodyPr/>
+          <a:lstStyle/>
+          <a:p>
+            <a:r>
+              <a:rPr lang="en-US" dirty="0"/>
+              <a:t>Content Developer</a:t>
+            </a:r>
+          </a:p>
+        </p:txBody>
+      </p:sp>
+      <p:sp>
+        <p:nvSpPr>
+          <p:cNvPr id="2" name="Footer Placeholder 1">
+            <a:extLst>
+              <a:ext uri="{FF2B5EF4-FFF2-40B4-BE49-F238E27FC236}">
+                <a16:creationId xmlns:a16="http://schemas.microsoft.com/office/drawing/2014/main" id="{E0C0AB0C-E0B6-7838-D865-2AB638122FD9}"/>
+              </a:ext>
+            </a:extLst>
+          </p:cNvPr>
+          <p:cNvSpPr>
+            <a:spLocks noGrp="1"/>
+          </p:cNvSpPr>
+          <p:nvPr>
+            <p:ph type="ftr" sz="quarter" idx="10"/>
+          </p:nvPr>
+        </p:nvSpPr>
+        <p:spPr/>
+        <p:txBody>
+          <a:bodyPr/>
+          <a:lstStyle/>
+          <a:p>
+            <a:r>
+              <a:rPr lang="en-US"/>
+              <a:t>Crypto: investing &amp; trading</a:t>
+            </a:r>
+            <a:endParaRPr lang="en-US" dirty="0"/>
+          </a:p>
+        </p:txBody>
+      </p:sp>
+    </p:spTree>
+    <p:extLst>
+      <p:ext uri="{BB962C8B-B14F-4D97-AF65-F5344CB8AC3E}">
+        <p14:creationId xmlns:p14="http://schemas.microsoft.com/office/powerpoint/2010/main" val="840605972"/>
+      </p:ext>
+    </p:extLst>
+  </p:cSld>
+  <p:clrMapOvr>
+    <a:masterClrMapping/>
+  </p:clrMapOvr>
+</p:sld>
+</file>
+
+<file path=ppt/slides/slide18.xml><?xml version="1.0" encoding="utf-8"?>
+<p:sld xmlns:a="http://schemas.openxmlformats.org/drawingml/2006/main" xmlns:r="http://schemas.openxmlformats.org/officeDocument/2006/relationships" xmlns:p="http://schemas.openxmlformats.org/presentationml/2006/main">
+  <p:cSld>
+    <p:spTree>
+      <p:nvGrpSpPr>
+        <p:cNvPr id="1" name=""/>
+        <p:cNvGrpSpPr/>
+        <p:nvPr/>
+      </p:nvGrpSpPr>
+      <p:grpSpPr>
+        <a:xfrm>
+          <a:off x="0" y="0"/>
+          <a:ext cx="0" cy="0"/>
+          <a:chOff x="0" y="0"/>
+          <a:chExt cx="0" cy="0"/>
+        </a:xfrm>
+      </p:grpSpPr>
+      <p:sp>
+        <p:nvSpPr>
           <p:cNvPr id="2" name="Title 1">
             <a:extLst>
               <a:ext uri="{FF2B5EF4-FFF2-40B4-BE49-F238E27FC236}">
@@ -22396,7 +22640,7 @@
 </p:sld>
 </file>
 
-<file path=ppt/slides/slide18.xml><?xml version="1.0" encoding="utf-8"?>
+<file path=ppt/slides/slide19.xml><?xml version="1.0" encoding="utf-8"?>
 <p:sld xmlns:a="http://schemas.openxmlformats.org/drawingml/2006/main" xmlns:r="http://schemas.openxmlformats.org/officeDocument/2006/relationships" xmlns:p="http://schemas.openxmlformats.org/presentationml/2006/main">
   <p:cSld>
     <p:spTree>
@@ -25526,15 +25770,6 @@
 </file>
 
 <file path=customXml/item1.xml><?xml version="1.0" encoding="utf-8"?>
-<?mso-contentType ?>
-<FormTemplates xmlns="http://schemas.microsoft.com/sharepoint/v3/contenttype/forms">
-  <Display>DocumentLibraryForm</Display>
-  <Edit>DocumentLibraryForm</Edit>
-  <New>DocumentLibraryForm</New>
-</FormTemplates>
-</file>
-
-<file path=customXml/item2.xml><?xml version="1.0" encoding="utf-8"?>
 <ct:contentTypeSchema xmlns:ct="http://schemas.microsoft.com/office/2006/metadata/contentType" xmlns:ma="http://schemas.microsoft.com/office/2006/metadata/properties/metaAttributes" ct:_="" ma:_="" ma:contentTypeName="Document" ma:contentTypeID="0x01010079F111ED35F8CC479449609E8A0923A6" ma:contentTypeVersion="25" ma:contentTypeDescription="Create a new document." ma:contentTypeScope="" ma:versionID="e02306daf00165b375dc6a58966960be">
   <xsd:schema xmlns:xsd="http://www.w3.org/2001/XMLSchema" xmlns:xs="http://www.w3.org/2001/XMLSchema" xmlns:p="http://schemas.microsoft.com/office/2006/metadata/properties" xmlns:ns1="http://schemas.microsoft.com/sharepoint/v3" xmlns:ns2="71af3243-3dd4-4a8d-8c0d-dd76da1f02a5" xmlns:ns3="16c05727-aa75-4e4a-9b5f-8a80a1165891" xmlns:ns4="230e9df3-be65-4c73-a93b-d1236ebd677e" targetNamespace="http://schemas.microsoft.com/office/2006/metadata/properties" ma:root="true" ma:fieldsID="df88fb76bf5f555224557953949c1ec9" ns1:_="" ns2:_="" ns3:_="" ns4:_="">
     <xsd:import namespace="http://schemas.microsoft.com/sharepoint/v3"/>
@@ -25828,6 +26063,15 @@
 </ct:contentTypeSchema>
 </file>
 
+<file path=customXml/item2.xml><?xml version="1.0" encoding="utf-8"?>
+<?mso-contentType ?>
+<FormTemplates xmlns="http://schemas.microsoft.com/sharepoint/v3/contenttype/forms">
+  <Display>DocumentLibraryForm</Display>
+  <Edit>DocumentLibraryForm</Edit>
+  <New>DocumentLibraryForm</New>
+</FormTemplates>
+</file>
+
 <file path=customXml/item3.xml><?xml version="1.0" encoding="utf-8"?>
 <p:properties xmlns:p="http://schemas.microsoft.com/office/2006/metadata/properties" xmlns:xsi="http://www.w3.org/2001/XMLSchema-instance" xmlns:pc="http://schemas.microsoft.com/office/infopath/2007/PartnerControls">
   <documentManagement>
@@ -25849,14 +26093,6 @@
 </file>
 
 <file path=customXml/itemProps1.xml><?xml version="1.0" encoding="utf-8"?>
-<ds:datastoreItem xmlns:ds="http://schemas.openxmlformats.org/officeDocument/2006/customXml" ds:itemID="{4F1F1912-3146-44AF-A389-9E8B77BB3688}">
-  <ds:schemaRefs>
-    <ds:schemaRef ds:uri="http://schemas.microsoft.com/sharepoint/v3/contenttype/forms"/>
-  </ds:schemaRefs>
-</ds:datastoreItem>
-</file>
-
-<file path=customXml/itemProps2.xml><?xml version="1.0" encoding="utf-8"?>
 <ds:datastoreItem xmlns:ds="http://schemas.openxmlformats.org/officeDocument/2006/customXml" ds:itemID="{176493A3-2B83-4E58-86AD-56A2F2A20F12}">
   <ds:schemaRefs>
     <ds:schemaRef ds:uri="http://schemas.microsoft.com/office/2006/metadata/contentType"/>
@@ -25877,6 +26113,14 @@
 </ds:datastoreItem>
 </file>
 
+<file path=customXml/itemProps2.xml><?xml version="1.0" encoding="utf-8"?>
+<ds:datastoreItem xmlns:ds="http://schemas.openxmlformats.org/officeDocument/2006/customXml" ds:itemID="{4F1F1912-3146-44AF-A389-9E8B77BB3688}">
+  <ds:schemaRefs>
+    <ds:schemaRef ds:uri="http://schemas.microsoft.com/sharepoint/v3/contenttype/forms"/>
+  </ds:schemaRefs>
+</ds:datastoreItem>
+</file>
+
 <file path=customXml/itemProps3.xml><?xml version="1.0" encoding="utf-8"?>
 <ds:datastoreItem xmlns:ds="http://schemas.openxmlformats.org/officeDocument/2006/customXml" ds:itemID="{F8B8ECF1-2A9D-464C-AFE8-2B3295D0BF97}">
   <ds:schemaRefs>

</xml_diff>

<commit_message>
Report and Presentation v1.2
</commit_message>
<xml_diff>
--- a/CSCI441 Project Presentation.pptx
+++ b/CSCI441 Project Presentation.pptx
@@ -18,8 +18,8 @@
     <p:sldId id="534" r:id="rId12"/>
     <p:sldId id="546" r:id="rId13"/>
     <p:sldId id="536" r:id="rId14"/>
-    <p:sldId id="545" r:id="rId15"/>
-    <p:sldId id="550" r:id="rId16"/>
+    <p:sldId id="550" r:id="rId15"/>
+    <p:sldId id="545" r:id="rId16"/>
     <p:sldId id="537" r:id="rId17"/>
     <p:sldId id="538" r:id="rId18"/>
     <p:sldId id="539" r:id="rId19"/>
@@ -19069,7 +19069,7 @@
           <a:p>
             <a:r>
               <a:rPr lang="en-US" sz="2800" dirty="0"/>
-              <a:t>Accuracy</a:t>
+              <a:t>Accuracy Scores</a:t>
             </a:r>
           </a:p>
         </p:txBody>
@@ -19088,6 +19088,318 @@
 </file>
 
 <file path=ppt/slides/slide11.xml><?xml version="1.0" encoding="utf-8"?>
+<p:sld xmlns:a="http://schemas.openxmlformats.org/drawingml/2006/main" xmlns:r="http://schemas.openxmlformats.org/officeDocument/2006/relationships" xmlns:p="http://schemas.openxmlformats.org/presentationml/2006/main">
+  <p:cSld>
+    <p:spTree>
+      <p:nvGrpSpPr>
+        <p:cNvPr id="1" name="">
+          <a:extLst>
+            <a:ext uri="{FF2B5EF4-FFF2-40B4-BE49-F238E27FC236}">
+              <a16:creationId xmlns:a16="http://schemas.microsoft.com/office/drawing/2014/main" id="{C68A1F4F-6727-2547-F9FB-4E29691E7377}"/>
+            </a:ext>
+          </a:extLst>
+        </p:cNvPr>
+        <p:cNvGrpSpPr/>
+        <p:nvPr/>
+      </p:nvGrpSpPr>
+      <p:grpSpPr>
+        <a:xfrm>
+          <a:off x="0" y="0"/>
+          <a:ext cx="0" cy="0"/>
+          <a:chOff x="0" y="0"/>
+          <a:chExt cx="0" cy="0"/>
+        </a:xfrm>
+      </p:grpSpPr>
+      <p:sp>
+        <p:nvSpPr>
+          <p:cNvPr id="5" name="Slide Number Placeholder 4">
+            <a:extLst>
+              <a:ext uri="{FF2B5EF4-FFF2-40B4-BE49-F238E27FC236}">
+                <a16:creationId xmlns:a16="http://schemas.microsoft.com/office/drawing/2014/main" id="{9A60C8CE-F6D0-87C1-EF74-CE0C84210712}"/>
+              </a:ext>
+            </a:extLst>
+          </p:cNvPr>
+          <p:cNvSpPr>
+            <a:spLocks noGrp="1"/>
+          </p:cNvSpPr>
+          <p:nvPr>
+            <p:ph type="sldNum" sz="quarter" idx="11"/>
+          </p:nvPr>
+        </p:nvSpPr>
+        <p:spPr/>
+        <p:txBody>
+          <a:bodyPr/>
+          <a:lstStyle/>
+          <a:p>
+            <a:fld id="{294A09A9-5501-47C1-A89A-A340965A2BE2}" type="slidenum">
+              <a:rPr lang="en-US" smtClean="0"/>
+              <a:pPr/>
+              <a:t>11</a:t>
+            </a:fld>
+            <a:endParaRPr lang="en-US" dirty="0"/>
+          </a:p>
+        </p:txBody>
+      </p:sp>
+      <p:sp>
+        <p:nvSpPr>
+          <p:cNvPr id="6" name="Title 68">
+            <a:extLst>
+              <a:ext uri="{FF2B5EF4-FFF2-40B4-BE49-F238E27FC236}">
+                <a16:creationId xmlns:a16="http://schemas.microsoft.com/office/drawing/2014/main" id="{5CEB102C-4324-40FC-4FBC-45884EEF60C7}"/>
+              </a:ext>
+            </a:extLst>
+          </p:cNvPr>
+          <p:cNvSpPr txBox="1">
+            <a:spLocks/>
+          </p:cNvSpPr>
+          <p:nvPr/>
+        </p:nvSpPr>
+        <p:spPr>
+          <a:xfrm>
+            <a:off x="1656588" y="136365"/>
+            <a:ext cx="8878824" cy="1069848"/>
+          </a:xfrm>
+          <a:prstGeom prst="rect">
+            <a:avLst/>
+          </a:prstGeom>
+        </p:spPr>
+        <p:txBody>
+          <a:bodyPr vert="horz" lIns="91440" tIns="45720" rIns="91440" bIns="45720" rtlCol="0" anchor="b">
+            <a:noAutofit/>
+          </a:bodyPr>
+          <a:lstStyle>
+            <a:lvl1pPr algn="ctr" defTabSz="914400" rtl="0" eaLnBrk="1" latinLnBrk="0" hangingPunct="1">
+              <a:lnSpc>
+                <a:spcPct val="90000"/>
+              </a:lnSpc>
+              <a:spcBef>
+                <a:spcPct val="0"/>
+              </a:spcBef>
+              <a:buNone/>
+              <a:defRPr sz="4000" b="1" kern="1200" cap="all" spc="600" baseline="0">
+                <a:solidFill>
+                  <a:schemeClr val="bg1"/>
+                </a:solidFill>
+                <a:latin typeface="+mj-lt"/>
+                <a:ea typeface="+mj-ea"/>
+                <a:cs typeface="+mj-cs"/>
+              </a:defRPr>
+            </a:lvl1pPr>
+          </a:lstStyle>
+          <a:p>
+            <a:r>
+              <a:rPr lang="en-US" dirty="0"/>
+              <a:t>Supervised Models 3</a:t>
+            </a:r>
+          </a:p>
+        </p:txBody>
+      </p:sp>
+      <p:sp>
+        <p:nvSpPr>
+          <p:cNvPr id="9" name="Title 68">
+            <a:extLst>
+              <a:ext uri="{FF2B5EF4-FFF2-40B4-BE49-F238E27FC236}">
+                <a16:creationId xmlns:a16="http://schemas.microsoft.com/office/drawing/2014/main" id="{1B016062-2B86-449A-8B55-0029F7CC78E3}"/>
+              </a:ext>
+            </a:extLst>
+          </p:cNvPr>
+          <p:cNvSpPr txBox="1">
+            <a:spLocks/>
+          </p:cNvSpPr>
+          <p:nvPr/>
+        </p:nvSpPr>
+        <p:spPr>
+          <a:xfrm>
+            <a:off x="1632204" y="903268"/>
+            <a:ext cx="8878824" cy="1069848"/>
+          </a:xfrm>
+          <a:prstGeom prst="rect">
+            <a:avLst/>
+          </a:prstGeom>
+        </p:spPr>
+        <p:txBody>
+          <a:bodyPr vert="horz" lIns="91440" tIns="45720" rIns="91440" bIns="45720" rtlCol="0" anchor="b">
+            <a:noAutofit/>
+          </a:bodyPr>
+          <a:lstStyle>
+            <a:lvl1pPr algn="ctr" defTabSz="914400" rtl="0" eaLnBrk="1" latinLnBrk="0" hangingPunct="1">
+              <a:lnSpc>
+                <a:spcPct val="90000"/>
+              </a:lnSpc>
+              <a:spcBef>
+                <a:spcPct val="0"/>
+              </a:spcBef>
+              <a:buNone/>
+              <a:defRPr sz="4000" b="1" kern="1200" cap="all" spc="600" baseline="0">
+                <a:solidFill>
+                  <a:schemeClr val="bg1"/>
+                </a:solidFill>
+                <a:latin typeface="+mj-lt"/>
+                <a:ea typeface="+mj-ea"/>
+                <a:cs typeface="+mj-cs"/>
+              </a:defRPr>
+            </a:lvl1pPr>
+          </a:lstStyle>
+          <a:p>
+            <a:r>
+              <a:rPr lang="en-US" sz="2800" dirty="0"/>
+              <a:t>Confusion Matrices</a:t>
+            </a:r>
+          </a:p>
+        </p:txBody>
+      </p:sp>
+      <p:pic>
+        <p:nvPicPr>
+          <p:cNvPr id="23" name="Picture 22" descr="A screenshot of a computer screen&#10;&#10;AI-generated content may be incorrect.">
+            <a:extLst>
+              <a:ext uri="{FF2B5EF4-FFF2-40B4-BE49-F238E27FC236}">
+                <a16:creationId xmlns:a16="http://schemas.microsoft.com/office/drawing/2014/main" id="{3E0A9A6D-68D1-B1D1-955E-876B3E6DC630}"/>
+              </a:ext>
+            </a:extLst>
+          </p:cNvPr>
+          <p:cNvPicPr>
+            <a:picLocks noChangeAspect="1"/>
+          </p:cNvPicPr>
+          <p:nvPr/>
+        </p:nvPicPr>
+        <p:blipFill>
+          <a:blip r:embed="rId2"/>
+          <a:stretch>
+            <a:fillRect/>
+          </a:stretch>
+        </p:blipFill>
+        <p:spPr>
+          <a:xfrm>
+            <a:off x="0" y="2031876"/>
+            <a:ext cx="12192000" cy="3492750"/>
+          </a:xfrm>
+          <a:prstGeom prst="rect">
+            <a:avLst/>
+          </a:prstGeom>
+        </p:spPr>
+      </p:pic>
+      <p:sp>
+        <p:nvSpPr>
+          <p:cNvPr id="24" name="Rectangle 23">
+            <a:extLst>
+              <a:ext uri="{FF2B5EF4-FFF2-40B4-BE49-F238E27FC236}">
+                <a16:creationId xmlns:a16="http://schemas.microsoft.com/office/drawing/2014/main" id="{8F3534DA-0A61-E966-28E3-88F1E6811B92}"/>
+              </a:ext>
+            </a:extLst>
+          </p:cNvPr>
+          <p:cNvSpPr/>
+          <p:nvPr/>
+        </p:nvSpPr>
+        <p:spPr>
+          <a:xfrm>
+            <a:off x="275837" y="671289"/>
+            <a:ext cx="776253" cy="1353312"/>
+          </a:xfrm>
+          <a:prstGeom prst="rect">
+            <a:avLst/>
+          </a:prstGeom>
+          <a:solidFill>
+            <a:srgbClr val="102857"/>
+          </a:solidFill>
+          <a:ln>
+            <a:solidFill>
+              <a:srgbClr val="102857"/>
+            </a:solidFill>
+          </a:ln>
+        </p:spPr>
+        <p:style>
+          <a:lnRef idx="2">
+            <a:schemeClr val="accent1">
+              <a:shade val="15000"/>
+            </a:schemeClr>
+          </a:lnRef>
+          <a:fillRef idx="1">
+            <a:schemeClr val="accent1"/>
+          </a:fillRef>
+          <a:effectRef idx="0">
+            <a:schemeClr val="accent1"/>
+          </a:effectRef>
+          <a:fontRef idx="minor">
+            <a:schemeClr val="lt1"/>
+          </a:fontRef>
+        </p:style>
+        <p:txBody>
+          <a:bodyPr rtlCol="0" anchor="ctr"/>
+          <a:lstStyle/>
+          <a:p>
+            <a:pPr algn="ctr"/>
+            <a:endParaRPr lang="en-US"/>
+          </a:p>
+        </p:txBody>
+      </p:sp>
+      <p:sp>
+        <p:nvSpPr>
+          <p:cNvPr id="25" name="Rectangle 24">
+            <a:extLst>
+              <a:ext uri="{FF2B5EF4-FFF2-40B4-BE49-F238E27FC236}">
+                <a16:creationId xmlns:a16="http://schemas.microsoft.com/office/drawing/2014/main" id="{6EA19671-FC5C-813D-5DAF-9A3B94C25684}"/>
+              </a:ext>
+            </a:extLst>
+          </p:cNvPr>
+          <p:cNvSpPr/>
+          <p:nvPr/>
+        </p:nvSpPr>
+        <p:spPr>
+          <a:xfrm>
+            <a:off x="275836" y="5531901"/>
+            <a:ext cx="776253" cy="1211799"/>
+          </a:xfrm>
+          <a:prstGeom prst="rect">
+            <a:avLst/>
+          </a:prstGeom>
+          <a:solidFill>
+            <a:srgbClr val="102857"/>
+          </a:solidFill>
+          <a:ln>
+            <a:solidFill>
+              <a:srgbClr val="102857"/>
+            </a:solidFill>
+          </a:ln>
+        </p:spPr>
+        <p:style>
+          <a:lnRef idx="2">
+            <a:schemeClr val="accent1">
+              <a:shade val="15000"/>
+            </a:schemeClr>
+          </a:lnRef>
+          <a:fillRef idx="1">
+            <a:schemeClr val="accent1"/>
+          </a:fillRef>
+          <a:effectRef idx="0">
+            <a:schemeClr val="accent1"/>
+          </a:effectRef>
+          <a:fontRef idx="minor">
+            <a:schemeClr val="lt1"/>
+          </a:fontRef>
+        </p:style>
+        <p:txBody>
+          <a:bodyPr rtlCol="0" anchor="ctr"/>
+          <a:lstStyle/>
+          <a:p>
+            <a:pPr algn="ctr"/>
+            <a:endParaRPr lang="en-US"/>
+          </a:p>
+        </p:txBody>
+      </p:sp>
+    </p:spTree>
+    <p:extLst>
+      <p:ext uri="{BB962C8B-B14F-4D97-AF65-F5344CB8AC3E}">
+        <p14:creationId xmlns:p14="http://schemas.microsoft.com/office/powerpoint/2010/main" val="2627658711"/>
+      </p:ext>
+    </p:extLst>
+  </p:cSld>
+  <p:clrMapOvr>
+    <a:masterClrMapping/>
+  </p:clrMapOvr>
+</p:sld>
+</file>
+
+<file path=ppt/slides/slide12.xml><?xml version="1.0" encoding="utf-8"?>
 <p:sld xmlns:a="http://schemas.openxmlformats.org/drawingml/2006/main" xmlns:r="http://schemas.openxmlformats.org/officeDocument/2006/relationships" xmlns:p="http://schemas.openxmlformats.org/presentationml/2006/main">
   <p:cSld>
     <p:spTree>
@@ -19182,7 +19494,7 @@
             <a:fld id="{294A09A9-5501-47C1-A89A-A340965A2BE2}" type="slidenum">
               <a:rPr lang="en-US" smtClean="0"/>
               <a:pPr/>
-              <a:t>11</a:t>
+              <a:t>12</a:t>
             </a:fld>
             <a:endParaRPr lang="en-US" dirty="0"/>
           </a:p>
@@ -19713,7 +20025,7 @@
           <a:p>
             <a:r>
               <a:rPr lang="en-US" dirty="0"/>
-              <a:t>Supervised Models 3</a:t>
+              <a:t>Supervised Models 4</a:t>
             </a:r>
           </a:p>
         </p:txBody>
@@ -19776,210 +20088,6 @@
     <p:extLst>
       <p:ext uri="{BB962C8B-B14F-4D97-AF65-F5344CB8AC3E}">
         <p14:creationId xmlns:p14="http://schemas.microsoft.com/office/powerpoint/2010/main" val="3510130985"/>
-      </p:ext>
-    </p:extLst>
-  </p:cSld>
-  <p:clrMapOvr>
-    <a:masterClrMapping/>
-  </p:clrMapOvr>
-</p:sld>
-</file>
-
-<file path=ppt/slides/slide12.xml><?xml version="1.0" encoding="utf-8"?>
-<p:sld xmlns:a="http://schemas.openxmlformats.org/drawingml/2006/main" xmlns:r="http://schemas.openxmlformats.org/officeDocument/2006/relationships" xmlns:p="http://schemas.openxmlformats.org/presentationml/2006/main">
-  <p:cSld>
-    <p:spTree>
-      <p:nvGrpSpPr>
-        <p:cNvPr id="1" name="">
-          <a:extLst>
-            <a:ext uri="{FF2B5EF4-FFF2-40B4-BE49-F238E27FC236}">
-              <a16:creationId xmlns:a16="http://schemas.microsoft.com/office/drawing/2014/main" id="{C68A1F4F-6727-2547-F9FB-4E29691E7377}"/>
-            </a:ext>
-          </a:extLst>
-        </p:cNvPr>
-        <p:cNvGrpSpPr/>
-        <p:nvPr/>
-      </p:nvGrpSpPr>
-      <p:grpSpPr>
-        <a:xfrm>
-          <a:off x="0" y="0"/>
-          <a:ext cx="0" cy="0"/>
-          <a:chOff x="0" y="0"/>
-          <a:chExt cx="0" cy="0"/>
-        </a:xfrm>
-      </p:grpSpPr>
-      <p:sp>
-        <p:nvSpPr>
-          <p:cNvPr id="5" name="Slide Number Placeholder 4">
-            <a:extLst>
-              <a:ext uri="{FF2B5EF4-FFF2-40B4-BE49-F238E27FC236}">
-                <a16:creationId xmlns:a16="http://schemas.microsoft.com/office/drawing/2014/main" id="{9A60C8CE-F6D0-87C1-EF74-CE0C84210712}"/>
-              </a:ext>
-            </a:extLst>
-          </p:cNvPr>
-          <p:cNvSpPr>
-            <a:spLocks noGrp="1"/>
-          </p:cNvSpPr>
-          <p:nvPr>
-            <p:ph type="sldNum" sz="quarter" idx="11"/>
-          </p:nvPr>
-        </p:nvSpPr>
-        <p:spPr/>
-        <p:txBody>
-          <a:bodyPr/>
-          <a:lstStyle/>
-          <a:p>
-            <a:fld id="{294A09A9-5501-47C1-A89A-A340965A2BE2}" type="slidenum">
-              <a:rPr lang="en-US" smtClean="0"/>
-              <a:pPr/>
-              <a:t>12</a:t>
-            </a:fld>
-            <a:endParaRPr lang="en-US" dirty="0"/>
-          </a:p>
-        </p:txBody>
-      </p:sp>
-      <p:sp>
-        <p:nvSpPr>
-          <p:cNvPr id="6" name="Title 68">
-            <a:extLst>
-              <a:ext uri="{FF2B5EF4-FFF2-40B4-BE49-F238E27FC236}">
-                <a16:creationId xmlns:a16="http://schemas.microsoft.com/office/drawing/2014/main" id="{5CEB102C-4324-40FC-4FBC-45884EEF60C7}"/>
-              </a:ext>
-            </a:extLst>
-          </p:cNvPr>
-          <p:cNvSpPr txBox="1">
-            <a:spLocks/>
-          </p:cNvSpPr>
-          <p:nvPr/>
-        </p:nvSpPr>
-        <p:spPr>
-          <a:xfrm>
-            <a:off x="1656588" y="136365"/>
-            <a:ext cx="8878824" cy="1069848"/>
-          </a:xfrm>
-          <a:prstGeom prst="rect">
-            <a:avLst/>
-          </a:prstGeom>
-        </p:spPr>
-        <p:txBody>
-          <a:bodyPr vert="horz" lIns="91440" tIns="45720" rIns="91440" bIns="45720" rtlCol="0" anchor="b">
-            <a:noAutofit/>
-          </a:bodyPr>
-          <a:lstStyle>
-            <a:lvl1pPr algn="ctr" defTabSz="914400" rtl="0" eaLnBrk="1" latinLnBrk="0" hangingPunct="1">
-              <a:lnSpc>
-                <a:spcPct val="90000"/>
-              </a:lnSpc>
-              <a:spcBef>
-                <a:spcPct val="0"/>
-              </a:spcBef>
-              <a:buNone/>
-              <a:defRPr sz="4000" b="1" kern="1200" cap="all" spc="600" baseline="0">
-                <a:solidFill>
-                  <a:schemeClr val="bg1"/>
-                </a:solidFill>
-                <a:latin typeface="+mj-lt"/>
-                <a:ea typeface="+mj-ea"/>
-                <a:cs typeface="+mj-cs"/>
-              </a:defRPr>
-            </a:lvl1pPr>
-          </a:lstStyle>
-          <a:p>
-            <a:r>
-              <a:rPr lang="en-US" dirty="0"/>
-              <a:t>Supervised Models 4</a:t>
-            </a:r>
-          </a:p>
-        </p:txBody>
-      </p:sp>
-      <p:sp>
-        <p:nvSpPr>
-          <p:cNvPr id="9" name="Title 68">
-            <a:extLst>
-              <a:ext uri="{FF2B5EF4-FFF2-40B4-BE49-F238E27FC236}">
-                <a16:creationId xmlns:a16="http://schemas.microsoft.com/office/drawing/2014/main" id="{1B016062-2B86-449A-8B55-0029F7CC78E3}"/>
-              </a:ext>
-            </a:extLst>
-          </p:cNvPr>
-          <p:cNvSpPr txBox="1">
-            <a:spLocks/>
-          </p:cNvSpPr>
-          <p:nvPr/>
-        </p:nvSpPr>
-        <p:spPr>
-          <a:xfrm>
-            <a:off x="1632204" y="903268"/>
-            <a:ext cx="8878824" cy="1069848"/>
-          </a:xfrm>
-          <a:prstGeom prst="rect">
-            <a:avLst/>
-          </a:prstGeom>
-        </p:spPr>
-        <p:txBody>
-          <a:bodyPr vert="horz" lIns="91440" tIns="45720" rIns="91440" bIns="45720" rtlCol="0" anchor="b">
-            <a:noAutofit/>
-          </a:bodyPr>
-          <a:lstStyle>
-            <a:lvl1pPr algn="ctr" defTabSz="914400" rtl="0" eaLnBrk="1" latinLnBrk="0" hangingPunct="1">
-              <a:lnSpc>
-                <a:spcPct val="90000"/>
-              </a:lnSpc>
-              <a:spcBef>
-                <a:spcPct val="0"/>
-              </a:spcBef>
-              <a:buNone/>
-              <a:defRPr sz="4000" b="1" kern="1200" cap="all" spc="600" baseline="0">
-                <a:solidFill>
-                  <a:schemeClr val="bg1"/>
-                </a:solidFill>
-                <a:latin typeface="+mj-lt"/>
-                <a:ea typeface="+mj-ea"/>
-                <a:cs typeface="+mj-cs"/>
-              </a:defRPr>
-            </a:lvl1pPr>
-          </a:lstStyle>
-          <a:p>
-            <a:r>
-              <a:rPr lang="en-US" sz="2800" dirty="0"/>
-              <a:t>Confusion Matrix</a:t>
-            </a:r>
-          </a:p>
-        </p:txBody>
-      </p:sp>
-      <p:pic>
-        <p:nvPicPr>
-          <p:cNvPr id="15" name="Picture 14" descr="A screenshot of a color chart&#10;&#10;AI-generated content may be incorrect.">
-            <a:extLst>
-              <a:ext uri="{FF2B5EF4-FFF2-40B4-BE49-F238E27FC236}">
-                <a16:creationId xmlns:a16="http://schemas.microsoft.com/office/drawing/2014/main" id="{1D5BCF86-8111-B883-9BE8-DE97A2336D66}"/>
-              </a:ext>
-            </a:extLst>
-          </p:cNvPr>
-          <p:cNvPicPr>
-            <a:picLocks noChangeAspect="1"/>
-          </p:cNvPicPr>
-          <p:nvPr/>
-        </p:nvPicPr>
-        <p:blipFill>
-          <a:blip r:embed="rId2"/>
-          <a:stretch>
-            <a:fillRect/>
-          </a:stretch>
-        </p:blipFill>
-        <p:spPr>
-          <a:xfrm>
-            <a:off x="0" y="0"/>
-            <a:ext cx="6168018" cy="6858000"/>
-          </a:xfrm>
-          <a:prstGeom prst="rect">
-            <a:avLst/>
-          </a:prstGeom>
-        </p:spPr>
-      </p:pic>
-    </p:spTree>
-    <p:extLst>
-      <p:ext uri="{BB962C8B-B14F-4D97-AF65-F5344CB8AC3E}">
-        <p14:creationId xmlns:p14="http://schemas.microsoft.com/office/powerpoint/2010/main" val="2627658711"/>
       </p:ext>
     </p:extLst>
   </p:cSld>

</xml_diff>

<commit_message>
Report and Presentation v1.3
</commit_message>
<xml_diff>
--- a/CSCI441 Project Presentation.pptx
+++ b/CSCI441 Project Presentation.pptx
@@ -5,7 +5,7 @@
     <p:sldMasterId id="2147483648" r:id="rId4"/>
   </p:sldMasterIdLst>
   <p:notesMasterIdLst>
-    <p:notesMasterId r:id="rId24"/>
+    <p:notesMasterId r:id="rId25"/>
   </p:notesMasterIdLst>
   <p:sldIdLst>
     <p:sldId id="530" r:id="rId5"/>
@@ -20,13 +20,14 @@
     <p:sldId id="536" r:id="rId14"/>
     <p:sldId id="550" r:id="rId15"/>
     <p:sldId id="545" r:id="rId16"/>
-    <p:sldId id="537" r:id="rId17"/>
-    <p:sldId id="538" r:id="rId18"/>
-    <p:sldId id="539" r:id="rId19"/>
-    <p:sldId id="540" r:id="rId20"/>
-    <p:sldId id="541" r:id="rId21"/>
-    <p:sldId id="543" r:id="rId22"/>
-    <p:sldId id="544" r:id="rId23"/>
+    <p:sldId id="551" r:id="rId17"/>
+    <p:sldId id="552" r:id="rId18"/>
+    <p:sldId id="553" r:id="rId19"/>
+    <p:sldId id="554" r:id="rId20"/>
+    <p:sldId id="555" r:id="rId21"/>
+    <p:sldId id="556" r:id="rId22"/>
+    <p:sldId id="538" r:id="rId23"/>
+    <p:sldId id="544" r:id="rId24"/>
   </p:sldIdLst>
   <p:sldSz cx="12192000" cy="6858000"/>
   <p:notesSz cx="6858000" cy="9144000"/>
@@ -9908,8 +9909,8 @@
         </p:nvSpPr>
         <p:spPr>
           <a:xfrm>
-            <a:off x="1365705" y="1005155"/>
-            <a:ext cx="9243233" cy="4978750"/>
+            <a:off x="1087395" y="1005154"/>
+            <a:ext cx="9910119" cy="5235007"/>
           </a:xfrm>
           <a:prstGeom prst="roundRect">
             <a:avLst>
@@ -10360,10 +10361,9 @@
           </a:lstStyle>
           <a:p>
             <a:r>
-              <a:rPr lang="en-US"/>
+              <a:rPr lang="en-US" dirty="0"/>
               <a:t>Click to edit Master title style</a:t>
             </a:r>
-            <a:endParaRPr lang="en-US" dirty="0"/>
           </a:p>
         </p:txBody>
       </p:sp>
@@ -10385,7 +10385,7 @@
         </p:nvSpPr>
         <p:spPr>
           <a:xfrm>
-            <a:off x="2560320" y="3803904"/>
+            <a:off x="2559156" y="3217605"/>
             <a:ext cx="7068312" cy="758952"/>
           </a:xfrm>
         </p:spPr>
@@ -11060,7 +11060,7 @@
         </p:nvCxnSpPr>
         <p:spPr>
           <a:xfrm rot="5400000">
-            <a:off x="6095999" y="2597191"/>
+            <a:off x="6096000" y="854889"/>
             <a:ext cx="0" cy="1655180"/>
           </a:xfrm>
           <a:prstGeom prst="line">
@@ -20102,7 +20102,13 @@
   <p:cSld>
     <p:spTree>
       <p:nvGrpSpPr>
-        <p:cNvPr id="1" name=""/>
+        <p:cNvPr id="1" name="">
+          <a:extLst>
+            <a:ext uri="{FF2B5EF4-FFF2-40B4-BE49-F238E27FC236}">
+              <a16:creationId xmlns:a16="http://schemas.microsoft.com/office/drawing/2014/main" id="{920775F5-D95C-A98C-BE9E-C8648A202C4F}"/>
+            </a:ext>
+          </a:extLst>
+        </p:cNvPr>
         <p:cNvGrpSpPr/>
         <p:nvPr/>
       </p:nvGrpSpPr>
@@ -20114,714 +20120,12 @@
           <a:chExt cx="0" cy="0"/>
         </a:xfrm>
       </p:grpSpPr>
-      <p:grpSp>
-        <p:nvGrpSpPr>
-          <p:cNvPr id="4" name="Group 3">
-            <a:extLst>
-              <a:ext uri="{FF2B5EF4-FFF2-40B4-BE49-F238E27FC236}">
-                <a16:creationId xmlns:a16="http://schemas.microsoft.com/office/drawing/2014/main" id="{B4C44EC9-F730-00B6-E479-530EC276D851}"/>
-              </a:ext>
-              <a:ext uri="{C183D7F6-B498-43B3-948B-1728B52AA6E4}">
-                <adec:decorative xmlns:adec="http://schemas.microsoft.com/office/drawing/2017/decorative" val="1"/>
-              </a:ext>
-            </a:extLst>
-          </p:cNvPr>
-          <p:cNvGrpSpPr/>
-          <p:nvPr/>
-        </p:nvGrpSpPr>
-        <p:grpSpPr>
-          <a:xfrm rot="10800000">
-            <a:off x="1497321" y="2736484"/>
-            <a:ext cx="1512407" cy="938717"/>
-            <a:chOff x="4779792" y="2384561"/>
-            <a:chExt cx="3365480" cy="2088878"/>
-          </a:xfrm>
-          <a:solidFill>
-            <a:schemeClr val="accent6">
-              <a:alpha val="50231"/>
-            </a:schemeClr>
-          </a:solidFill>
-        </p:grpSpPr>
-        <p:sp>
-          <p:nvSpPr>
-            <p:cNvPr id="5" name="Freeform 4">
-              <a:extLst>
-                <a:ext uri="{FF2B5EF4-FFF2-40B4-BE49-F238E27FC236}">
-                  <a16:creationId xmlns:a16="http://schemas.microsoft.com/office/drawing/2014/main" id="{8B6D2F8E-4F98-B89F-E4FB-DD9F900821E1}"/>
-                </a:ext>
-              </a:extLst>
-            </p:cNvPr>
-            <p:cNvSpPr/>
-            <p:nvPr/>
-          </p:nvSpPr>
-          <p:spPr>
-            <a:xfrm flipH="1">
-              <a:off x="6582137" y="2384561"/>
-              <a:ext cx="1563135" cy="2088878"/>
-            </a:xfrm>
-            <a:custGeom>
-              <a:avLst/>
-              <a:gdLst>
-                <a:gd name="connsiteX0" fmla="*/ 520700 w 1041400"/>
-                <a:gd name="connsiteY0" fmla="*/ 0 h 1391663"/>
-                <a:gd name="connsiteX1" fmla="*/ 0 w 1041400"/>
-                <a:gd name="connsiteY1" fmla="*/ 520700 h 1391663"/>
-                <a:gd name="connsiteX2" fmla="*/ 601 w 1041400"/>
-                <a:gd name="connsiteY2" fmla="*/ 526665 h 1391663"/>
-                <a:gd name="connsiteX3" fmla="*/ 0 w 1041400"/>
-                <a:gd name="connsiteY3" fmla="*/ 530884 h 1391663"/>
-                <a:gd name="connsiteX4" fmla="*/ 839841 w 1041400"/>
-                <a:gd name="connsiteY4" fmla="*/ 1391663 h 1391663"/>
-                <a:gd name="connsiteX5" fmla="*/ 596988 w 1041400"/>
-                <a:gd name="connsiteY5" fmla="*/ 1070463 h 1391663"/>
-                <a:gd name="connsiteX6" fmla="*/ 595327 w 1041400"/>
-                <a:gd name="connsiteY6" fmla="*/ 1033877 h 1391663"/>
-                <a:gd name="connsiteX7" fmla="*/ 625639 w 1041400"/>
-                <a:gd name="connsiteY7" fmla="*/ 1030821 h 1391663"/>
-                <a:gd name="connsiteX8" fmla="*/ 1041400 w 1041400"/>
-                <a:gd name="connsiteY8" fmla="*/ 520700 h 1391663"/>
-                <a:gd name="connsiteX9" fmla="*/ 520700 w 1041400"/>
-                <a:gd name="connsiteY9" fmla="*/ 0 h 1391663"/>
-              </a:gdLst>
-              <a:ahLst/>
-              <a:cxnLst>
-                <a:cxn ang="0">
-                  <a:pos x="connsiteX0" y="connsiteY0"/>
-                </a:cxn>
-                <a:cxn ang="0">
-                  <a:pos x="connsiteX1" y="connsiteY1"/>
-                </a:cxn>
-                <a:cxn ang="0">
-                  <a:pos x="connsiteX2" y="connsiteY2"/>
-                </a:cxn>
-                <a:cxn ang="0">
-                  <a:pos x="connsiteX3" y="connsiteY3"/>
-                </a:cxn>
-                <a:cxn ang="0">
-                  <a:pos x="connsiteX4" y="connsiteY4"/>
-                </a:cxn>
-                <a:cxn ang="0">
-                  <a:pos x="connsiteX5" y="connsiteY5"/>
-                </a:cxn>
-                <a:cxn ang="0">
-                  <a:pos x="connsiteX6" y="connsiteY6"/>
-                </a:cxn>
-                <a:cxn ang="0">
-                  <a:pos x="connsiteX7" y="connsiteY7"/>
-                </a:cxn>
-                <a:cxn ang="0">
-                  <a:pos x="connsiteX8" y="connsiteY8"/>
-                </a:cxn>
-                <a:cxn ang="0">
-                  <a:pos x="connsiteX9" y="connsiteY9"/>
-                </a:cxn>
-              </a:cxnLst>
-              <a:rect l="l" t="t" r="r" b="b"/>
-              <a:pathLst>
-                <a:path w="1041400" h="1391663">
-                  <a:moveTo>
-                    <a:pt x="520700" y="0"/>
-                  </a:moveTo>
-                  <a:cubicBezTo>
-                    <a:pt x="233125" y="0"/>
-                    <a:pt x="0" y="233125"/>
-                    <a:pt x="0" y="520700"/>
-                  </a:cubicBezTo>
-                  <a:lnTo>
-                    <a:pt x="601" y="526665"/>
-                  </a:lnTo>
-                  <a:lnTo>
-                    <a:pt x="0" y="530884"/>
-                  </a:lnTo>
-                  <a:cubicBezTo>
-                    <a:pt x="1270" y="763309"/>
-                    <a:pt x="141037" y="1339599"/>
-                    <a:pt x="839841" y="1391663"/>
-                  </a:cubicBezTo>
-                  <a:cubicBezTo>
-                    <a:pt x="756282" y="1328754"/>
-                    <a:pt x="622088" y="1243235"/>
-                    <a:pt x="596988" y="1070463"/>
-                  </a:cubicBezTo>
-                  <a:lnTo>
-                    <a:pt x="595327" y="1033877"/>
-                  </a:lnTo>
-                  <a:lnTo>
-                    <a:pt x="625639" y="1030821"/>
-                  </a:lnTo>
-                  <a:cubicBezTo>
-                    <a:pt x="862914" y="982268"/>
-                    <a:pt x="1041400" y="772328"/>
-                    <a:pt x="1041400" y="520700"/>
-                  </a:cubicBezTo>
-                  <a:cubicBezTo>
-                    <a:pt x="1041400" y="233125"/>
-                    <a:pt x="808275" y="0"/>
-                    <a:pt x="520700" y="0"/>
-                  </a:cubicBezTo>
-                  <a:close/>
-                </a:path>
-              </a:pathLst>
-            </a:custGeom>
-            <a:grpFill/>
-            <a:ln>
-              <a:noFill/>
-            </a:ln>
-          </p:spPr>
-          <p:style>
-            <a:lnRef idx="2">
-              <a:schemeClr val="accent1">
-                <a:shade val="50000"/>
-              </a:schemeClr>
-            </a:lnRef>
-            <a:fillRef idx="1">
-              <a:schemeClr val="accent1"/>
-            </a:fillRef>
-            <a:effectRef idx="0">
-              <a:schemeClr val="accent1"/>
-            </a:effectRef>
-            <a:fontRef idx="minor">
-              <a:schemeClr val="lt1"/>
-            </a:fontRef>
-          </p:style>
-          <p:txBody>
-            <a:bodyPr wrap="square" rtlCol="0" anchor="ctr">
-              <a:noAutofit/>
-            </a:bodyPr>
-            <a:lstStyle/>
-            <a:p>
-              <a:pPr algn="ctr"/>
-              <a:endParaRPr lang="en-US" dirty="0"/>
-            </a:p>
-          </p:txBody>
-        </p:sp>
-        <p:sp>
-          <p:nvSpPr>
-            <p:cNvPr id="6" name="Freeform 5">
-              <a:extLst>
-                <a:ext uri="{FF2B5EF4-FFF2-40B4-BE49-F238E27FC236}">
-                  <a16:creationId xmlns:a16="http://schemas.microsoft.com/office/drawing/2014/main" id="{99EBD7AD-ED91-CC5F-0110-3EE43A60F946}"/>
-                </a:ext>
-              </a:extLst>
-            </p:cNvPr>
-            <p:cNvSpPr/>
-            <p:nvPr/>
-          </p:nvSpPr>
-          <p:spPr>
-            <a:xfrm flipH="1">
-              <a:off x="4779792" y="2384561"/>
-              <a:ext cx="1563135" cy="2088878"/>
-            </a:xfrm>
-            <a:custGeom>
-              <a:avLst/>
-              <a:gdLst>
-                <a:gd name="connsiteX0" fmla="*/ 520700 w 1041400"/>
-                <a:gd name="connsiteY0" fmla="*/ 0 h 1391663"/>
-                <a:gd name="connsiteX1" fmla="*/ 0 w 1041400"/>
-                <a:gd name="connsiteY1" fmla="*/ 520700 h 1391663"/>
-                <a:gd name="connsiteX2" fmla="*/ 601 w 1041400"/>
-                <a:gd name="connsiteY2" fmla="*/ 526665 h 1391663"/>
-                <a:gd name="connsiteX3" fmla="*/ 0 w 1041400"/>
-                <a:gd name="connsiteY3" fmla="*/ 530884 h 1391663"/>
-                <a:gd name="connsiteX4" fmla="*/ 839841 w 1041400"/>
-                <a:gd name="connsiteY4" fmla="*/ 1391663 h 1391663"/>
-                <a:gd name="connsiteX5" fmla="*/ 596988 w 1041400"/>
-                <a:gd name="connsiteY5" fmla="*/ 1070463 h 1391663"/>
-                <a:gd name="connsiteX6" fmla="*/ 595327 w 1041400"/>
-                <a:gd name="connsiteY6" fmla="*/ 1033877 h 1391663"/>
-                <a:gd name="connsiteX7" fmla="*/ 625639 w 1041400"/>
-                <a:gd name="connsiteY7" fmla="*/ 1030821 h 1391663"/>
-                <a:gd name="connsiteX8" fmla="*/ 1041400 w 1041400"/>
-                <a:gd name="connsiteY8" fmla="*/ 520700 h 1391663"/>
-                <a:gd name="connsiteX9" fmla="*/ 520700 w 1041400"/>
-                <a:gd name="connsiteY9" fmla="*/ 0 h 1391663"/>
-              </a:gdLst>
-              <a:ahLst/>
-              <a:cxnLst>
-                <a:cxn ang="0">
-                  <a:pos x="connsiteX0" y="connsiteY0"/>
-                </a:cxn>
-                <a:cxn ang="0">
-                  <a:pos x="connsiteX1" y="connsiteY1"/>
-                </a:cxn>
-                <a:cxn ang="0">
-                  <a:pos x="connsiteX2" y="connsiteY2"/>
-                </a:cxn>
-                <a:cxn ang="0">
-                  <a:pos x="connsiteX3" y="connsiteY3"/>
-                </a:cxn>
-                <a:cxn ang="0">
-                  <a:pos x="connsiteX4" y="connsiteY4"/>
-                </a:cxn>
-                <a:cxn ang="0">
-                  <a:pos x="connsiteX5" y="connsiteY5"/>
-                </a:cxn>
-                <a:cxn ang="0">
-                  <a:pos x="connsiteX6" y="connsiteY6"/>
-                </a:cxn>
-                <a:cxn ang="0">
-                  <a:pos x="connsiteX7" y="connsiteY7"/>
-                </a:cxn>
-                <a:cxn ang="0">
-                  <a:pos x="connsiteX8" y="connsiteY8"/>
-                </a:cxn>
-                <a:cxn ang="0">
-                  <a:pos x="connsiteX9" y="connsiteY9"/>
-                </a:cxn>
-              </a:cxnLst>
-              <a:rect l="l" t="t" r="r" b="b"/>
-              <a:pathLst>
-                <a:path w="1041400" h="1391663">
-                  <a:moveTo>
-                    <a:pt x="520700" y="0"/>
-                  </a:moveTo>
-                  <a:cubicBezTo>
-                    <a:pt x="233125" y="0"/>
-                    <a:pt x="0" y="233125"/>
-                    <a:pt x="0" y="520700"/>
-                  </a:cubicBezTo>
-                  <a:lnTo>
-                    <a:pt x="601" y="526665"/>
-                  </a:lnTo>
-                  <a:lnTo>
-                    <a:pt x="0" y="530884"/>
-                  </a:lnTo>
-                  <a:cubicBezTo>
-                    <a:pt x="1270" y="763309"/>
-                    <a:pt x="141037" y="1339599"/>
-                    <a:pt x="839841" y="1391663"/>
-                  </a:cubicBezTo>
-                  <a:cubicBezTo>
-                    <a:pt x="756282" y="1328754"/>
-                    <a:pt x="622088" y="1243235"/>
-                    <a:pt x="596988" y="1070463"/>
-                  </a:cubicBezTo>
-                  <a:lnTo>
-                    <a:pt x="595327" y="1033877"/>
-                  </a:lnTo>
-                  <a:lnTo>
-                    <a:pt x="625639" y="1030821"/>
-                  </a:lnTo>
-                  <a:cubicBezTo>
-                    <a:pt x="862914" y="982268"/>
-                    <a:pt x="1041400" y="772328"/>
-                    <a:pt x="1041400" y="520700"/>
-                  </a:cubicBezTo>
-                  <a:cubicBezTo>
-                    <a:pt x="1041400" y="233125"/>
-                    <a:pt x="808275" y="0"/>
-                    <a:pt x="520700" y="0"/>
-                  </a:cubicBezTo>
-                  <a:close/>
-                </a:path>
-              </a:pathLst>
-            </a:custGeom>
-            <a:grpFill/>
-            <a:ln>
-              <a:noFill/>
-            </a:ln>
-          </p:spPr>
-          <p:style>
-            <a:lnRef idx="2">
-              <a:schemeClr val="accent1">
-                <a:shade val="50000"/>
-              </a:schemeClr>
-            </a:lnRef>
-            <a:fillRef idx="1">
-              <a:schemeClr val="accent1"/>
-            </a:fillRef>
-            <a:effectRef idx="0">
-              <a:schemeClr val="accent1"/>
-            </a:effectRef>
-            <a:fontRef idx="minor">
-              <a:schemeClr val="lt1"/>
-            </a:fontRef>
-          </p:style>
-          <p:txBody>
-            <a:bodyPr wrap="square" rtlCol="0" anchor="ctr">
-              <a:noAutofit/>
-            </a:bodyPr>
-            <a:lstStyle/>
-            <a:p>
-              <a:pPr algn="ctr"/>
-              <a:endParaRPr lang="en-US" dirty="0"/>
-            </a:p>
-          </p:txBody>
-        </p:sp>
-      </p:grpSp>
-      <p:grpSp>
-        <p:nvGrpSpPr>
-          <p:cNvPr id="7" name="Group 6">
-            <a:extLst>
-              <a:ext uri="{FF2B5EF4-FFF2-40B4-BE49-F238E27FC236}">
-                <a16:creationId xmlns:a16="http://schemas.microsoft.com/office/drawing/2014/main" id="{56B0BED4-B4D2-A8C2-9E8E-FA7D1819E15A}"/>
-              </a:ext>
-              <a:ext uri="{C183D7F6-B498-43B3-948B-1728B52AA6E4}">
-                <adec:decorative xmlns:adec="http://schemas.microsoft.com/office/drawing/2017/decorative" val="1"/>
-              </a:ext>
-            </a:extLst>
-          </p:cNvPr>
-          <p:cNvGrpSpPr/>
-          <p:nvPr/>
-        </p:nvGrpSpPr>
-        <p:grpSpPr>
-          <a:xfrm>
-            <a:off x="9199707" y="3205843"/>
-            <a:ext cx="1512408" cy="938718"/>
-            <a:chOff x="4779792" y="2384561"/>
-            <a:chExt cx="3365480" cy="2088878"/>
-          </a:xfrm>
-          <a:solidFill>
-            <a:schemeClr val="accent1">
-              <a:alpha val="48174"/>
-            </a:schemeClr>
-          </a:solidFill>
-        </p:grpSpPr>
-        <p:sp>
-          <p:nvSpPr>
-            <p:cNvPr id="8" name="Freeform 1">
-              <a:extLst>
-                <a:ext uri="{FF2B5EF4-FFF2-40B4-BE49-F238E27FC236}">
-                  <a16:creationId xmlns:a16="http://schemas.microsoft.com/office/drawing/2014/main" id="{B542C6FD-B908-03BB-DE9D-1E76EE849265}"/>
-                </a:ext>
-              </a:extLst>
-            </p:cNvPr>
-            <p:cNvSpPr/>
-            <p:nvPr/>
-          </p:nvSpPr>
-          <p:spPr>
-            <a:xfrm flipH="1">
-              <a:off x="6582137" y="2384561"/>
-              <a:ext cx="1563135" cy="2088878"/>
-            </a:xfrm>
-            <a:custGeom>
-              <a:avLst/>
-              <a:gdLst>
-                <a:gd name="connsiteX0" fmla="*/ 520700 w 1041400"/>
-                <a:gd name="connsiteY0" fmla="*/ 0 h 1391663"/>
-                <a:gd name="connsiteX1" fmla="*/ 0 w 1041400"/>
-                <a:gd name="connsiteY1" fmla="*/ 520700 h 1391663"/>
-                <a:gd name="connsiteX2" fmla="*/ 601 w 1041400"/>
-                <a:gd name="connsiteY2" fmla="*/ 526665 h 1391663"/>
-                <a:gd name="connsiteX3" fmla="*/ 0 w 1041400"/>
-                <a:gd name="connsiteY3" fmla="*/ 530884 h 1391663"/>
-                <a:gd name="connsiteX4" fmla="*/ 839841 w 1041400"/>
-                <a:gd name="connsiteY4" fmla="*/ 1391663 h 1391663"/>
-                <a:gd name="connsiteX5" fmla="*/ 596988 w 1041400"/>
-                <a:gd name="connsiteY5" fmla="*/ 1070463 h 1391663"/>
-                <a:gd name="connsiteX6" fmla="*/ 595327 w 1041400"/>
-                <a:gd name="connsiteY6" fmla="*/ 1033877 h 1391663"/>
-                <a:gd name="connsiteX7" fmla="*/ 625639 w 1041400"/>
-                <a:gd name="connsiteY7" fmla="*/ 1030821 h 1391663"/>
-                <a:gd name="connsiteX8" fmla="*/ 1041400 w 1041400"/>
-                <a:gd name="connsiteY8" fmla="*/ 520700 h 1391663"/>
-                <a:gd name="connsiteX9" fmla="*/ 520700 w 1041400"/>
-                <a:gd name="connsiteY9" fmla="*/ 0 h 1391663"/>
-              </a:gdLst>
-              <a:ahLst/>
-              <a:cxnLst>
-                <a:cxn ang="0">
-                  <a:pos x="connsiteX0" y="connsiteY0"/>
-                </a:cxn>
-                <a:cxn ang="0">
-                  <a:pos x="connsiteX1" y="connsiteY1"/>
-                </a:cxn>
-                <a:cxn ang="0">
-                  <a:pos x="connsiteX2" y="connsiteY2"/>
-                </a:cxn>
-                <a:cxn ang="0">
-                  <a:pos x="connsiteX3" y="connsiteY3"/>
-                </a:cxn>
-                <a:cxn ang="0">
-                  <a:pos x="connsiteX4" y="connsiteY4"/>
-                </a:cxn>
-                <a:cxn ang="0">
-                  <a:pos x="connsiteX5" y="connsiteY5"/>
-                </a:cxn>
-                <a:cxn ang="0">
-                  <a:pos x="connsiteX6" y="connsiteY6"/>
-                </a:cxn>
-                <a:cxn ang="0">
-                  <a:pos x="connsiteX7" y="connsiteY7"/>
-                </a:cxn>
-                <a:cxn ang="0">
-                  <a:pos x="connsiteX8" y="connsiteY8"/>
-                </a:cxn>
-                <a:cxn ang="0">
-                  <a:pos x="connsiteX9" y="connsiteY9"/>
-                </a:cxn>
-              </a:cxnLst>
-              <a:rect l="l" t="t" r="r" b="b"/>
-              <a:pathLst>
-                <a:path w="1041400" h="1391663">
-                  <a:moveTo>
-                    <a:pt x="520700" y="0"/>
-                  </a:moveTo>
-                  <a:cubicBezTo>
-                    <a:pt x="233125" y="0"/>
-                    <a:pt x="0" y="233125"/>
-                    <a:pt x="0" y="520700"/>
-                  </a:cubicBezTo>
-                  <a:lnTo>
-                    <a:pt x="601" y="526665"/>
-                  </a:lnTo>
-                  <a:lnTo>
-                    <a:pt x="0" y="530884"/>
-                  </a:lnTo>
-                  <a:cubicBezTo>
-                    <a:pt x="1270" y="763309"/>
-                    <a:pt x="141037" y="1339599"/>
-                    <a:pt x="839841" y="1391663"/>
-                  </a:cubicBezTo>
-                  <a:cubicBezTo>
-                    <a:pt x="756282" y="1328754"/>
-                    <a:pt x="622088" y="1243235"/>
-                    <a:pt x="596988" y="1070463"/>
-                  </a:cubicBezTo>
-                  <a:lnTo>
-                    <a:pt x="595327" y="1033877"/>
-                  </a:lnTo>
-                  <a:lnTo>
-                    <a:pt x="625639" y="1030821"/>
-                  </a:lnTo>
-                  <a:cubicBezTo>
-                    <a:pt x="862914" y="982268"/>
-                    <a:pt x="1041400" y="772328"/>
-                    <a:pt x="1041400" y="520700"/>
-                  </a:cubicBezTo>
-                  <a:cubicBezTo>
-                    <a:pt x="1041400" y="233125"/>
-                    <a:pt x="808275" y="0"/>
-                    <a:pt x="520700" y="0"/>
-                  </a:cubicBezTo>
-                  <a:close/>
-                </a:path>
-              </a:pathLst>
-            </a:custGeom>
-            <a:grpFill/>
-            <a:ln>
-              <a:noFill/>
-            </a:ln>
-          </p:spPr>
-          <p:style>
-            <a:lnRef idx="2">
-              <a:schemeClr val="accent1">
-                <a:shade val="50000"/>
-              </a:schemeClr>
-            </a:lnRef>
-            <a:fillRef idx="1">
-              <a:schemeClr val="accent1"/>
-            </a:fillRef>
-            <a:effectRef idx="0">
-              <a:schemeClr val="accent1"/>
-            </a:effectRef>
-            <a:fontRef idx="minor">
-              <a:schemeClr val="lt1"/>
-            </a:fontRef>
-          </p:style>
-          <p:txBody>
-            <a:bodyPr wrap="square" rtlCol="0" anchor="ctr">
-              <a:noAutofit/>
-            </a:bodyPr>
-            <a:lstStyle/>
-            <a:p>
-              <a:pPr algn="ctr"/>
-              <a:endParaRPr lang="en-US" dirty="0"/>
-            </a:p>
-          </p:txBody>
-        </p:sp>
-        <p:sp>
-          <p:nvSpPr>
-            <p:cNvPr id="9" name="Freeform 21">
-              <a:extLst>
-                <a:ext uri="{FF2B5EF4-FFF2-40B4-BE49-F238E27FC236}">
-                  <a16:creationId xmlns:a16="http://schemas.microsoft.com/office/drawing/2014/main" id="{594F7F18-2B8D-7493-904B-1BD252DFC677}"/>
-                </a:ext>
-              </a:extLst>
-            </p:cNvPr>
-            <p:cNvSpPr/>
-            <p:nvPr/>
-          </p:nvSpPr>
-          <p:spPr>
-            <a:xfrm flipH="1">
-              <a:off x="4779792" y="2384561"/>
-              <a:ext cx="1563135" cy="2088878"/>
-            </a:xfrm>
-            <a:custGeom>
-              <a:avLst/>
-              <a:gdLst>
-                <a:gd name="connsiteX0" fmla="*/ 520700 w 1041400"/>
-                <a:gd name="connsiteY0" fmla="*/ 0 h 1391663"/>
-                <a:gd name="connsiteX1" fmla="*/ 0 w 1041400"/>
-                <a:gd name="connsiteY1" fmla="*/ 520700 h 1391663"/>
-                <a:gd name="connsiteX2" fmla="*/ 601 w 1041400"/>
-                <a:gd name="connsiteY2" fmla="*/ 526665 h 1391663"/>
-                <a:gd name="connsiteX3" fmla="*/ 0 w 1041400"/>
-                <a:gd name="connsiteY3" fmla="*/ 530884 h 1391663"/>
-                <a:gd name="connsiteX4" fmla="*/ 839841 w 1041400"/>
-                <a:gd name="connsiteY4" fmla="*/ 1391663 h 1391663"/>
-                <a:gd name="connsiteX5" fmla="*/ 596988 w 1041400"/>
-                <a:gd name="connsiteY5" fmla="*/ 1070463 h 1391663"/>
-                <a:gd name="connsiteX6" fmla="*/ 595327 w 1041400"/>
-                <a:gd name="connsiteY6" fmla="*/ 1033877 h 1391663"/>
-                <a:gd name="connsiteX7" fmla="*/ 625639 w 1041400"/>
-                <a:gd name="connsiteY7" fmla="*/ 1030821 h 1391663"/>
-                <a:gd name="connsiteX8" fmla="*/ 1041400 w 1041400"/>
-                <a:gd name="connsiteY8" fmla="*/ 520700 h 1391663"/>
-                <a:gd name="connsiteX9" fmla="*/ 520700 w 1041400"/>
-                <a:gd name="connsiteY9" fmla="*/ 0 h 1391663"/>
-              </a:gdLst>
-              <a:ahLst/>
-              <a:cxnLst>
-                <a:cxn ang="0">
-                  <a:pos x="connsiteX0" y="connsiteY0"/>
-                </a:cxn>
-                <a:cxn ang="0">
-                  <a:pos x="connsiteX1" y="connsiteY1"/>
-                </a:cxn>
-                <a:cxn ang="0">
-                  <a:pos x="connsiteX2" y="connsiteY2"/>
-                </a:cxn>
-                <a:cxn ang="0">
-                  <a:pos x="connsiteX3" y="connsiteY3"/>
-                </a:cxn>
-                <a:cxn ang="0">
-                  <a:pos x="connsiteX4" y="connsiteY4"/>
-                </a:cxn>
-                <a:cxn ang="0">
-                  <a:pos x="connsiteX5" y="connsiteY5"/>
-                </a:cxn>
-                <a:cxn ang="0">
-                  <a:pos x="connsiteX6" y="connsiteY6"/>
-                </a:cxn>
-                <a:cxn ang="0">
-                  <a:pos x="connsiteX7" y="connsiteY7"/>
-                </a:cxn>
-                <a:cxn ang="0">
-                  <a:pos x="connsiteX8" y="connsiteY8"/>
-                </a:cxn>
-                <a:cxn ang="0">
-                  <a:pos x="connsiteX9" y="connsiteY9"/>
-                </a:cxn>
-              </a:cxnLst>
-              <a:rect l="l" t="t" r="r" b="b"/>
-              <a:pathLst>
-                <a:path w="1041400" h="1391663">
-                  <a:moveTo>
-                    <a:pt x="520700" y="0"/>
-                  </a:moveTo>
-                  <a:cubicBezTo>
-                    <a:pt x="233125" y="0"/>
-                    <a:pt x="0" y="233125"/>
-                    <a:pt x="0" y="520700"/>
-                  </a:cubicBezTo>
-                  <a:lnTo>
-                    <a:pt x="601" y="526665"/>
-                  </a:lnTo>
-                  <a:lnTo>
-                    <a:pt x="0" y="530884"/>
-                  </a:lnTo>
-                  <a:cubicBezTo>
-                    <a:pt x="1270" y="763309"/>
-                    <a:pt x="141037" y="1339599"/>
-                    <a:pt x="839841" y="1391663"/>
-                  </a:cubicBezTo>
-                  <a:cubicBezTo>
-                    <a:pt x="756282" y="1328754"/>
-                    <a:pt x="622088" y="1243235"/>
-                    <a:pt x="596988" y="1070463"/>
-                  </a:cubicBezTo>
-                  <a:lnTo>
-                    <a:pt x="595327" y="1033877"/>
-                  </a:lnTo>
-                  <a:lnTo>
-                    <a:pt x="625639" y="1030821"/>
-                  </a:lnTo>
-                  <a:cubicBezTo>
-                    <a:pt x="862914" y="982268"/>
-                    <a:pt x="1041400" y="772328"/>
-                    <a:pt x="1041400" y="520700"/>
-                  </a:cubicBezTo>
-                  <a:cubicBezTo>
-                    <a:pt x="1041400" y="233125"/>
-                    <a:pt x="808275" y="0"/>
-                    <a:pt x="520700" y="0"/>
-                  </a:cubicBezTo>
-                  <a:close/>
-                </a:path>
-              </a:pathLst>
-            </a:custGeom>
-            <a:grpFill/>
-            <a:ln>
-              <a:noFill/>
-            </a:ln>
-          </p:spPr>
-          <p:style>
-            <a:lnRef idx="2">
-              <a:schemeClr val="accent1">
-                <a:shade val="50000"/>
-              </a:schemeClr>
-            </a:lnRef>
-            <a:fillRef idx="1">
-              <a:schemeClr val="accent1"/>
-            </a:fillRef>
-            <a:effectRef idx="0">
-              <a:schemeClr val="accent1"/>
-            </a:effectRef>
-            <a:fontRef idx="minor">
-              <a:schemeClr val="lt1"/>
-            </a:fontRef>
-          </p:style>
-          <p:txBody>
-            <a:bodyPr wrap="square" rtlCol="0" anchor="ctr">
-              <a:noAutofit/>
-            </a:bodyPr>
-            <a:lstStyle/>
-            <a:p>
-              <a:pPr algn="ctr"/>
-              <a:endParaRPr lang="en-US" dirty="0"/>
-            </a:p>
-          </p:txBody>
-        </p:sp>
-      </p:grpSp>
-      <p:sp>
-        <p:nvSpPr>
-          <p:cNvPr id="2" name="Title 1">
-            <a:extLst>
-              <a:ext uri="{FF2B5EF4-FFF2-40B4-BE49-F238E27FC236}">
-                <a16:creationId xmlns:a16="http://schemas.microsoft.com/office/drawing/2014/main" id="{D04F090D-C862-CF85-1001-A82E54365597}"/>
-              </a:ext>
-            </a:extLst>
-          </p:cNvPr>
-          <p:cNvSpPr>
-            <a:spLocks noGrp="1"/>
-          </p:cNvSpPr>
-          <p:nvPr>
-            <p:ph type="ctrTitle"/>
-          </p:nvPr>
-        </p:nvSpPr>
-        <p:spPr/>
-        <p:txBody>
-          <a:bodyPr/>
-          <a:lstStyle/>
-          <a:p>
-            <a:r>
-              <a:rPr lang="en-US" dirty="0"/>
-              <a:t>WEALTH IS THE ABILITY TO FULLY EXPERIENCE LIFE.</a:t>
-            </a:r>
-            <a:br>
-              <a:rPr lang="en-US" dirty="0"/>
-            </a:br>
-            <a:endParaRPr lang="en-US" dirty="0"/>
-          </a:p>
-        </p:txBody>
-      </p:sp>
       <p:sp>
         <p:nvSpPr>
           <p:cNvPr id="3" name="Subtitle 2">
             <a:extLst>
               <a:ext uri="{FF2B5EF4-FFF2-40B4-BE49-F238E27FC236}">
-                <a16:creationId xmlns:a16="http://schemas.microsoft.com/office/drawing/2014/main" id="{4CE82C04-6445-9E02-B0E8-8D809278C37D}"/>
+                <a16:creationId xmlns:a16="http://schemas.microsoft.com/office/drawing/2014/main" id="{4D52C426-CE73-1BA2-0C88-E3BF03C6CAC4}"/>
               </a:ext>
             </a:extLst>
           </p:cNvPr>
@@ -20832,14 +20136,79 @@
             <p:ph type="subTitle" idx="1"/>
           </p:nvPr>
         </p:nvSpPr>
-        <p:spPr/>
+        <p:spPr>
+          <a:xfrm>
+            <a:off x="1749287" y="2154009"/>
+            <a:ext cx="8693425" cy="1821644"/>
+          </a:xfrm>
+        </p:spPr>
         <p:txBody>
           <a:bodyPr/>
           <a:lstStyle/>
           <a:p>
             <a:r>
               <a:rPr lang="en-US" dirty="0"/>
-              <a:t>-Henry David Thoreau</a:t>
+              <a:t>To determine whether the data naturally clusters into meaningful groups that resemble UP/DOWN behavior, we used the unsupervised clustering model K-Means</a:t>
+            </a:r>
+          </a:p>
+          <a:p>
+            <a:r>
+              <a:rPr lang="en-US" dirty="0"/>
+              <a:t>This model required scaling and reduction</a:t>
+            </a:r>
+          </a:p>
+        </p:txBody>
+      </p:sp>
+      <p:sp>
+        <p:nvSpPr>
+          <p:cNvPr id="6" name="Title 68">
+            <a:extLst>
+              <a:ext uri="{FF2B5EF4-FFF2-40B4-BE49-F238E27FC236}">
+                <a16:creationId xmlns:a16="http://schemas.microsoft.com/office/drawing/2014/main" id="{1499850B-A2BC-41FD-28A1-892F0A427897}"/>
+              </a:ext>
+            </a:extLst>
+          </p:cNvPr>
+          <p:cNvSpPr txBox="1">
+            <a:spLocks/>
+          </p:cNvSpPr>
+          <p:nvPr/>
+        </p:nvSpPr>
+        <p:spPr>
+          <a:xfrm>
+            <a:off x="1656588" y="136365"/>
+            <a:ext cx="8878824" cy="1069848"/>
+          </a:xfrm>
+          <a:prstGeom prst="rect">
+            <a:avLst/>
+          </a:prstGeom>
+        </p:spPr>
+        <p:txBody>
+          <a:bodyPr vert="horz" lIns="91440" tIns="45720" rIns="91440" bIns="45720" rtlCol="0" anchor="b">
+            <a:noAutofit/>
+          </a:bodyPr>
+          <a:lstStyle>
+            <a:lvl1pPr algn="ctr" defTabSz="914400" rtl="0" eaLnBrk="1" latinLnBrk="0" hangingPunct="1">
+              <a:lnSpc>
+                <a:spcPct val="90000"/>
+              </a:lnSpc>
+              <a:spcBef>
+                <a:spcPct val="0"/>
+              </a:spcBef>
+              <a:buNone/>
+              <a:defRPr sz="4000" b="1" kern="1200" cap="all" spc="600" baseline="0">
+                <a:solidFill>
+                  <a:schemeClr val="bg1"/>
+                </a:solidFill>
+                <a:latin typeface="+mj-lt"/>
+                <a:ea typeface="+mj-ea"/>
+                <a:cs typeface="+mj-cs"/>
+              </a:defRPr>
+            </a:lvl1pPr>
+          </a:lstStyle>
+          <a:p>
+            <a:r>
+              <a:rPr lang="en-US" dirty="0"/>
+              <a:t>Unsupervised Learning 1</a:t>
             </a:r>
           </a:p>
         </p:txBody>
@@ -20847,7 +20216,7 @@
     </p:spTree>
     <p:extLst>
       <p:ext uri="{BB962C8B-B14F-4D97-AF65-F5344CB8AC3E}">
-        <p14:creationId xmlns:p14="http://schemas.microsoft.com/office/powerpoint/2010/main" val="1213210011"/>
+        <p14:creationId xmlns:p14="http://schemas.microsoft.com/office/powerpoint/2010/main" val="1227695966"/>
       </p:ext>
     </p:extLst>
   </p:cSld>
@@ -20862,7 +20231,13 @@
   <p:cSld>
     <p:spTree>
       <p:nvGrpSpPr>
-        <p:cNvPr id="1" name=""/>
+        <p:cNvPr id="1" name="">
+          <a:extLst>
+            <a:ext uri="{FF2B5EF4-FFF2-40B4-BE49-F238E27FC236}">
+              <a16:creationId xmlns:a16="http://schemas.microsoft.com/office/drawing/2014/main" id="{2B90CE0A-6548-5767-A9D7-B46750E6E8D4}"/>
+            </a:ext>
+          </a:extLst>
+        </p:cNvPr>
         <p:cNvGrpSpPr/>
         <p:nvPr/>
       </p:nvGrpSpPr>
@@ -20876,10 +20251,10 @@
       </p:grpSpPr>
       <p:sp>
         <p:nvSpPr>
-          <p:cNvPr id="2" name="Title 1">
-            <a:extLst>
-              <a:ext uri="{FF2B5EF4-FFF2-40B4-BE49-F238E27FC236}">
-                <a16:creationId xmlns:a16="http://schemas.microsoft.com/office/drawing/2014/main" id="{D249E45E-D6A7-9780-F652-BAF86DFBCC00}"/>
+          <p:cNvPr id="3" name="Subtitle 2">
+            <a:extLst>
+              <a:ext uri="{FF2B5EF4-FFF2-40B4-BE49-F238E27FC236}">
+                <a16:creationId xmlns:a16="http://schemas.microsoft.com/office/drawing/2014/main" id="{B3A12689-E441-22D4-078E-F189AA44BDD0}"/>
               </a:ext>
             </a:extLst>
           </p:cNvPr>
@@ -20887,228 +20262,171 @@
             <a:spLocks noGrp="1"/>
           </p:cNvSpPr>
           <p:nvPr>
-            <p:ph type="title"/>
+            <p:ph idx="1"/>
           </p:nvPr>
         </p:nvSpPr>
-        <p:spPr/>
+        <p:spPr>
+          <a:xfrm>
+            <a:off x="880207" y="2562838"/>
+            <a:ext cx="3174957" cy="3282696"/>
+          </a:xfrm>
+        </p:spPr>
         <p:txBody>
           <a:bodyPr/>
           <a:lstStyle/>
           <a:p>
+            <a:pPr marL="0" indent="0">
+              <a:buNone/>
+            </a:pPr>
+            <a:r>
+              <a:rPr lang="en-US" sz="2000" dirty="0"/>
+              <a:t>First, we decided to try at K=2 clusters, which is the same number of classes in the target column</a:t>
+            </a:r>
+          </a:p>
+        </p:txBody>
+      </p:sp>
+      <p:sp>
+        <p:nvSpPr>
+          <p:cNvPr id="6" name="Title 68">
+            <a:extLst>
+              <a:ext uri="{FF2B5EF4-FFF2-40B4-BE49-F238E27FC236}">
+                <a16:creationId xmlns:a16="http://schemas.microsoft.com/office/drawing/2014/main" id="{B48DB76B-7F85-19F8-DEA7-0E44CF42C11F}"/>
+              </a:ext>
+            </a:extLst>
+          </p:cNvPr>
+          <p:cNvSpPr txBox="1">
+            <a:spLocks/>
+          </p:cNvSpPr>
+          <p:nvPr/>
+        </p:nvSpPr>
+        <p:spPr>
+          <a:xfrm>
+            <a:off x="1656588" y="136365"/>
+            <a:ext cx="8878824" cy="1069848"/>
+          </a:xfrm>
+          <a:prstGeom prst="rect">
+            <a:avLst/>
+          </a:prstGeom>
+        </p:spPr>
+        <p:txBody>
+          <a:bodyPr vert="horz" lIns="91440" tIns="45720" rIns="91440" bIns="45720" rtlCol="0" anchor="b">
+            <a:noAutofit/>
+          </a:bodyPr>
+          <a:lstStyle>
+            <a:lvl1pPr algn="ctr" defTabSz="914400" rtl="0" eaLnBrk="1" latinLnBrk="0" hangingPunct="1">
+              <a:lnSpc>
+                <a:spcPct val="90000"/>
+              </a:lnSpc>
+              <a:spcBef>
+                <a:spcPct val="0"/>
+              </a:spcBef>
+              <a:buNone/>
+              <a:defRPr sz="4000" b="1" kern="1200" cap="all" spc="600" baseline="0">
+                <a:solidFill>
+                  <a:schemeClr val="bg1"/>
+                </a:solidFill>
+                <a:latin typeface="+mj-lt"/>
+                <a:ea typeface="+mj-ea"/>
+                <a:cs typeface="+mj-cs"/>
+              </a:defRPr>
+            </a:lvl1pPr>
+          </a:lstStyle>
+          <a:p>
             <a:r>
               <a:rPr lang="en-US" dirty="0"/>
-              <a:t>AREAS OF FOCUS</a:t>
-            </a:r>
-          </a:p>
-        </p:txBody>
-      </p:sp>
-      <p:sp>
-        <p:nvSpPr>
-          <p:cNvPr id="8" name="Slide Number Placeholder 7">
-            <a:extLst>
-              <a:ext uri="{FF2B5EF4-FFF2-40B4-BE49-F238E27FC236}">
-                <a16:creationId xmlns:a16="http://schemas.microsoft.com/office/drawing/2014/main" id="{85577A64-4E94-69E1-3180-1E014BD06B3C}"/>
-              </a:ext>
-            </a:extLst>
-          </p:cNvPr>
-          <p:cNvSpPr>
-            <a:spLocks noGrp="1"/>
+              <a:t>Unsupervised Learning 2</a:t>
+            </a:r>
+          </a:p>
+        </p:txBody>
+      </p:sp>
+      <p:sp>
+        <p:nvSpPr>
+          <p:cNvPr id="7" name="Title 68">
+            <a:extLst>
+              <a:ext uri="{FF2B5EF4-FFF2-40B4-BE49-F238E27FC236}">
+                <a16:creationId xmlns:a16="http://schemas.microsoft.com/office/drawing/2014/main" id="{454F4B2F-11E9-4722-8686-A5F226832D17}"/>
+              </a:ext>
+            </a:extLst>
+          </p:cNvPr>
+          <p:cNvSpPr txBox="1">
+            <a:spLocks/>
           </p:cNvSpPr>
-          <p:nvPr>
-            <p:ph type="sldNum" sz="quarter" idx="12"/>
-          </p:nvPr>
-        </p:nvSpPr>
-        <p:spPr/>
-        <p:txBody>
-          <a:bodyPr/>
-          <a:lstStyle/>
-          <a:p>
-            <a:fld id="{294A09A9-5501-47C1-A89A-A340965A2BE2}" type="slidenum">
-              <a:rPr lang="en-US" smtClean="0"/>
-              <a:t>14</a:t>
-            </a:fld>
-            <a:endParaRPr lang="en-US" dirty="0"/>
-          </a:p>
-        </p:txBody>
-      </p:sp>
-      <p:sp>
-        <p:nvSpPr>
-          <p:cNvPr id="3" name="Text Placeholder 2">
-            <a:extLst>
-              <a:ext uri="{FF2B5EF4-FFF2-40B4-BE49-F238E27FC236}">
-                <a16:creationId xmlns:a16="http://schemas.microsoft.com/office/drawing/2014/main" id="{C31605EE-24B6-95D8-DE5E-BEC2F03ECECA}"/>
-              </a:ext>
-            </a:extLst>
-          </p:cNvPr>
-          <p:cNvSpPr>
-            <a:spLocks noGrp="1"/>
-          </p:cNvSpPr>
-          <p:nvPr>
-            <p:ph type="body" idx="1"/>
-          </p:nvPr>
-        </p:nvSpPr>
-        <p:spPr/>
-        <p:txBody>
-          <a:bodyPr/>
-          <a:lstStyle/>
-          <a:p>
-            <a:r>
-              <a:rPr lang="en-US" dirty="0"/>
-              <a:t>Portfolio diversification</a:t>
-            </a:r>
-          </a:p>
-        </p:txBody>
-      </p:sp>
-      <p:sp>
-        <p:nvSpPr>
-          <p:cNvPr id="4" name="Content Placeholder 3">
-            <a:extLst>
-              <a:ext uri="{FF2B5EF4-FFF2-40B4-BE49-F238E27FC236}">
-                <a16:creationId xmlns:a16="http://schemas.microsoft.com/office/drawing/2014/main" id="{BE22F651-7ABC-015D-B5C4-622708A64CB1}"/>
-              </a:ext>
-            </a:extLst>
-          </p:cNvPr>
-          <p:cNvSpPr>
-            <a:spLocks noGrp="1"/>
-          </p:cNvSpPr>
-          <p:nvPr>
-            <p:ph sz="half" idx="2"/>
-          </p:nvPr>
-        </p:nvSpPr>
-        <p:spPr/>
-        <p:txBody>
-          <a:bodyPr/>
-          <a:lstStyle/>
-          <a:p>
-            <a:r>
-              <a:rPr lang="en-US" dirty="0"/>
-              <a:t>Develop winning combinations to stay ahead of the market</a:t>
-            </a:r>
-          </a:p>
-          <a:p>
-            <a:r>
-              <a:rPr lang="en-US" dirty="0"/>
-              <a:t>Capitalize on direct ownership of digital coins</a:t>
-            </a:r>
-          </a:p>
-          <a:p>
-            <a:r>
-              <a:rPr lang="en-US" dirty="0"/>
-              <a:t>Invest in multiple blockchains​</a:t>
-            </a:r>
-          </a:p>
-          <a:p>
-            <a:endParaRPr lang="en-US" dirty="0"/>
-          </a:p>
-        </p:txBody>
-      </p:sp>
-      <p:sp>
-        <p:nvSpPr>
-          <p:cNvPr id="5" name="Text Placeholder 4">
-            <a:extLst>
-              <a:ext uri="{FF2B5EF4-FFF2-40B4-BE49-F238E27FC236}">
-                <a16:creationId xmlns:a16="http://schemas.microsoft.com/office/drawing/2014/main" id="{6A1E0F07-3291-4EE2-1286-04C97165BA68}"/>
-              </a:ext>
-            </a:extLst>
-          </p:cNvPr>
-          <p:cNvSpPr>
-            <a:spLocks noGrp="1"/>
-          </p:cNvSpPr>
-          <p:nvPr>
-            <p:ph type="body" sz="quarter" idx="3"/>
-          </p:nvPr>
-        </p:nvSpPr>
-        <p:spPr/>
-        <p:txBody>
-          <a:bodyPr/>
-          <a:lstStyle/>
-          <a:p>
-            <a:r>
-              <a:rPr lang="en-US" dirty="0"/>
-              <a:t>Short and long-term goals</a:t>
-            </a:r>
-          </a:p>
-        </p:txBody>
-      </p:sp>
-      <p:sp>
-        <p:nvSpPr>
-          <p:cNvPr id="6" name="Content Placeholder 5">
-            <a:extLst>
-              <a:ext uri="{FF2B5EF4-FFF2-40B4-BE49-F238E27FC236}">
-                <a16:creationId xmlns:a16="http://schemas.microsoft.com/office/drawing/2014/main" id="{3DF22CC9-1295-2B21-05A9-68A44E669B8F}"/>
-              </a:ext>
-            </a:extLst>
-          </p:cNvPr>
-          <p:cNvSpPr>
-            <a:spLocks noGrp="1"/>
-          </p:cNvSpPr>
-          <p:nvPr>
-            <p:ph sz="quarter" idx="4"/>
-          </p:nvPr>
-        </p:nvSpPr>
-        <p:spPr/>
-        <p:txBody>
-          <a:bodyPr/>
-          <a:lstStyle/>
-          <a:p>
-            <a:r>
-              <a:rPr lang="en-US" dirty="0"/>
-              <a:t>Create an emergency fund</a:t>
-            </a:r>
-          </a:p>
-          <a:p>
-            <a:r>
-              <a:rPr lang="en-US" dirty="0"/>
-              <a:t>Add a second stream of income</a:t>
-            </a:r>
-          </a:p>
-          <a:p>
-            <a:r>
-              <a:rPr lang="en-US" dirty="0"/>
-              <a:t>Buy a house</a:t>
-            </a:r>
-          </a:p>
-          <a:p>
-            <a:r>
-              <a:rPr lang="en-US" dirty="0"/>
-              <a:t>Supplement retirement fund</a:t>
-            </a:r>
-          </a:p>
-        </p:txBody>
-      </p:sp>
-      <p:sp>
-        <p:nvSpPr>
-          <p:cNvPr id="7" name="Footer Placeholder 6">
-            <a:extLst>
-              <a:ext uri="{FF2B5EF4-FFF2-40B4-BE49-F238E27FC236}">
-                <a16:creationId xmlns:a16="http://schemas.microsoft.com/office/drawing/2014/main" id="{A9F57080-19CA-8BBA-6050-8494551D4615}"/>
-              </a:ext>
-            </a:extLst>
-          </p:cNvPr>
-          <p:cNvSpPr>
-            <a:spLocks noGrp="1"/>
-          </p:cNvSpPr>
-          <p:nvPr>
-            <p:ph type="ftr" sz="quarter" idx="11"/>
-          </p:nvPr>
-        </p:nvSpPr>
-        <p:spPr/>
-        <p:txBody>
-          <a:bodyPr/>
-          <a:lstStyle/>
-          <a:p>
-            <a:r>
-              <a:rPr lang="en-US"/>
-              <a:t>Crypto: investing &amp; trading</a:t>
-            </a:r>
-            <a:endParaRPr lang="en-US" dirty="0"/>
-          </a:p>
-        </p:txBody>
-      </p:sp>
+          <p:nvPr/>
+        </p:nvSpPr>
+        <p:spPr>
+          <a:xfrm>
+            <a:off x="1632204" y="903268"/>
+            <a:ext cx="8878824" cy="1069848"/>
+          </a:xfrm>
+          <a:prstGeom prst="rect">
+            <a:avLst/>
+          </a:prstGeom>
+        </p:spPr>
+        <p:txBody>
+          <a:bodyPr vert="horz" lIns="91440" tIns="45720" rIns="91440" bIns="45720" rtlCol="0" anchor="b">
+            <a:noAutofit/>
+          </a:bodyPr>
+          <a:lstStyle>
+            <a:lvl1pPr algn="ctr" defTabSz="914400" rtl="0" eaLnBrk="1" latinLnBrk="0" hangingPunct="1">
+              <a:lnSpc>
+                <a:spcPct val="90000"/>
+              </a:lnSpc>
+              <a:spcBef>
+                <a:spcPct val="0"/>
+              </a:spcBef>
+              <a:buNone/>
+              <a:defRPr sz="4000" b="1" kern="1200" cap="all" spc="600" baseline="0">
+                <a:solidFill>
+                  <a:schemeClr val="bg1"/>
+                </a:solidFill>
+                <a:latin typeface="+mj-lt"/>
+                <a:ea typeface="+mj-ea"/>
+                <a:cs typeface="+mj-cs"/>
+              </a:defRPr>
+            </a:lvl1pPr>
+          </a:lstStyle>
+          <a:p>
+            <a:r>
+              <a:rPr lang="en-US" sz="2800" dirty="0"/>
+              <a:t>k=2 Clusters</a:t>
+            </a:r>
+          </a:p>
+        </p:txBody>
+      </p:sp>
+      <p:pic>
+        <p:nvPicPr>
+          <p:cNvPr id="9" name="Picture 8" descr="A yellow and purple dots with red x&#10;&#10;AI-generated content may be incorrect.">
+            <a:extLst>
+              <a:ext uri="{FF2B5EF4-FFF2-40B4-BE49-F238E27FC236}">
+                <a16:creationId xmlns:a16="http://schemas.microsoft.com/office/drawing/2014/main" id="{86E7433C-0BE0-28DD-2C91-6BB12F4D9B8D}"/>
+              </a:ext>
+            </a:extLst>
+          </p:cNvPr>
+          <p:cNvPicPr>
+            <a:picLocks noChangeAspect="1"/>
+          </p:cNvPicPr>
+          <p:nvPr/>
+        </p:nvPicPr>
+        <p:blipFill>
+          <a:blip r:embed="rId2"/>
+          <a:stretch>
+            <a:fillRect/>
+          </a:stretch>
+        </p:blipFill>
+        <p:spPr>
+          <a:xfrm>
+            <a:off x="4441328" y="2346955"/>
+            <a:ext cx="6585582" cy="3927949"/>
+          </a:xfrm>
+          <a:prstGeom prst="rect">
+            <a:avLst/>
+          </a:prstGeom>
+        </p:spPr>
+      </p:pic>
     </p:spTree>
     <p:extLst>
       <p:ext uri="{BB962C8B-B14F-4D97-AF65-F5344CB8AC3E}">
-        <p14:creationId xmlns:p14="http://schemas.microsoft.com/office/powerpoint/2010/main" val="765210901"/>
+        <p14:creationId xmlns:p14="http://schemas.microsoft.com/office/powerpoint/2010/main" val="258322640"/>
       </p:ext>
     </p:extLst>
   </p:cSld>
@@ -21123,7 +20441,13 @@
   <p:cSld>
     <p:spTree>
       <p:nvGrpSpPr>
-        <p:cNvPr id="1" name=""/>
+        <p:cNvPr id="1" name="">
+          <a:extLst>
+            <a:ext uri="{FF2B5EF4-FFF2-40B4-BE49-F238E27FC236}">
+              <a16:creationId xmlns:a16="http://schemas.microsoft.com/office/drawing/2014/main" id="{342EC955-25B2-D593-FB33-A12AE30980F6}"/>
+            </a:ext>
+          </a:extLst>
+        </p:cNvPr>
         <p:cNvGrpSpPr/>
         <p:nvPr/>
       </p:nvGrpSpPr>
@@ -21137,10 +20461,10 @@
       </p:grpSpPr>
       <p:sp>
         <p:nvSpPr>
-          <p:cNvPr id="2" name="Title 1">
-            <a:extLst>
-              <a:ext uri="{FF2B5EF4-FFF2-40B4-BE49-F238E27FC236}">
-                <a16:creationId xmlns:a16="http://schemas.microsoft.com/office/drawing/2014/main" id="{189E73D4-535B-6DCC-2268-43A5E9E12C45}"/>
+          <p:cNvPr id="3" name="Subtitle 2">
+            <a:extLst>
+              <a:ext uri="{FF2B5EF4-FFF2-40B4-BE49-F238E27FC236}">
+                <a16:creationId xmlns:a16="http://schemas.microsoft.com/office/drawing/2014/main" id="{73AF532B-E871-340E-31CC-D2563F401F27}"/>
               </a:ext>
             </a:extLst>
           </p:cNvPr>
@@ -21148,307 +20472,171 @@
             <a:spLocks noGrp="1"/>
           </p:cNvSpPr>
           <p:nvPr>
-            <p:ph type="title"/>
+            <p:ph idx="1"/>
           </p:nvPr>
         </p:nvSpPr>
-        <p:spPr/>
+        <p:spPr>
+          <a:xfrm>
+            <a:off x="880207" y="2562838"/>
+            <a:ext cx="3174957" cy="3282696"/>
+          </a:xfrm>
+        </p:spPr>
         <p:txBody>
           <a:bodyPr/>
           <a:lstStyle/>
           <a:p>
+            <a:pPr marL="0" indent="0">
+              <a:buNone/>
+            </a:pPr>
+            <a:r>
+              <a:rPr lang="en-US" sz="2000" dirty="0"/>
+              <a:t>Then we tried to find the optimal K using the elbow curve method</a:t>
+            </a:r>
+          </a:p>
+        </p:txBody>
+      </p:sp>
+      <p:sp>
+        <p:nvSpPr>
+          <p:cNvPr id="6" name="Title 68">
+            <a:extLst>
+              <a:ext uri="{FF2B5EF4-FFF2-40B4-BE49-F238E27FC236}">
+                <a16:creationId xmlns:a16="http://schemas.microsoft.com/office/drawing/2014/main" id="{0B75A80B-C9F4-DA85-04DF-6B40F8E2B03A}"/>
+              </a:ext>
+            </a:extLst>
+          </p:cNvPr>
+          <p:cNvSpPr txBox="1">
+            <a:spLocks/>
+          </p:cNvSpPr>
+          <p:nvPr/>
+        </p:nvSpPr>
+        <p:spPr>
+          <a:xfrm>
+            <a:off x="1656588" y="136365"/>
+            <a:ext cx="8878824" cy="1069848"/>
+          </a:xfrm>
+          <a:prstGeom prst="rect">
+            <a:avLst/>
+          </a:prstGeom>
+        </p:spPr>
+        <p:txBody>
+          <a:bodyPr vert="horz" lIns="91440" tIns="45720" rIns="91440" bIns="45720" rtlCol="0" anchor="b">
+            <a:noAutofit/>
+          </a:bodyPr>
+          <a:lstStyle>
+            <a:lvl1pPr algn="ctr" defTabSz="914400" rtl="0" eaLnBrk="1" latinLnBrk="0" hangingPunct="1">
+              <a:lnSpc>
+                <a:spcPct val="90000"/>
+              </a:lnSpc>
+              <a:spcBef>
+                <a:spcPct val="0"/>
+              </a:spcBef>
+              <a:buNone/>
+              <a:defRPr sz="4000" b="1" kern="1200" cap="all" spc="600" baseline="0">
+                <a:solidFill>
+                  <a:schemeClr val="bg1"/>
+                </a:solidFill>
+                <a:latin typeface="+mj-lt"/>
+                <a:ea typeface="+mj-ea"/>
+                <a:cs typeface="+mj-cs"/>
+              </a:defRPr>
+            </a:lvl1pPr>
+          </a:lstStyle>
+          <a:p>
             <a:r>
               <a:rPr lang="en-US" dirty="0"/>
-              <a:t>HOW TO GET THERE</a:t>
-            </a:r>
-          </a:p>
-        </p:txBody>
-      </p:sp>
-      <p:sp>
-        <p:nvSpPr>
-          <p:cNvPr id="6" name="Slide Number Placeholder 5">
-            <a:extLst>
-              <a:ext uri="{FF2B5EF4-FFF2-40B4-BE49-F238E27FC236}">
-                <a16:creationId xmlns:a16="http://schemas.microsoft.com/office/drawing/2014/main" id="{6459FCA3-0124-0FA6-220B-D72E8F8034C8}"/>
-              </a:ext>
-            </a:extLst>
-          </p:cNvPr>
-          <p:cNvSpPr>
-            <a:spLocks noGrp="1"/>
+              <a:t>Unsupervised Learning 3</a:t>
+            </a:r>
+          </a:p>
+        </p:txBody>
+      </p:sp>
+      <p:sp>
+        <p:nvSpPr>
+          <p:cNvPr id="7" name="Title 68">
+            <a:extLst>
+              <a:ext uri="{FF2B5EF4-FFF2-40B4-BE49-F238E27FC236}">
+                <a16:creationId xmlns:a16="http://schemas.microsoft.com/office/drawing/2014/main" id="{3A7DB783-28E1-CCC9-ED4D-5E75764A3C4F}"/>
+              </a:ext>
+            </a:extLst>
+          </p:cNvPr>
+          <p:cNvSpPr txBox="1">
+            <a:spLocks/>
           </p:cNvSpPr>
-          <p:nvPr>
-            <p:ph type="sldNum" sz="quarter" idx="12"/>
-          </p:nvPr>
-        </p:nvSpPr>
-        <p:spPr/>
-        <p:txBody>
-          <a:bodyPr/>
-          <a:lstStyle/>
-          <a:p>
-            <a:fld id="{294A09A9-5501-47C1-A89A-A340965A2BE2}" type="slidenum">
-              <a:rPr lang="en-US" smtClean="0"/>
-              <a:t>15</a:t>
-            </a:fld>
-            <a:endParaRPr lang="en-US" dirty="0"/>
-          </a:p>
-        </p:txBody>
-      </p:sp>
-      <p:sp>
-        <p:nvSpPr>
-          <p:cNvPr id="3" name="Text Placeholder 2">
-            <a:extLst>
-              <a:ext uri="{FF2B5EF4-FFF2-40B4-BE49-F238E27FC236}">
-                <a16:creationId xmlns:a16="http://schemas.microsoft.com/office/drawing/2014/main" id="{5830852F-3FB7-6D2E-F6AC-1F6B9CAD2158}"/>
-              </a:ext>
-            </a:extLst>
-          </p:cNvPr>
-          <p:cNvSpPr>
-            <a:spLocks noGrp="1"/>
-          </p:cNvSpPr>
-          <p:nvPr>
-            <p:ph type="body" idx="1"/>
-          </p:nvPr>
-        </p:nvSpPr>
-        <p:spPr/>
-        <p:txBody>
-          <a:bodyPr/>
-          <a:lstStyle/>
-          <a:p>
-            <a:r>
-              <a:rPr lang="en-US" dirty="0"/>
-              <a:t>Strategize</a:t>
-            </a:r>
-          </a:p>
-          <a:p>
-            <a:endParaRPr lang="en-US" dirty="0"/>
-          </a:p>
-        </p:txBody>
-      </p:sp>
-      <p:sp>
-        <p:nvSpPr>
-          <p:cNvPr id="10" name="Content Placeholder 9">
-            <a:extLst>
-              <a:ext uri="{FF2B5EF4-FFF2-40B4-BE49-F238E27FC236}">
-                <a16:creationId xmlns:a16="http://schemas.microsoft.com/office/drawing/2014/main" id="{E135D3F1-0C33-3404-5D49-E70C9D100F2A}"/>
-              </a:ext>
-            </a:extLst>
-          </p:cNvPr>
-          <p:cNvSpPr>
-            <a:spLocks noGrp="1"/>
-          </p:cNvSpPr>
-          <p:nvPr>
-            <p:ph sz="half" idx="2"/>
-          </p:nvPr>
-        </p:nvSpPr>
-        <p:spPr/>
-        <p:txBody>
-          <a:bodyPr/>
-          <a:lstStyle/>
-          <a:p>
-            <a:r>
-              <a:rPr lang="en-US" dirty="0"/>
-              <a:t>Do your research and develop a plan with goals</a:t>
-            </a:r>
-          </a:p>
-          <a:p>
-            <a:r>
-              <a:rPr lang="en-US" dirty="0"/>
-              <a:t>Diversify your portfolio through coin ownership​</a:t>
-            </a:r>
-          </a:p>
-          <a:p>
-            <a:r>
-              <a:rPr lang="en-US" dirty="0"/>
-              <a:t>Follow the markets closely​</a:t>
-            </a:r>
-          </a:p>
-          <a:p>
-            <a:endParaRPr lang="en-US" dirty="0"/>
-          </a:p>
-          <a:p>
-            <a:endParaRPr lang="en-US" dirty="0"/>
-          </a:p>
-          <a:p>
-            <a:endParaRPr lang="en-US" dirty="0"/>
-          </a:p>
-        </p:txBody>
-      </p:sp>
-      <p:sp>
-        <p:nvSpPr>
-          <p:cNvPr id="5" name="Text Placeholder 4">
-            <a:extLst>
-              <a:ext uri="{FF2B5EF4-FFF2-40B4-BE49-F238E27FC236}">
-                <a16:creationId xmlns:a16="http://schemas.microsoft.com/office/drawing/2014/main" id="{BE5F7BD8-DA37-58AB-1F45-D0F045DF4B7B}"/>
-              </a:ext>
-            </a:extLst>
-          </p:cNvPr>
-          <p:cNvSpPr>
-            <a:spLocks noGrp="1"/>
-          </p:cNvSpPr>
-          <p:nvPr>
-            <p:ph type="body" sz="quarter" idx="3"/>
-          </p:nvPr>
-        </p:nvSpPr>
-        <p:spPr/>
-        <p:txBody>
-          <a:bodyPr/>
-          <a:lstStyle/>
-          <a:p>
-            <a:r>
-              <a:rPr lang="en-US" dirty="0"/>
-              <a:t>Minimize risk</a:t>
-            </a:r>
-          </a:p>
-        </p:txBody>
-      </p:sp>
-      <p:sp>
-        <p:nvSpPr>
-          <p:cNvPr id="11" name="Content Placeholder 10">
-            <a:extLst>
-              <a:ext uri="{FF2B5EF4-FFF2-40B4-BE49-F238E27FC236}">
-                <a16:creationId xmlns:a16="http://schemas.microsoft.com/office/drawing/2014/main" id="{724F2AAC-B18D-1D49-15F1-2D69101664AA}"/>
-              </a:ext>
-            </a:extLst>
-          </p:cNvPr>
-          <p:cNvSpPr>
-            <a:spLocks noGrp="1"/>
-          </p:cNvSpPr>
-          <p:nvPr>
-            <p:ph sz="quarter" idx="4"/>
-          </p:nvPr>
-        </p:nvSpPr>
-        <p:spPr/>
-        <p:txBody>
-          <a:bodyPr/>
-          <a:lstStyle/>
-          <a:p>
-            <a:r>
-              <a:rPr lang="en-US" dirty="0"/>
-              <a:t>Be cautious of scams and "too good to be true" scenarios</a:t>
-            </a:r>
-          </a:p>
-          <a:p>
-            <a:r>
-              <a:rPr lang="en-US" dirty="0"/>
-              <a:t>Avoid "all-in" strategies</a:t>
-            </a:r>
-          </a:p>
-          <a:p>
-            <a:endParaRPr lang="en-US" dirty="0"/>
-          </a:p>
-          <a:p>
-            <a:endParaRPr lang="en-US" dirty="0"/>
-          </a:p>
-          <a:p>
-            <a:endParaRPr lang="en-US" dirty="0"/>
-          </a:p>
-        </p:txBody>
-      </p:sp>
-      <p:sp>
-        <p:nvSpPr>
-          <p:cNvPr id="12" name="Text Placeholder 11">
-            <a:extLst>
-              <a:ext uri="{FF2B5EF4-FFF2-40B4-BE49-F238E27FC236}">
-                <a16:creationId xmlns:a16="http://schemas.microsoft.com/office/drawing/2014/main" id="{5E68EFF0-69C3-F9AE-1107-E08A22BCF938}"/>
-              </a:ext>
-            </a:extLst>
-          </p:cNvPr>
-          <p:cNvSpPr>
-            <a:spLocks noGrp="1"/>
-          </p:cNvSpPr>
-          <p:nvPr>
-            <p:ph type="body" sz="quarter" idx="13"/>
-          </p:nvPr>
-        </p:nvSpPr>
-        <p:spPr/>
-        <p:txBody>
-          <a:bodyPr/>
-          <a:lstStyle/>
-          <a:p>
-            <a:r>
-              <a:rPr lang="en-US" dirty="0"/>
-              <a:t>Utilize resources</a:t>
-            </a:r>
-          </a:p>
-        </p:txBody>
-      </p:sp>
-      <p:sp>
-        <p:nvSpPr>
-          <p:cNvPr id="13" name="Content Placeholder 12">
-            <a:extLst>
-              <a:ext uri="{FF2B5EF4-FFF2-40B4-BE49-F238E27FC236}">
-                <a16:creationId xmlns:a16="http://schemas.microsoft.com/office/drawing/2014/main" id="{4D6980BD-0225-0DD6-3D62-B0B1E983AB52}"/>
-              </a:ext>
-            </a:extLst>
-          </p:cNvPr>
-          <p:cNvSpPr>
-            <a:spLocks noGrp="1"/>
-          </p:cNvSpPr>
-          <p:nvPr>
-            <p:ph sz="quarter" idx="14"/>
-          </p:nvPr>
+          <p:nvPr/>
         </p:nvSpPr>
         <p:spPr>
           <a:xfrm>
-            <a:off x="7973568" y="2743200"/>
-            <a:ext cx="3068680" cy="2578608"/>
-          </a:xfrm>
-        </p:spPr>
-        <p:txBody>
-          <a:bodyPr/>
-          <a:lstStyle/>
-          <a:p>
-            <a:r>
-              <a:rPr lang="en-US" dirty="0"/>
-              <a:t>Apps and platforms help streamline user experience</a:t>
-            </a:r>
-          </a:p>
-          <a:p>
-            <a:r>
-              <a:rPr lang="en-US" dirty="0"/>
-              <a:t>Seek expert guidance from Krypto Logics team members​</a:t>
-            </a:r>
-          </a:p>
-          <a:p>
-            <a:endParaRPr lang="en-US" dirty="0"/>
-          </a:p>
-          <a:p>
-            <a:endParaRPr lang="en-US" dirty="0"/>
-          </a:p>
-        </p:txBody>
-      </p:sp>
-      <p:sp>
-        <p:nvSpPr>
-          <p:cNvPr id="4" name="Footer Placeholder 3">
-            <a:extLst>
-              <a:ext uri="{FF2B5EF4-FFF2-40B4-BE49-F238E27FC236}">
-                <a16:creationId xmlns:a16="http://schemas.microsoft.com/office/drawing/2014/main" id="{A107ABA7-FC97-4D42-C4BC-897A88CF39AF}"/>
-              </a:ext>
-            </a:extLst>
-          </p:cNvPr>
-          <p:cNvSpPr>
-            <a:spLocks noGrp="1"/>
-          </p:cNvSpPr>
-          <p:nvPr>
-            <p:ph type="ftr" sz="quarter" idx="11"/>
-          </p:nvPr>
-        </p:nvSpPr>
-        <p:spPr/>
-        <p:txBody>
-          <a:bodyPr/>
-          <a:lstStyle/>
-          <a:p>
-            <a:r>
-              <a:rPr lang="en-US"/>
-              <a:t>Crypto: investing &amp; trading</a:t>
-            </a:r>
-            <a:endParaRPr lang="en-US" dirty="0"/>
-          </a:p>
-        </p:txBody>
-      </p:sp>
+            <a:off x="1632204" y="903268"/>
+            <a:ext cx="8878824" cy="1069848"/>
+          </a:xfrm>
+          <a:prstGeom prst="rect">
+            <a:avLst/>
+          </a:prstGeom>
+        </p:spPr>
+        <p:txBody>
+          <a:bodyPr vert="horz" lIns="91440" tIns="45720" rIns="91440" bIns="45720" rtlCol="0" anchor="b">
+            <a:noAutofit/>
+          </a:bodyPr>
+          <a:lstStyle>
+            <a:lvl1pPr algn="ctr" defTabSz="914400" rtl="0" eaLnBrk="1" latinLnBrk="0" hangingPunct="1">
+              <a:lnSpc>
+                <a:spcPct val="90000"/>
+              </a:lnSpc>
+              <a:spcBef>
+                <a:spcPct val="0"/>
+              </a:spcBef>
+              <a:buNone/>
+              <a:defRPr sz="4000" b="1" kern="1200" cap="all" spc="600" baseline="0">
+                <a:solidFill>
+                  <a:schemeClr val="bg1"/>
+                </a:solidFill>
+                <a:latin typeface="+mj-lt"/>
+                <a:ea typeface="+mj-ea"/>
+                <a:cs typeface="+mj-cs"/>
+              </a:defRPr>
+            </a:lvl1pPr>
+          </a:lstStyle>
+          <a:p>
+            <a:r>
+              <a:rPr lang="en-US" sz="2800" dirty="0"/>
+              <a:t>Elbow Curve</a:t>
+            </a:r>
+          </a:p>
+        </p:txBody>
+      </p:sp>
+      <p:pic>
+        <p:nvPicPr>
+          <p:cNvPr id="4" name="Picture 3" descr="A graph with a red line and blue dots&#10;&#10;AI-generated content may be incorrect.">
+            <a:extLst>
+              <a:ext uri="{FF2B5EF4-FFF2-40B4-BE49-F238E27FC236}">
+                <a16:creationId xmlns:a16="http://schemas.microsoft.com/office/drawing/2014/main" id="{B8302D6C-C546-3D21-CF0D-49C34B3F770A}"/>
+              </a:ext>
+            </a:extLst>
+          </p:cNvPr>
+          <p:cNvPicPr>
+            <a:picLocks noChangeAspect="1"/>
+          </p:cNvPicPr>
+          <p:nvPr/>
+        </p:nvPicPr>
+        <p:blipFill>
+          <a:blip r:embed="rId2"/>
+          <a:stretch>
+            <a:fillRect/>
+          </a:stretch>
+        </p:blipFill>
+        <p:spPr>
+          <a:xfrm>
+            <a:off x="4528990" y="2155926"/>
+            <a:ext cx="6592837" cy="4096520"/>
+          </a:xfrm>
+          <a:prstGeom prst="rect">
+            <a:avLst/>
+          </a:prstGeom>
+        </p:spPr>
+      </p:pic>
     </p:spTree>
     <p:extLst>
       <p:ext uri="{BB962C8B-B14F-4D97-AF65-F5344CB8AC3E}">
-        <p14:creationId xmlns:p14="http://schemas.microsoft.com/office/powerpoint/2010/main" val="1877080978"/>
+        <p14:creationId xmlns:p14="http://schemas.microsoft.com/office/powerpoint/2010/main" val="1193632650"/>
       </p:ext>
     </p:extLst>
   </p:cSld>
@@ -21463,7 +20651,13 @@
   <p:cSld>
     <p:spTree>
       <p:nvGrpSpPr>
-        <p:cNvPr id="1" name=""/>
+        <p:cNvPr id="1" name="">
+          <a:extLst>
+            <a:ext uri="{FF2B5EF4-FFF2-40B4-BE49-F238E27FC236}">
+              <a16:creationId xmlns:a16="http://schemas.microsoft.com/office/drawing/2014/main" id="{331DD6C1-3EFB-AE3B-845D-4B477DAA3C57}"/>
+            </a:ext>
+          </a:extLst>
+        </p:cNvPr>
         <p:cNvGrpSpPr/>
         <p:nvPr/>
       </p:nvGrpSpPr>
@@ -21477,10 +20671,148 @@
       </p:grpSpPr>
       <p:sp>
         <p:nvSpPr>
-          <p:cNvPr id="33" name="Title 32">
-            <a:extLst>
-              <a:ext uri="{FF2B5EF4-FFF2-40B4-BE49-F238E27FC236}">
-                <a16:creationId xmlns:a16="http://schemas.microsoft.com/office/drawing/2014/main" id="{57144164-5503-9D11-4F68-81F4CD378333}"/>
+          <p:cNvPr id="6" name="Title 68">
+            <a:extLst>
+              <a:ext uri="{FF2B5EF4-FFF2-40B4-BE49-F238E27FC236}">
+                <a16:creationId xmlns:a16="http://schemas.microsoft.com/office/drawing/2014/main" id="{C9286B75-9652-C69C-110E-373B1B5AFD57}"/>
+              </a:ext>
+            </a:extLst>
+          </p:cNvPr>
+          <p:cNvSpPr txBox="1">
+            <a:spLocks/>
+          </p:cNvSpPr>
+          <p:nvPr/>
+        </p:nvSpPr>
+        <p:spPr>
+          <a:xfrm>
+            <a:off x="1656588" y="136365"/>
+            <a:ext cx="8878824" cy="1069848"/>
+          </a:xfrm>
+          <a:prstGeom prst="rect">
+            <a:avLst/>
+          </a:prstGeom>
+        </p:spPr>
+        <p:txBody>
+          <a:bodyPr vert="horz" lIns="91440" tIns="45720" rIns="91440" bIns="45720" rtlCol="0" anchor="b">
+            <a:noAutofit/>
+          </a:bodyPr>
+          <a:lstStyle>
+            <a:lvl1pPr algn="ctr" defTabSz="914400" rtl="0" eaLnBrk="1" latinLnBrk="0" hangingPunct="1">
+              <a:lnSpc>
+                <a:spcPct val="90000"/>
+              </a:lnSpc>
+              <a:spcBef>
+                <a:spcPct val="0"/>
+              </a:spcBef>
+              <a:buNone/>
+              <a:defRPr sz="4000" b="1" kern="1200" cap="all" spc="600" baseline="0">
+                <a:solidFill>
+                  <a:schemeClr val="bg1"/>
+                </a:solidFill>
+                <a:latin typeface="+mj-lt"/>
+                <a:ea typeface="+mj-ea"/>
+                <a:cs typeface="+mj-cs"/>
+              </a:defRPr>
+            </a:lvl1pPr>
+          </a:lstStyle>
+          <a:p>
+            <a:r>
+              <a:rPr lang="en-US" dirty="0"/>
+              <a:t>Unsupervised Learning 4</a:t>
+            </a:r>
+          </a:p>
+        </p:txBody>
+      </p:sp>
+      <p:sp>
+        <p:nvSpPr>
+          <p:cNvPr id="7" name="Title 68">
+            <a:extLst>
+              <a:ext uri="{FF2B5EF4-FFF2-40B4-BE49-F238E27FC236}">
+                <a16:creationId xmlns:a16="http://schemas.microsoft.com/office/drawing/2014/main" id="{7860505E-0890-ACFA-8DBE-3DED36DD2192}"/>
+              </a:ext>
+            </a:extLst>
+          </p:cNvPr>
+          <p:cNvSpPr txBox="1">
+            <a:spLocks/>
+          </p:cNvSpPr>
+          <p:nvPr/>
+        </p:nvSpPr>
+        <p:spPr>
+          <a:xfrm>
+            <a:off x="1632204" y="903268"/>
+            <a:ext cx="8878824" cy="1069848"/>
+          </a:xfrm>
+          <a:prstGeom prst="rect">
+            <a:avLst/>
+          </a:prstGeom>
+        </p:spPr>
+        <p:txBody>
+          <a:bodyPr vert="horz" lIns="91440" tIns="45720" rIns="91440" bIns="45720" rtlCol="0" anchor="b">
+            <a:noAutofit/>
+          </a:bodyPr>
+          <a:lstStyle>
+            <a:lvl1pPr algn="ctr" defTabSz="914400" rtl="0" eaLnBrk="1" latinLnBrk="0" hangingPunct="1">
+              <a:lnSpc>
+                <a:spcPct val="90000"/>
+              </a:lnSpc>
+              <a:spcBef>
+                <a:spcPct val="0"/>
+              </a:spcBef>
+              <a:buNone/>
+              <a:defRPr sz="4000" b="1" kern="1200" cap="all" spc="600" baseline="0">
+                <a:solidFill>
+                  <a:schemeClr val="bg1"/>
+                </a:solidFill>
+                <a:latin typeface="+mj-lt"/>
+                <a:ea typeface="+mj-ea"/>
+                <a:cs typeface="+mj-cs"/>
+              </a:defRPr>
+            </a:lvl1pPr>
+          </a:lstStyle>
+          <a:p>
+            <a:r>
+              <a:rPr lang="en-US" sz="2800" dirty="0"/>
+              <a:t>K=4 Clusters</a:t>
+            </a:r>
+          </a:p>
+        </p:txBody>
+      </p:sp>
+      <p:pic>
+        <p:nvPicPr>
+          <p:cNvPr id="9" name="Picture 8" descr="A diagram of a cluster of dots&#10;&#10;AI-generated content may be incorrect.">
+            <a:extLst>
+              <a:ext uri="{FF2B5EF4-FFF2-40B4-BE49-F238E27FC236}">
+                <a16:creationId xmlns:a16="http://schemas.microsoft.com/office/drawing/2014/main" id="{4F1BB3D1-E562-75B7-A9CF-7BFD11547BA3}"/>
+              </a:ext>
+            </a:extLst>
+          </p:cNvPr>
+          <p:cNvPicPr>
+            <a:picLocks noChangeAspect="1"/>
+          </p:cNvPicPr>
+          <p:nvPr/>
+        </p:nvPicPr>
+        <p:blipFill>
+          <a:blip r:embed="rId2"/>
+          <a:stretch>
+            <a:fillRect/>
+          </a:stretch>
+        </p:blipFill>
+        <p:spPr>
+          <a:xfrm>
+            <a:off x="5508658" y="2244786"/>
+            <a:ext cx="5717500" cy="4096380"/>
+          </a:xfrm>
+          <a:prstGeom prst="rect">
+            <a:avLst/>
+          </a:prstGeom>
+        </p:spPr>
+      </p:pic>
+      <p:sp>
+        <p:nvSpPr>
+          <p:cNvPr id="10" name="Subtitle 2">
+            <a:extLst>
+              <a:ext uri="{FF2B5EF4-FFF2-40B4-BE49-F238E27FC236}">
+                <a16:creationId xmlns:a16="http://schemas.microsoft.com/office/drawing/2014/main" id="{506ED22A-2D4F-1309-19B9-43DF9C8FA957}"/>
               </a:ext>
             </a:extLst>
           </p:cNvPr>
@@ -21488,400 +20820,33 @@
             <a:spLocks noGrp="1"/>
           </p:cNvSpPr>
           <p:nvPr>
-            <p:ph type="title"/>
+            <p:ph idx="1"/>
           </p:nvPr>
         </p:nvSpPr>
-        <p:spPr/>
+        <p:spPr>
+          <a:xfrm>
+            <a:off x="880207" y="2562838"/>
+            <a:ext cx="3174957" cy="3282696"/>
+          </a:xfrm>
+        </p:spPr>
         <p:txBody>
           <a:bodyPr/>
           <a:lstStyle/>
           <a:p>
-            <a:r>
-              <a:rPr lang="en-US" dirty="0"/>
-              <a:t>MEET OUR TEAM</a:t>
-            </a:r>
-          </a:p>
-        </p:txBody>
-      </p:sp>
-      <p:sp>
-        <p:nvSpPr>
-          <p:cNvPr id="11" name="Slide Number Placeholder 10">
-            <a:extLst>
-              <a:ext uri="{FF2B5EF4-FFF2-40B4-BE49-F238E27FC236}">
-                <a16:creationId xmlns:a16="http://schemas.microsoft.com/office/drawing/2014/main" id="{9816FD90-6ABD-5EA8-0870-E27733B9F685}"/>
-              </a:ext>
-            </a:extLst>
-          </p:cNvPr>
-          <p:cNvSpPr>
-            <a:spLocks noGrp="1"/>
-          </p:cNvSpPr>
-          <p:nvPr>
-            <p:ph type="sldNum" sz="quarter" idx="11"/>
-          </p:nvPr>
-        </p:nvSpPr>
-        <p:spPr/>
-        <p:txBody>
-          <a:bodyPr/>
-          <a:lstStyle/>
-          <a:p>
-            <a:fld id="{294A09A9-5501-47C1-A89A-A340965A2BE2}" type="slidenum">
-              <a:rPr lang="en-US" smtClean="0"/>
-              <a:pPr/>
-              <a:t>16</a:t>
-            </a:fld>
-            <a:endParaRPr lang="en-US" dirty="0"/>
-          </a:p>
-        </p:txBody>
-      </p:sp>
-      <p:pic>
-        <p:nvPicPr>
-          <p:cNvPr id="16" name="Picture Placeholder 15" descr="Team member head shot&#10;">
-            <a:extLst>
-              <a:ext uri="{FF2B5EF4-FFF2-40B4-BE49-F238E27FC236}">
-                <a16:creationId xmlns:a16="http://schemas.microsoft.com/office/drawing/2014/main" id="{675FEA7C-5201-0219-EAA4-51C8A3B8185E}"/>
-              </a:ext>
-            </a:extLst>
-          </p:cNvPr>
-          <p:cNvPicPr>
-            <a:picLocks noGrp="1" noChangeAspect="1"/>
-          </p:cNvPicPr>
-          <p:nvPr>
-            <p:ph type="pic" sz="quarter" idx="20"/>
-          </p:nvPr>
-        </p:nvPicPr>
-        <p:blipFill rotWithShape="1">
-          <a:blip r:embed="rId2"/>
-          <a:srcRect t="45" b="45"/>
-          <a:stretch/>
-        </p:blipFill>
-        <p:spPr/>
-      </p:pic>
-      <p:sp>
-        <p:nvSpPr>
-          <p:cNvPr id="3" name="Text Placeholder 2">
-            <a:extLst>
-              <a:ext uri="{FF2B5EF4-FFF2-40B4-BE49-F238E27FC236}">
-                <a16:creationId xmlns:a16="http://schemas.microsoft.com/office/drawing/2014/main" id="{CFC225EB-9239-A8F4-48C2-D2E44A245C26}"/>
-              </a:ext>
-            </a:extLst>
-          </p:cNvPr>
-          <p:cNvSpPr>
-            <a:spLocks noGrp="1"/>
-          </p:cNvSpPr>
-          <p:nvPr>
-            <p:ph type="body" sz="quarter" idx="12"/>
-          </p:nvPr>
-        </p:nvSpPr>
-        <p:spPr/>
-        <p:txBody>
-          <a:bodyPr/>
-          <a:lstStyle/>
-          <a:p>
-            <a:r>
-              <a:rPr lang="en-US" dirty="0"/>
-              <a:t>Takuma Hayashi​</a:t>
-            </a:r>
-          </a:p>
-        </p:txBody>
-      </p:sp>
-      <p:sp>
-        <p:nvSpPr>
-          <p:cNvPr id="4" name="Text Placeholder 3">
-            <a:extLst>
-              <a:ext uri="{FF2B5EF4-FFF2-40B4-BE49-F238E27FC236}">
-                <a16:creationId xmlns:a16="http://schemas.microsoft.com/office/drawing/2014/main" id="{BF63BCC4-AF80-8D3B-413B-3F80C74503EE}"/>
-              </a:ext>
-            </a:extLst>
-          </p:cNvPr>
-          <p:cNvSpPr>
-            <a:spLocks noGrp="1"/>
-          </p:cNvSpPr>
-          <p:nvPr>
-            <p:ph type="body" sz="quarter" idx="13"/>
-          </p:nvPr>
-        </p:nvSpPr>
-        <p:spPr/>
-        <p:txBody>
-          <a:bodyPr/>
-          <a:lstStyle/>
-          <a:p>
-            <a:r>
-              <a:rPr lang="en-US" dirty="0"/>
-              <a:t>President</a:t>
-            </a:r>
-          </a:p>
-        </p:txBody>
-      </p:sp>
-      <p:pic>
-        <p:nvPicPr>
-          <p:cNvPr id="17" name="Picture Placeholder 16" descr="Team member head shot&#10;">
-            <a:extLst>
-              <a:ext uri="{FF2B5EF4-FFF2-40B4-BE49-F238E27FC236}">
-                <a16:creationId xmlns:a16="http://schemas.microsoft.com/office/drawing/2014/main" id="{8B1E138F-E5F8-7188-0E7F-C61CC315F3CA}"/>
-              </a:ext>
-            </a:extLst>
-          </p:cNvPr>
-          <p:cNvPicPr>
-            <a:picLocks noGrp="1" noChangeAspect="1"/>
-          </p:cNvPicPr>
-          <p:nvPr>
-            <p:ph type="pic" sz="quarter" idx="21"/>
-          </p:nvPr>
-        </p:nvPicPr>
-        <p:blipFill rotWithShape="1">
-          <a:blip r:embed="rId3"/>
-          <a:srcRect/>
-          <a:stretch/>
-        </p:blipFill>
-        <p:spPr/>
-      </p:pic>
-      <p:sp>
-        <p:nvSpPr>
-          <p:cNvPr id="5" name="Text Placeholder 4">
-            <a:extLst>
-              <a:ext uri="{FF2B5EF4-FFF2-40B4-BE49-F238E27FC236}">
-                <a16:creationId xmlns:a16="http://schemas.microsoft.com/office/drawing/2014/main" id="{664EAAE3-47A6-DF8C-088B-8353E312893A}"/>
-              </a:ext>
-            </a:extLst>
-          </p:cNvPr>
-          <p:cNvSpPr>
-            <a:spLocks noGrp="1"/>
-          </p:cNvSpPr>
-          <p:nvPr>
-            <p:ph type="body" sz="quarter" idx="14"/>
-          </p:nvPr>
-        </p:nvSpPr>
-        <p:spPr/>
-        <p:txBody>
-          <a:bodyPr/>
-          <a:lstStyle/>
-          <a:p>
-            <a:r>
-              <a:rPr lang="en-US" dirty="0"/>
-              <a:t>Mirjam Nilsson​</a:t>
-            </a:r>
-          </a:p>
-        </p:txBody>
-      </p:sp>
-      <p:sp>
-        <p:nvSpPr>
-          <p:cNvPr id="6" name="Text Placeholder 5">
-            <a:extLst>
-              <a:ext uri="{FF2B5EF4-FFF2-40B4-BE49-F238E27FC236}">
-                <a16:creationId xmlns:a16="http://schemas.microsoft.com/office/drawing/2014/main" id="{8E956031-A8E2-FF88-2769-10FEB7B754A7}"/>
-              </a:ext>
-            </a:extLst>
-          </p:cNvPr>
-          <p:cNvSpPr>
-            <a:spLocks noGrp="1"/>
-          </p:cNvSpPr>
-          <p:nvPr>
-            <p:ph type="body" sz="quarter" idx="15"/>
-          </p:nvPr>
-        </p:nvSpPr>
-        <p:spPr/>
-        <p:txBody>
-          <a:bodyPr/>
-          <a:lstStyle/>
-          <a:p>
-            <a:r>
-              <a:rPr lang="en-US" dirty="0"/>
-              <a:t>Chief Executive Officer</a:t>
-            </a:r>
-          </a:p>
-        </p:txBody>
-      </p:sp>
-      <p:pic>
-        <p:nvPicPr>
-          <p:cNvPr id="18" name="Picture Placeholder 17" descr="Team member head shot&#10;">
-            <a:extLst>
-              <a:ext uri="{FF2B5EF4-FFF2-40B4-BE49-F238E27FC236}">
-                <a16:creationId xmlns:a16="http://schemas.microsoft.com/office/drawing/2014/main" id="{F4608F53-148D-4D2F-6672-8A90E230C68A}"/>
-              </a:ext>
-            </a:extLst>
-          </p:cNvPr>
-          <p:cNvPicPr>
-            <a:picLocks noGrp="1" noChangeAspect="1"/>
-          </p:cNvPicPr>
-          <p:nvPr>
-            <p:ph type="pic" sz="quarter" idx="22"/>
-          </p:nvPr>
-        </p:nvPicPr>
-        <p:blipFill rotWithShape="1">
-          <a:blip r:embed="rId4"/>
-          <a:srcRect/>
-          <a:stretch/>
-        </p:blipFill>
-        <p:spPr/>
-      </p:pic>
-      <p:sp>
-        <p:nvSpPr>
-          <p:cNvPr id="7" name="Text Placeholder 6">
-            <a:extLst>
-              <a:ext uri="{FF2B5EF4-FFF2-40B4-BE49-F238E27FC236}">
-                <a16:creationId xmlns:a16="http://schemas.microsoft.com/office/drawing/2014/main" id="{24AD9EB9-CF0D-0D70-D541-05E1A813D00F}"/>
-              </a:ext>
-            </a:extLst>
-          </p:cNvPr>
-          <p:cNvSpPr>
-            <a:spLocks noGrp="1"/>
-          </p:cNvSpPr>
-          <p:nvPr>
-            <p:ph type="body" sz="quarter" idx="16"/>
-          </p:nvPr>
-        </p:nvSpPr>
-        <p:spPr/>
-        <p:txBody>
-          <a:bodyPr/>
-          <a:lstStyle/>
-          <a:p>
-            <a:r>
-              <a:rPr lang="en-US" dirty="0"/>
-              <a:t>Flora Berggren​</a:t>
-            </a:r>
-          </a:p>
-        </p:txBody>
-      </p:sp>
-      <p:sp>
-        <p:nvSpPr>
-          <p:cNvPr id="8" name="Text Placeholder 7">
-            <a:extLst>
-              <a:ext uri="{FF2B5EF4-FFF2-40B4-BE49-F238E27FC236}">
-                <a16:creationId xmlns:a16="http://schemas.microsoft.com/office/drawing/2014/main" id="{869DE758-CE4B-6136-04AE-85B544CA6F5B}"/>
-              </a:ext>
-            </a:extLst>
-          </p:cNvPr>
-          <p:cNvSpPr>
-            <a:spLocks noGrp="1"/>
-          </p:cNvSpPr>
-          <p:nvPr>
-            <p:ph type="body" sz="quarter" idx="17"/>
-          </p:nvPr>
-        </p:nvSpPr>
-        <p:spPr/>
-        <p:txBody>
-          <a:bodyPr/>
-          <a:lstStyle/>
-          <a:p>
-            <a:r>
-              <a:rPr lang="en-US" dirty="0"/>
-              <a:t>Chief Operations Officer</a:t>
-            </a:r>
-          </a:p>
-        </p:txBody>
-      </p:sp>
-      <p:pic>
-        <p:nvPicPr>
-          <p:cNvPr id="19" name="Picture Placeholder 18" descr="Team member head shot&#10;">
-            <a:extLst>
-              <a:ext uri="{FF2B5EF4-FFF2-40B4-BE49-F238E27FC236}">
-                <a16:creationId xmlns:a16="http://schemas.microsoft.com/office/drawing/2014/main" id="{34C21939-A4DB-0F96-83D8-AD8FFB45359F}"/>
-              </a:ext>
-            </a:extLst>
-          </p:cNvPr>
-          <p:cNvPicPr>
-            <a:picLocks noGrp="1" noChangeAspect="1"/>
-          </p:cNvPicPr>
-          <p:nvPr>
-            <p:ph type="pic" sz="quarter" idx="23"/>
-          </p:nvPr>
-        </p:nvPicPr>
-        <p:blipFill rotWithShape="1">
-          <a:blip r:embed="rId5"/>
-          <a:srcRect l="174" r="174"/>
-          <a:stretch/>
-        </p:blipFill>
-        <p:spPr/>
-      </p:pic>
-      <p:sp>
-        <p:nvSpPr>
-          <p:cNvPr id="9" name="Text Placeholder 8">
-            <a:extLst>
-              <a:ext uri="{FF2B5EF4-FFF2-40B4-BE49-F238E27FC236}">
-                <a16:creationId xmlns:a16="http://schemas.microsoft.com/office/drawing/2014/main" id="{22A99FBE-9850-5F5D-04D9-E3A83DEEA928}"/>
-              </a:ext>
-            </a:extLst>
-          </p:cNvPr>
-          <p:cNvSpPr>
-            <a:spLocks noGrp="1"/>
-          </p:cNvSpPr>
-          <p:nvPr>
-            <p:ph type="body" sz="quarter" idx="18"/>
-          </p:nvPr>
-        </p:nvSpPr>
-        <p:spPr/>
-        <p:txBody>
-          <a:bodyPr/>
-          <a:lstStyle/>
-          <a:p>
-            <a:r>
-              <a:rPr lang="en-US" dirty="0"/>
-              <a:t>Rajesh Santoshi​</a:t>
-            </a:r>
-          </a:p>
-        </p:txBody>
-      </p:sp>
-      <p:sp>
-        <p:nvSpPr>
-          <p:cNvPr id="10" name="Text Placeholder 9">
-            <a:extLst>
-              <a:ext uri="{FF2B5EF4-FFF2-40B4-BE49-F238E27FC236}">
-                <a16:creationId xmlns:a16="http://schemas.microsoft.com/office/drawing/2014/main" id="{19AAB49A-6730-B2CF-9537-FF9551D4EB80}"/>
-              </a:ext>
-            </a:extLst>
-          </p:cNvPr>
-          <p:cNvSpPr>
-            <a:spLocks noGrp="1"/>
-          </p:cNvSpPr>
-          <p:nvPr>
-            <p:ph type="body" sz="quarter" idx="19"/>
-          </p:nvPr>
-        </p:nvSpPr>
-        <p:spPr/>
-        <p:txBody>
-          <a:bodyPr/>
-          <a:lstStyle/>
-          <a:p>
-            <a:r>
-              <a:rPr lang="en-US" dirty="0"/>
-              <a:t>VP Marketing</a:t>
-            </a:r>
-          </a:p>
-        </p:txBody>
-      </p:sp>
-      <p:sp>
-        <p:nvSpPr>
-          <p:cNvPr id="2" name="Footer Placeholder 1">
-            <a:extLst>
-              <a:ext uri="{FF2B5EF4-FFF2-40B4-BE49-F238E27FC236}">
-                <a16:creationId xmlns:a16="http://schemas.microsoft.com/office/drawing/2014/main" id="{23DFDBA5-4CFB-88D0-C90E-69D151F5BFCA}"/>
-              </a:ext>
-            </a:extLst>
-          </p:cNvPr>
-          <p:cNvSpPr>
-            <a:spLocks noGrp="1"/>
-          </p:cNvSpPr>
-          <p:nvPr>
-            <p:ph type="ftr" sz="quarter" idx="10"/>
-          </p:nvPr>
-        </p:nvSpPr>
-        <p:spPr/>
-        <p:txBody>
-          <a:bodyPr/>
-          <a:lstStyle/>
-          <a:p>
-            <a:r>
-              <a:rPr lang="en-US"/>
-              <a:t>Crypto: investing &amp; trading</a:t>
-            </a:r>
-            <a:endParaRPr lang="en-US" dirty="0"/>
+            <a:pPr marL="0" indent="0">
+              <a:buNone/>
+            </a:pPr>
+            <a:r>
+              <a:rPr lang="en-US" sz="2000" dirty="0"/>
+              <a:t>These are the 4 clusters generated by k-means using k=4</a:t>
+            </a:r>
           </a:p>
         </p:txBody>
       </p:sp>
     </p:spTree>
     <p:extLst>
       <p:ext uri="{BB962C8B-B14F-4D97-AF65-F5344CB8AC3E}">
-        <p14:creationId xmlns:p14="http://schemas.microsoft.com/office/powerpoint/2010/main" val="1579562137"/>
+        <p14:creationId xmlns:p14="http://schemas.microsoft.com/office/powerpoint/2010/main" val="574660157"/>
       </p:ext>
     </p:extLst>
   </p:cSld>
@@ -21896,7 +20861,13 @@
   <p:cSld>
     <p:spTree>
       <p:nvGrpSpPr>
-        <p:cNvPr id="1" name=""/>
+        <p:cNvPr id="1" name="">
+          <a:extLst>
+            <a:ext uri="{FF2B5EF4-FFF2-40B4-BE49-F238E27FC236}">
+              <a16:creationId xmlns:a16="http://schemas.microsoft.com/office/drawing/2014/main" id="{7571F1B7-C162-BD1A-15D3-3E74FACFEB9A}"/>
+            </a:ext>
+          </a:extLst>
+        </p:cNvPr>
         <p:cNvGrpSpPr/>
         <p:nvPr/>
       </p:nvGrpSpPr>
@@ -21910,10 +20881,10 @@
       </p:grpSpPr>
       <p:sp>
         <p:nvSpPr>
-          <p:cNvPr id="33" name="Title 32">
-            <a:extLst>
-              <a:ext uri="{FF2B5EF4-FFF2-40B4-BE49-F238E27FC236}">
-                <a16:creationId xmlns:a16="http://schemas.microsoft.com/office/drawing/2014/main" id="{57144164-5503-9D11-4F68-81F4CD378333}"/>
+          <p:cNvPr id="5" name="Subtitle 4">
+            <a:extLst>
+              <a:ext uri="{FF2B5EF4-FFF2-40B4-BE49-F238E27FC236}">
+                <a16:creationId xmlns:a16="http://schemas.microsoft.com/office/drawing/2014/main" id="{61B888BE-6592-4458-3D68-D1E04D13E80D}"/>
               </a:ext>
             </a:extLst>
           </p:cNvPr>
@@ -21921,716 +20892,225 @@
             <a:spLocks noGrp="1"/>
           </p:cNvSpPr>
           <p:nvPr>
-            <p:ph type="title"/>
+            <p:ph type="subTitle" idx="1"/>
           </p:nvPr>
         </p:nvSpPr>
-        <p:spPr/>
+        <p:spPr>
+          <a:xfrm>
+            <a:off x="1295433" y="5005482"/>
+            <a:ext cx="9601134" cy="547577"/>
+          </a:xfrm>
+        </p:spPr>
         <p:txBody>
           <a:bodyPr/>
           <a:lstStyle/>
           <a:p>
+            <a:pPr algn="l"/>
             <a:r>
               <a:rPr lang="en-US" dirty="0"/>
-              <a:t>MEET OUR EXTENDED TEAM</a:t>
-            </a:r>
-          </a:p>
-        </p:txBody>
-      </p:sp>
-      <p:sp>
-        <p:nvSpPr>
-          <p:cNvPr id="11" name="Slide Number Placeholder 10">
-            <a:extLst>
-              <a:ext uri="{FF2B5EF4-FFF2-40B4-BE49-F238E27FC236}">
-                <a16:creationId xmlns:a16="http://schemas.microsoft.com/office/drawing/2014/main" id="{F02CA379-5C0D-5E21-B070-E880A01BB9A7}"/>
-              </a:ext>
-            </a:extLst>
-          </p:cNvPr>
-          <p:cNvSpPr>
-            <a:spLocks noGrp="1"/>
+              <a:t>The lack of meaningful clusters confirms that the dataset itself lacks a clear predictable structure.</a:t>
+            </a:r>
+          </a:p>
+        </p:txBody>
+      </p:sp>
+      <p:sp>
+        <p:nvSpPr>
+          <p:cNvPr id="3" name="Title 68">
+            <a:extLst>
+              <a:ext uri="{FF2B5EF4-FFF2-40B4-BE49-F238E27FC236}">
+                <a16:creationId xmlns:a16="http://schemas.microsoft.com/office/drawing/2014/main" id="{0DA9DCD2-60B9-F856-96B4-F69CBCFACB1E}"/>
+              </a:ext>
+            </a:extLst>
+          </p:cNvPr>
+          <p:cNvSpPr txBox="1">
+            <a:spLocks/>
           </p:cNvSpPr>
-          <p:nvPr>
-            <p:ph type="sldNum" sz="quarter" idx="11"/>
-          </p:nvPr>
-        </p:nvSpPr>
-        <p:spPr/>
-        <p:txBody>
-          <a:bodyPr/>
+          <p:nvPr/>
+        </p:nvSpPr>
+        <p:spPr>
+          <a:xfrm>
+            <a:off x="1656588" y="1391080"/>
+            <a:ext cx="8878824" cy="1069848"/>
+          </a:xfrm>
+          <a:prstGeom prst="rect">
+            <a:avLst/>
+          </a:prstGeom>
+        </p:spPr>
+        <p:txBody>
+          <a:bodyPr vert="horz" lIns="91440" tIns="45720" rIns="91440" bIns="45720" rtlCol="0" anchor="b">
+            <a:noAutofit/>
+          </a:bodyPr>
+          <a:lstStyle>
+            <a:lvl1pPr algn="ctr" defTabSz="914400" rtl="0" eaLnBrk="1" latinLnBrk="0" hangingPunct="1">
+              <a:lnSpc>
+                <a:spcPct val="90000"/>
+              </a:lnSpc>
+              <a:spcBef>
+                <a:spcPct val="0"/>
+              </a:spcBef>
+              <a:buNone/>
+              <a:defRPr sz="4000" b="1" kern="1200" cap="all" spc="600" baseline="0">
+                <a:solidFill>
+                  <a:schemeClr val="bg1"/>
+                </a:solidFill>
+                <a:latin typeface="+mj-lt"/>
+                <a:ea typeface="+mj-ea"/>
+                <a:cs typeface="+mj-cs"/>
+              </a:defRPr>
+            </a:lvl1pPr>
+          </a:lstStyle>
+          <a:p>
+            <a:r>
+              <a:rPr lang="en-US" dirty="0"/>
+              <a:t>Unsupervised Learning 5</a:t>
+            </a:r>
+          </a:p>
+        </p:txBody>
+      </p:sp>
+      <p:sp>
+        <p:nvSpPr>
+          <p:cNvPr id="4" name="Title 68">
+            <a:extLst>
+              <a:ext uri="{FF2B5EF4-FFF2-40B4-BE49-F238E27FC236}">
+                <a16:creationId xmlns:a16="http://schemas.microsoft.com/office/drawing/2014/main" id="{5497A0A1-A866-66A5-A442-938197CAEBAD}"/>
+              </a:ext>
+            </a:extLst>
+          </p:cNvPr>
+          <p:cNvSpPr txBox="1">
+            <a:spLocks/>
+          </p:cNvSpPr>
+          <p:nvPr/>
+        </p:nvSpPr>
+        <p:spPr>
+          <a:xfrm>
+            <a:off x="1632204" y="2157983"/>
+            <a:ext cx="8878824" cy="1069848"/>
+          </a:xfrm>
+          <a:prstGeom prst="rect">
+            <a:avLst/>
+          </a:prstGeom>
+        </p:spPr>
+        <p:txBody>
+          <a:bodyPr vert="horz" lIns="91440" tIns="45720" rIns="91440" bIns="45720" rtlCol="0" anchor="b">
+            <a:noAutofit/>
+          </a:bodyPr>
+          <a:lstStyle>
+            <a:lvl1pPr algn="ctr" defTabSz="914400" rtl="0" eaLnBrk="1" latinLnBrk="0" hangingPunct="1">
+              <a:lnSpc>
+                <a:spcPct val="90000"/>
+              </a:lnSpc>
+              <a:spcBef>
+                <a:spcPct val="0"/>
+              </a:spcBef>
+              <a:buNone/>
+              <a:defRPr sz="4000" b="1" kern="1200" cap="all" spc="600" baseline="0">
+                <a:solidFill>
+                  <a:schemeClr val="bg1"/>
+                </a:solidFill>
+                <a:latin typeface="+mj-lt"/>
+                <a:ea typeface="+mj-ea"/>
+                <a:cs typeface="+mj-cs"/>
+              </a:defRPr>
+            </a:lvl1pPr>
+          </a:lstStyle>
+          <a:p>
+            <a:r>
+              <a:rPr lang="en-US" sz="2800" dirty="0"/>
+              <a:t>Conclusion</a:t>
+            </a:r>
+          </a:p>
+        </p:txBody>
+      </p:sp>
+      <p:sp>
+        <p:nvSpPr>
+          <p:cNvPr id="8" name="TextBox 7">
+            <a:extLst>
+              <a:ext uri="{FF2B5EF4-FFF2-40B4-BE49-F238E27FC236}">
+                <a16:creationId xmlns:a16="http://schemas.microsoft.com/office/drawing/2014/main" id="{030F034C-55B1-0B93-E897-8D355BB49800}"/>
+              </a:ext>
+            </a:extLst>
+          </p:cNvPr>
+          <p:cNvSpPr txBox="1"/>
+          <p:nvPr/>
+        </p:nvSpPr>
+        <p:spPr>
+          <a:xfrm>
+            <a:off x="3283878" y="3630170"/>
+            <a:ext cx="5743514" cy="1179810"/>
+          </a:xfrm>
+          <a:prstGeom prst="rect">
+            <a:avLst/>
+          </a:prstGeom>
+          <a:noFill/>
+        </p:spPr>
+        <p:txBody>
+          <a:bodyPr wrap="square" rtlCol="0">
+            <a:spAutoFit/>
+          </a:bodyPr>
           <a:lstStyle/>
           <a:p>
-            <a:fld id="{294A09A9-5501-47C1-A89A-A340965A2BE2}" type="slidenum">
-              <a:rPr lang="en-US" smtClean="0"/>
-              <a:pPr/>
-              <a:t>17</a:t>
-            </a:fld>
-            <a:endParaRPr lang="en-US" dirty="0"/>
-          </a:p>
-        </p:txBody>
-      </p:sp>
-      <p:pic>
-        <p:nvPicPr>
-          <p:cNvPr id="16" name="Picture Placeholder 15" descr="Team member head shot&#10;">
-            <a:extLst>
-              <a:ext uri="{FF2B5EF4-FFF2-40B4-BE49-F238E27FC236}">
-                <a16:creationId xmlns:a16="http://schemas.microsoft.com/office/drawing/2014/main" id="{675FEA7C-5201-0219-EAA4-51C8A3B8185E}"/>
-              </a:ext>
-            </a:extLst>
-          </p:cNvPr>
-          <p:cNvPicPr>
-            <a:picLocks noGrp="1" noChangeAspect="1"/>
-          </p:cNvPicPr>
-          <p:nvPr>
-            <p:ph type="pic" sz="quarter" idx="20"/>
-          </p:nvPr>
-        </p:nvPicPr>
-        <p:blipFill rotWithShape="1">
-          <a:blip r:embed="rId2"/>
-          <a:srcRect/>
-          <a:stretch/>
-        </p:blipFill>
-        <p:spPr/>
-      </p:pic>
-      <p:sp>
-        <p:nvSpPr>
-          <p:cNvPr id="3" name="Text Placeholder 2">
-            <a:extLst>
-              <a:ext uri="{FF2B5EF4-FFF2-40B4-BE49-F238E27FC236}">
-                <a16:creationId xmlns:a16="http://schemas.microsoft.com/office/drawing/2014/main" id="{CFC225EB-9239-A8F4-48C2-D2E44A245C26}"/>
-              </a:ext>
-            </a:extLst>
-          </p:cNvPr>
-          <p:cNvSpPr>
-            <a:spLocks noGrp="1"/>
-          </p:cNvSpPr>
-          <p:nvPr>
-            <p:ph type="body" sz="quarter" idx="12"/>
-          </p:nvPr>
-        </p:nvSpPr>
-        <p:spPr/>
-        <p:txBody>
-          <a:bodyPr/>
-          <a:lstStyle/>
-          <a:p>
-            <a:r>
-              <a:rPr lang="en-US" dirty="0"/>
-              <a:t>Takuma Hayashi​</a:t>
-            </a:r>
-          </a:p>
-        </p:txBody>
-      </p:sp>
-      <p:sp>
-        <p:nvSpPr>
-          <p:cNvPr id="4" name="Text Placeholder 3">
-            <a:extLst>
-              <a:ext uri="{FF2B5EF4-FFF2-40B4-BE49-F238E27FC236}">
-                <a16:creationId xmlns:a16="http://schemas.microsoft.com/office/drawing/2014/main" id="{BF63BCC4-AF80-8D3B-413B-3F80C74503EE}"/>
-              </a:ext>
-            </a:extLst>
-          </p:cNvPr>
-          <p:cNvSpPr>
-            <a:spLocks noGrp="1"/>
-          </p:cNvSpPr>
-          <p:nvPr>
-            <p:ph type="body" sz="quarter" idx="13"/>
-          </p:nvPr>
-        </p:nvSpPr>
-        <p:spPr/>
-        <p:txBody>
-          <a:bodyPr/>
-          <a:lstStyle/>
-          <a:p>
-            <a:r>
-              <a:rPr lang="en-US" dirty="0"/>
-              <a:t>President</a:t>
-            </a:r>
-          </a:p>
-        </p:txBody>
-      </p:sp>
-      <p:pic>
-        <p:nvPicPr>
-          <p:cNvPr id="139" name="Picture Placeholder 138" descr="Team member head shot&#10;">
-            <a:extLst>
-              <a:ext uri="{FF2B5EF4-FFF2-40B4-BE49-F238E27FC236}">
-                <a16:creationId xmlns:a16="http://schemas.microsoft.com/office/drawing/2014/main" id="{40505ADD-6A41-FEA2-952B-68B8652C37DD}"/>
-              </a:ext>
-            </a:extLst>
-          </p:cNvPr>
-          <p:cNvPicPr>
-            <a:picLocks noGrp="1" noChangeAspect="1"/>
-          </p:cNvPicPr>
-          <p:nvPr>
-            <p:ph type="pic" sz="quarter" idx="24"/>
-          </p:nvPr>
-        </p:nvPicPr>
-        <p:blipFill rotWithShape="1">
-          <a:blip r:embed="rId3"/>
-          <a:srcRect/>
-          <a:stretch/>
-        </p:blipFill>
-        <p:spPr/>
-      </p:pic>
-      <p:sp>
-        <p:nvSpPr>
-          <p:cNvPr id="131" name="Text Placeholder 130">
-            <a:extLst>
-              <a:ext uri="{FF2B5EF4-FFF2-40B4-BE49-F238E27FC236}">
-                <a16:creationId xmlns:a16="http://schemas.microsoft.com/office/drawing/2014/main" id="{29B0FDD4-0C9D-9FEE-0CB5-5341E9A67D6A}"/>
-              </a:ext>
-            </a:extLst>
-          </p:cNvPr>
-          <p:cNvSpPr>
-            <a:spLocks noGrp="1"/>
-          </p:cNvSpPr>
-          <p:nvPr>
-            <p:ph type="body" sz="quarter" idx="28"/>
-          </p:nvPr>
-        </p:nvSpPr>
-        <p:spPr/>
-        <p:txBody>
-          <a:bodyPr/>
-          <a:lstStyle/>
-          <a:p>
-            <a:r>
-              <a:rPr lang="en-US" dirty="0"/>
-              <a:t>Graham Barnes</a:t>
-            </a:r>
-          </a:p>
-        </p:txBody>
-      </p:sp>
-      <p:sp>
-        <p:nvSpPr>
-          <p:cNvPr id="132" name="Text Placeholder 131">
-            <a:extLst>
-              <a:ext uri="{FF2B5EF4-FFF2-40B4-BE49-F238E27FC236}">
-                <a16:creationId xmlns:a16="http://schemas.microsoft.com/office/drawing/2014/main" id="{0E6B790C-A9A2-BF33-11DC-2AA2B45ADDDE}"/>
-              </a:ext>
-            </a:extLst>
-          </p:cNvPr>
-          <p:cNvSpPr>
-            <a:spLocks noGrp="1"/>
-          </p:cNvSpPr>
-          <p:nvPr>
-            <p:ph type="body" sz="quarter" idx="29"/>
-          </p:nvPr>
-        </p:nvSpPr>
-        <p:spPr/>
-        <p:txBody>
-          <a:bodyPr/>
-          <a:lstStyle/>
-          <a:p>
-            <a:r>
-              <a:rPr lang="en-US" dirty="0"/>
-              <a:t>VP Product</a:t>
-            </a:r>
-          </a:p>
-        </p:txBody>
-      </p:sp>
-      <p:pic>
-        <p:nvPicPr>
-          <p:cNvPr id="17" name="Picture Placeholder 16" descr="Team member head shot&#10;">
-            <a:extLst>
-              <a:ext uri="{FF2B5EF4-FFF2-40B4-BE49-F238E27FC236}">
-                <a16:creationId xmlns:a16="http://schemas.microsoft.com/office/drawing/2014/main" id="{8B1E138F-E5F8-7188-0E7F-C61CC315F3CA}"/>
-              </a:ext>
-            </a:extLst>
-          </p:cNvPr>
-          <p:cNvPicPr>
-            <a:picLocks noGrp="1" noChangeAspect="1"/>
-          </p:cNvPicPr>
-          <p:nvPr>
-            <p:ph type="pic" sz="quarter" idx="21"/>
-          </p:nvPr>
-        </p:nvPicPr>
-        <p:blipFill rotWithShape="1">
-          <a:blip r:embed="rId4"/>
-          <a:srcRect t="75" b="75"/>
-          <a:stretch/>
-        </p:blipFill>
-        <p:spPr/>
-      </p:pic>
-      <p:sp>
-        <p:nvSpPr>
-          <p:cNvPr id="5" name="Text Placeholder 4">
-            <a:extLst>
-              <a:ext uri="{FF2B5EF4-FFF2-40B4-BE49-F238E27FC236}">
-                <a16:creationId xmlns:a16="http://schemas.microsoft.com/office/drawing/2014/main" id="{664EAAE3-47A6-DF8C-088B-8353E312893A}"/>
-              </a:ext>
-            </a:extLst>
-          </p:cNvPr>
-          <p:cNvSpPr>
-            <a:spLocks noGrp="1"/>
-          </p:cNvSpPr>
-          <p:nvPr>
-            <p:ph type="body" sz="quarter" idx="14"/>
-          </p:nvPr>
-        </p:nvSpPr>
-        <p:spPr/>
-        <p:txBody>
-          <a:bodyPr/>
-          <a:lstStyle/>
-          <a:p>
-            <a:r>
-              <a:rPr lang="en-US" dirty="0"/>
-              <a:t>Mirjam Nilsson​</a:t>
-            </a:r>
-          </a:p>
-        </p:txBody>
-      </p:sp>
-      <p:sp>
-        <p:nvSpPr>
-          <p:cNvPr id="6" name="Text Placeholder 5">
-            <a:extLst>
-              <a:ext uri="{FF2B5EF4-FFF2-40B4-BE49-F238E27FC236}">
-                <a16:creationId xmlns:a16="http://schemas.microsoft.com/office/drawing/2014/main" id="{8E956031-A8E2-FF88-2769-10FEB7B754A7}"/>
-              </a:ext>
-            </a:extLst>
-          </p:cNvPr>
-          <p:cNvSpPr>
-            <a:spLocks noGrp="1"/>
-          </p:cNvSpPr>
-          <p:nvPr>
-            <p:ph type="body" sz="quarter" idx="15"/>
-          </p:nvPr>
-        </p:nvSpPr>
-        <p:spPr/>
-        <p:txBody>
-          <a:bodyPr/>
-          <a:lstStyle/>
-          <a:p>
-            <a:r>
-              <a:rPr lang="en-US" dirty="0"/>
-              <a:t>Chief Executive Officer</a:t>
-            </a:r>
-          </a:p>
-        </p:txBody>
-      </p:sp>
-      <p:pic>
-        <p:nvPicPr>
-          <p:cNvPr id="140" name="Picture Placeholder 139" descr="Team member head shot&#10;">
-            <a:extLst>
-              <a:ext uri="{FF2B5EF4-FFF2-40B4-BE49-F238E27FC236}">
-                <a16:creationId xmlns:a16="http://schemas.microsoft.com/office/drawing/2014/main" id="{DAE46AC2-4E04-644A-503C-188DFB2C3463}"/>
-              </a:ext>
-            </a:extLst>
-          </p:cNvPr>
-          <p:cNvPicPr>
-            <a:picLocks noGrp="1" noChangeAspect="1"/>
-          </p:cNvPicPr>
-          <p:nvPr>
-            <p:ph type="pic" sz="quarter" idx="25"/>
-          </p:nvPr>
-        </p:nvPicPr>
-        <p:blipFill rotWithShape="1">
-          <a:blip r:embed="rId5"/>
-          <a:srcRect t="75" b="75"/>
-          <a:stretch/>
-        </p:blipFill>
-        <p:spPr/>
-      </p:pic>
-      <p:sp>
-        <p:nvSpPr>
-          <p:cNvPr id="133" name="Text Placeholder 132">
-            <a:extLst>
-              <a:ext uri="{FF2B5EF4-FFF2-40B4-BE49-F238E27FC236}">
-                <a16:creationId xmlns:a16="http://schemas.microsoft.com/office/drawing/2014/main" id="{F73428BF-556B-39B3-A2E1-A3479B7A4368}"/>
-              </a:ext>
-            </a:extLst>
-          </p:cNvPr>
-          <p:cNvSpPr>
-            <a:spLocks noGrp="1"/>
-          </p:cNvSpPr>
-          <p:nvPr>
-            <p:ph type="body" sz="quarter" idx="30"/>
-          </p:nvPr>
-        </p:nvSpPr>
-        <p:spPr/>
-        <p:txBody>
-          <a:bodyPr/>
-          <a:lstStyle/>
-          <a:p>
-            <a:r>
-              <a:rPr lang="en-US" dirty="0"/>
-              <a:t>Rowan Murphy</a:t>
-            </a:r>
-          </a:p>
-        </p:txBody>
-      </p:sp>
-      <p:sp>
-        <p:nvSpPr>
-          <p:cNvPr id="134" name="Text Placeholder 133">
-            <a:extLst>
-              <a:ext uri="{FF2B5EF4-FFF2-40B4-BE49-F238E27FC236}">
-                <a16:creationId xmlns:a16="http://schemas.microsoft.com/office/drawing/2014/main" id="{3519B91A-73EE-B2B8-4875-2C6A0113D333}"/>
-              </a:ext>
-            </a:extLst>
-          </p:cNvPr>
-          <p:cNvSpPr>
-            <a:spLocks noGrp="1"/>
-          </p:cNvSpPr>
-          <p:nvPr>
-            <p:ph type="body" sz="quarter" idx="31"/>
-          </p:nvPr>
-        </p:nvSpPr>
-        <p:spPr/>
-        <p:txBody>
-          <a:bodyPr/>
-          <a:lstStyle/>
-          <a:p>
-            <a:r>
-              <a:rPr lang="en-US" dirty="0"/>
-              <a:t>SEO Strategist</a:t>
-            </a:r>
-          </a:p>
-        </p:txBody>
-      </p:sp>
-      <p:pic>
-        <p:nvPicPr>
-          <p:cNvPr id="18" name="Picture Placeholder 17" descr="Team member head shot&#10;">
-            <a:extLst>
-              <a:ext uri="{FF2B5EF4-FFF2-40B4-BE49-F238E27FC236}">
-                <a16:creationId xmlns:a16="http://schemas.microsoft.com/office/drawing/2014/main" id="{F4608F53-148D-4D2F-6672-8A90E230C68A}"/>
-              </a:ext>
-            </a:extLst>
-          </p:cNvPr>
-          <p:cNvPicPr>
-            <a:picLocks noGrp="1" noChangeAspect="1"/>
-          </p:cNvPicPr>
-          <p:nvPr>
-            <p:ph type="pic" sz="quarter" idx="22"/>
-          </p:nvPr>
-        </p:nvPicPr>
-        <p:blipFill rotWithShape="1">
-          <a:blip r:embed="rId6"/>
-          <a:srcRect t="75" b="75"/>
-          <a:stretch/>
-        </p:blipFill>
-        <p:spPr/>
-      </p:pic>
-      <p:sp>
-        <p:nvSpPr>
-          <p:cNvPr id="7" name="Text Placeholder 6">
-            <a:extLst>
-              <a:ext uri="{FF2B5EF4-FFF2-40B4-BE49-F238E27FC236}">
-                <a16:creationId xmlns:a16="http://schemas.microsoft.com/office/drawing/2014/main" id="{24AD9EB9-CF0D-0D70-D541-05E1A813D00F}"/>
-              </a:ext>
-            </a:extLst>
-          </p:cNvPr>
-          <p:cNvSpPr>
-            <a:spLocks noGrp="1"/>
-          </p:cNvSpPr>
-          <p:nvPr>
-            <p:ph type="body" sz="quarter" idx="16"/>
-          </p:nvPr>
-        </p:nvSpPr>
-        <p:spPr/>
-        <p:txBody>
-          <a:bodyPr/>
-          <a:lstStyle/>
-          <a:p>
-            <a:r>
-              <a:rPr lang="en-US" dirty="0"/>
-              <a:t>Flora Berggren​</a:t>
-            </a:r>
-          </a:p>
-        </p:txBody>
-      </p:sp>
-      <p:sp>
-        <p:nvSpPr>
-          <p:cNvPr id="8" name="Text Placeholder 7">
-            <a:extLst>
-              <a:ext uri="{FF2B5EF4-FFF2-40B4-BE49-F238E27FC236}">
-                <a16:creationId xmlns:a16="http://schemas.microsoft.com/office/drawing/2014/main" id="{869DE758-CE4B-6136-04AE-85B544CA6F5B}"/>
-              </a:ext>
-            </a:extLst>
-          </p:cNvPr>
-          <p:cNvSpPr>
-            <a:spLocks noGrp="1"/>
-          </p:cNvSpPr>
-          <p:nvPr>
-            <p:ph type="body" sz="quarter" idx="17"/>
-          </p:nvPr>
-        </p:nvSpPr>
-        <p:spPr/>
-        <p:txBody>
-          <a:bodyPr/>
-          <a:lstStyle/>
-          <a:p>
-            <a:r>
-              <a:rPr lang="en-US" dirty="0"/>
-              <a:t>Chief Operations Officer</a:t>
-            </a:r>
-          </a:p>
-        </p:txBody>
-      </p:sp>
-      <p:pic>
-        <p:nvPicPr>
-          <p:cNvPr id="141" name="Picture Placeholder 140" descr="Team member head shot&#10;">
-            <a:extLst>
-              <a:ext uri="{FF2B5EF4-FFF2-40B4-BE49-F238E27FC236}">
-                <a16:creationId xmlns:a16="http://schemas.microsoft.com/office/drawing/2014/main" id="{105B8828-F685-63DD-6F9F-62F8A8DA6D06}"/>
-              </a:ext>
-            </a:extLst>
-          </p:cNvPr>
-          <p:cNvPicPr>
-            <a:picLocks noGrp="1" noChangeAspect="1"/>
-          </p:cNvPicPr>
-          <p:nvPr>
-            <p:ph type="pic" sz="quarter" idx="26"/>
-          </p:nvPr>
-        </p:nvPicPr>
-        <p:blipFill rotWithShape="1">
-          <a:blip r:embed="rId7"/>
-          <a:srcRect l="291" r="291"/>
-          <a:stretch/>
-        </p:blipFill>
-        <p:spPr/>
-      </p:pic>
-      <p:sp>
-        <p:nvSpPr>
-          <p:cNvPr id="135" name="Text Placeholder 134">
-            <a:extLst>
-              <a:ext uri="{FF2B5EF4-FFF2-40B4-BE49-F238E27FC236}">
-                <a16:creationId xmlns:a16="http://schemas.microsoft.com/office/drawing/2014/main" id="{747BF9B3-DF8F-789C-9AF6-94771E1AF5FE}"/>
-              </a:ext>
-            </a:extLst>
-          </p:cNvPr>
-          <p:cNvSpPr>
-            <a:spLocks noGrp="1"/>
-          </p:cNvSpPr>
-          <p:nvPr>
-            <p:ph type="body" sz="quarter" idx="32"/>
-          </p:nvPr>
-        </p:nvSpPr>
-        <p:spPr/>
-        <p:txBody>
-          <a:bodyPr/>
-          <a:lstStyle/>
-          <a:p>
-            <a:r>
-              <a:rPr lang="en-US" dirty="0"/>
-              <a:t>Elizabeth Moore</a:t>
-            </a:r>
-          </a:p>
-        </p:txBody>
-      </p:sp>
-      <p:sp>
-        <p:nvSpPr>
-          <p:cNvPr id="136" name="Text Placeholder 135">
-            <a:extLst>
-              <a:ext uri="{FF2B5EF4-FFF2-40B4-BE49-F238E27FC236}">
-                <a16:creationId xmlns:a16="http://schemas.microsoft.com/office/drawing/2014/main" id="{A2297428-B6BC-F5B5-C82D-3BC4408EC576}"/>
-              </a:ext>
-            </a:extLst>
-          </p:cNvPr>
-          <p:cNvSpPr>
-            <a:spLocks noGrp="1"/>
-          </p:cNvSpPr>
-          <p:nvPr>
-            <p:ph type="body" sz="quarter" idx="33"/>
-          </p:nvPr>
-        </p:nvSpPr>
-        <p:spPr/>
-        <p:txBody>
-          <a:bodyPr/>
-          <a:lstStyle/>
-          <a:p>
-            <a:r>
-              <a:rPr lang="en-US" dirty="0"/>
-              <a:t>Product Designer</a:t>
-            </a:r>
-          </a:p>
-        </p:txBody>
-      </p:sp>
-      <p:pic>
-        <p:nvPicPr>
-          <p:cNvPr id="19" name="Picture Placeholder 18" descr="Team member head shot&#10;">
-            <a:extLst>
-              <a:ext uri="{FF2B5EF4-FFF2-40B4-BE49-F238E27FC236}">
-                <a16:creationId xmlns:a16="http://schemas.microsoft.com/office/drawing/2014/main" id="{34C21939-A4DB-0F96-83D8-AD8FFB45359F}"/>
-              </a:ext>
-            </a:extLst>
-          </p:cNvPr>
-          <p:cNvPicPr>
-            <a:picLocks noGrp="1" noChangeAspect="1"/>
-          </p:cNvPicPr>
-          <p:nvPr>
-            <p:ph type="pic" sz="quarter" idx="23"/>
-          </p:nvPr>
-        </p:nvPicPr>
-        <p:blipFill rotWithShape="1">
-          <a:blip r:embed="rId8"/>
-          <a:srcRect l="99" r="99"/>
-          <a:stretch/>
-        </p:blipFill>
-        <p:spPr/>
-      </p:pic>
-      <p:sp>
-        <p:nvSpPr>
-          <p:cNvPr id="9" name="Text Placeholder 8">
-            <a:extLst>
-              <a:ext uri="{FF2B5EF4-FFF2-40B4-BE49-F238E27FC236}">
-                <a16:creationId xmlns:a16="http://schemas.microsoft.com/office/drawing/2014/main" id="{22A99FBE-9850-5F5D-04D9-E3A83DEEA928}"/>
-              </a:ext>
-            </a:extLst>
-          </p:cNvPr>
-          <p:cNvSpPr>
-            <a:spLocks noGrp="1"/>
-          </p:cNvSpPr>
-          <p:nvPr>
-            <p:ph type="body" sz="quarter" idx="18"/>
-          </p:nvPr>
-        </p:nvSpPr>
-        <p:spPr/>
-        <p:txBody>
-          <a:bodyPr/>
-          <a:lstStyle/>
-          <a:p>
-            <a:r>
-              <a:rPr lang="en-US" dirty="0"/>
-              <a:t>Rajesh Santoshi​</a:t>
-            </a:r>
-          </a:p>
-        </p:txBody>
-      </p:sp>
-      <p:sp>
-        <p:nvSpPr>
-          <p:cNvPr id="10" name="Text Placeholder 9">
-            <a:extLst>
-              <a:ext uri="{FF2B5EF4-FFF2-40B4-BE49-F238E27FC236}">
-                <a16:creationId xmlns:a16="http://schemas.microsoft.com/office/drawing/2014/main" id="{19AAB49A-6730-B2CF-9537-FF9551D4EB80}"/>
-              </a:ext>
-            </a:extLst>
-          </p:cNvPr>
-          <p:cNvSpPr>
-            <a:spLocks noGrp="1"/>
-          </p:cNvSpPr>
-          <p:nvPr>
-            <p:ph type="body" sz="quarter" idx="19"/>
-          </p:nvPr>
-        </p:nvSpPr>
-        <p:spPr/>
-        <p:txBody>
-          <a:bodyPr/>
-          <a:lstStyle/>
-          <a:p>
-            <a:r>
-              <a:rPr lang="en-US" dirty="0"/>
-              <a:t>VP Marketing</a:t>
-            </a:r>
-          </a:p>
-        </p:txBody>
-      </p:sp>
-      <p:pic>
-        <p:nvPicPr>
-          <p:cNvPr id="142" name="Picture Placeholder 141" descr="Team member head shot&#10;">
-            <a:extLst>
-              <a:ext uri="{FF2B5EF4-FFF2-40B4-BE49-F238E27FC236}">
-                <a16:creationId xmlns:a16="http://schemas.microsoft.com/office/drawing/2014/main" id="{E6A455C2-70F1-6DAE-26E6-C7AAE0CFA814}"/>
-              </a:ext>
-            </a:extLst>
-          </p:cNvPr>
-          <p:cNvPicPr>
-            <a:picLocks noGrp="1" noChangeAspect="1"/>
-          </p:cNvPicPr>
-          <p:nvPr>
-            <p:ph type="pic" sz="quarter" idx="27"/>
-          </p:nvPr>
-        </p:nvPicPr>
-        <p:blipFill rotWithShape="1">
-          <a:blip r:embed="rId9"/>
-          <a:srcRect l="291" r="291"/>
-          <a:stretch/>
-        </p:blipFill>
-        <p:spPr/>
-      </p:pic>
-      <p:sp>
-        <p:nvSpPr>
-          <p:cNvPr id="137" name="Text Placeholder 136">
-            <a:extLst>
-              <a:ext uri="{FF2B5EF4-FFF2-40B4-BE49-F238E27FC236}">
-                <a16:creationId xmlns:a16="http://schemas.microsoft.com/office/drawing/2014/main" id="{651B92A3-1DB6-8A7F-09B7-C7969D53FB3A}"/>
-              </a:ext>
-            </a:extLst>
-          </p:cNvPr>
-          <p:cNvSpPr>
-            <a:spLocks noGrp="1"/>
-          </p:cNvSpPr>
-          <p:nvPr>
-            <p:ph type="body" sz="quarter" idx="34"/>
-          </p:nvPr>
-        </p:nvSpPr>
-        <p:spPr/>
-        <p:txBody>
-          <a:bodyPr/>
-          <a:lstStyle/>
-          <a:p>
-            <a:r>
-              <a:rPr lang="en-US" dirty="0"/>
-              <a:t>Robin Kline</a:t>
-            </a:r>
-          </a:p>
-        </p:txBody>
-      </p:sp>
-      <p:sp>
-        <p:nvSpPr>
-          <p:cNvPr id="138" name="Text Placeholder 137">
-            <a:extLst>
-              <a:ext uri="{FF2B5EF4-FFF2-40B4-BE49-F238E27FC236}">
-                <a16:creationId xmlns:a16="http://schemas.microsoft.com/office/drawing/2014/main" id="{462B07C6-5B4D-AB97-3376-C4F8BFC2C143}"/>
-              </a:ext>
-            </a:extLst>
-          </p:cNvPr>
-          <p:cNvSpPr>
-            <a:spLocks noGrp="1"/>
-          </p:cNvSpPr>
-          <p:nvPr>
-            <p:ph type="body" sz="quarter" idx="35"/>
-          </p:nvPr>
-        </p:nvSpPr>
-        <p:spPr/>
-        <p:txBody>
-          <a:bodyPr/>
-          <a:lstStyle/>
-          <a:p>
-            <a:r>
-              <a:rPr lang="en-US" dirty="0"/>
-              <a:t>Content Developer</a:t>
-            </a:r>
-          </a:p>
-        </p:txBody>
-      </p:sp>
-      <p:sp>
-        <p:nvSpPr>
-          <p:cNvPr id="2" name="Footer Placeholder 1">
-            <a:extLst>
-              <a:ext uri="{FF2B5EF4-FFF2-40B4-BE49-F238E27FC236}">
-                <a16:creationId xmlns:a16="http://schemas.microsoft.com/office/drawing/2014/main" id="{E0C0AB0C-E0B6-7838-D865-2AB638122FD9}"/>
-              </a:ext>
-            </a:extLst>
-          </p:cNvPr>
-          <p:cNvSpPr>
-            <a:spLocks noGrp="1"/>
-          </p:cNvSpPr>
-          <p:nvPr>
-            <p:ph type="ftr" sz="quarter" idx="10"/>
-          </p:nvPr>
-        </p:nvSpPr>
-        <p:spPr/>
-        <p:txBody>
-          <a:bodyPr/>
-          <a:lstStyle/>
-          <a:p>
-            <a:r>
-              <a:rPr lang="en-US"/>
-              <a:t>Crypto: investing &amp; trading</a:t>
-            </a:r>
-            <a:endParaRPr lang="en-US" dirty="0"/>
+            <a:pPr algn="ctr">
+              <a:spcBef>
+                <a:spcPts val="1000"/>
+              </a:spcBef>
+              <a:buClr>
+                <a:schemeClr val="accent6"/>
+              </a:buClr>
+            </a:pPr>
+            <a:r>
+              <a:rPr lang="en-US" dirty="0">
+                <a:solidFill>
+                  <a:schemeClr val="bg1"/>
+                </a:solidFill>
+                <a:cs typeface="Segoe UI" panose="020B0502040204020203" pitchFamily="34" charset="0"/>
+              </a:rPr>
+              <a:t>Very high inertia values</a:t>
+            </a:r>
+          </a:p>
+          <a:p>
+            <a:pPr algn="ctr">
+              <a:spcBef>
+                <a:spcPts val="1000"/>
+              </a:spcBef>
+              <a:buClr>
+                <a:schemeClr val="accent6"/>
+              </a:buClr>
+            </a:pPr>
+            <a:r>
+              <a:rPr lang="en-US" dirty="0">
+                <a:solidFill>
+                  <a:schemeClr val="bg1"/>
+                </a:solidFill>
+                <a:cs typeface="Segoe UI" panose="020B0502040204020203" pitchFamily="34" charset="0"/>
+              </a:rPr>
+              <a:t>No clear distinction between UP and DOWN</a:t>
+            </a:r>
+          </a:p>
+          <a:p>
+            <a:pPr algn="ctr">
+              <a:spcBef>
+                <a:spcPts val="1000"/>
+              </a:spcBef>
+              <a:buClr>
+                <a:schemeClr val="accent6"/>
+              </a:buClr>
+            </a:pPr>
+            <a:r>
+              <a:rPr lang="en-US" dirty="0">
+                <a:solidFill>
+                  <a:schemeClr val="bg1"/>
+                </a:solidFill>
+                <a:cs typeface="Segoe UI" panose="020B0502040204020203" pitchFamily="34" charset="0"/>
+              </a:rPr>
+              <a:t>Clusters did not correspond to labels</a:t>
+            </a:r>
           </a:p>
         </p:txBody>
       </p:sp>
     </p:spTree>
     <p:extLst>
       <p:ext uri="{BB962C8B-B14F-4D97-AF65-F5344CB8AC3E}">
-        <p14:creationId xmlns:p14="http://schemas.microsoft.com/office/powerpoint/2010/main" val="840605972"/>
+        <p14:creationId xmlns:p14="http://schemas.microsoft.com/office/powerpoint/2010/main" val="3714014106"/>
       </p:ext>
     </p:extLst>
   </p:cSld>
@@ -22645,7 +21125,13 @@
   <p:cSld>
     <p:spTree>
       <p:nvGrpSpPr>
-        <p:cNvPr id="1" name=""/>
+        <p:cNvPr id="1" name="">
+          <a:extLst>
+            <a:ext uri="{FF2B5EF4-FFF2-40B4-BE49-F238E27FC236}">
+              <a16:creationId xmlns:a16="http://schemas.microsoft.com/office/drawing/2014/main" id="{F48C085A-E47D-E018-CC84-5282463121B7}"/>
+            </a:ext>
+          </a:extLst>
+        </p:cNvPr>
         <p:cNvGrpSpPr/>
         <p:nvPr/>
       </p:nvGrpSpPr>
@@ -22659,50 +21145,10 @@
       </p:grpSpPr>
       <p:sp>
         <p:nvSpPr>
-          <p:cNvPr id="2" name="Title 1">
-            <a:extLst>
-              <a:ext uri="{FF2B5EF4-FFF2-40B4-BE49-F238E27FC236}">
-                <a16:creationId xmlns:a16="http://schemas.microsoft.com/office/drawing/2014/main" id="{48C5BC92-868A-26B2-CBC0-C9D94E65F1A4}"/>
-              </a:ext>
-            </a:extLst>
-          </p:cNvPr>
-          <p:cNvSpPr>
-            <a:spLocks noGrp="1"/>
-          </p:cNvSpPr>
-          <p:nvPr>
-            <p:ph type="ctrTitle"/>
-          </p:nvPr>
-        </p:nvSpPr>
-        <p:spPr/>
-        <p:txBody>
-          <a:bodyPr/>
-          <a:lstStyle/>
-          <a:p>
-            <a:r>
-              <a:rPr lang="en-US" sz="4000" b="1" spc="600" dirty="0" err="1">
-                <a:ln w="28575">
-                  <a:noFill/>
-                  <a:prstDash val="solid"/>
-                </a:ln>
-                <a:solidFill>
-                  <a:schemeClr val="bg1"/>
-                </a:solidFill>
-                <a:latin typeface="Tw Cen MT" panose="020B0602020104020603" pitchFamily="34" charset="77"/>
-                <a:ea typeface="Verdana" panose="020B0604030504040204" pitchFamily="34" charset="0"/>
-                <a:cs typeface="Verdana" panose="020B0604030504040204" pitchFamily="34" charset="0"/>
-              </a:rPr>
-              <a:t>ConClusion</a:t>
-            </a:r>
-            <a:endParaRPr lang="en-US" dirty="0"/>
-          </a:p>
-        </p:txBody>
-      </p:sp>
-      <p:sp>
-        <p:nvSpPr>
-          <p:cNvPr id="3" name="Subtitle 2">
-            <a:extLst>
-              <a:ext uri="{FF2B5EF4-FFF2-40B4-BE49-F238E27FC236}">
-                <a16:creationId xmlns:a16="http://schemas.microsoft.com/office/drawing/2014/main" id="{6F9C1627-7A56-025E-482D-E2AB014EDF92}"/>
+          <p:cNvPr id="5" name="Subtitle 4">
+            <a:extLst>
+              <a:ext uri="{FF2B5EF4-FFF2-40B4-BE49-F238E27FC236}">
+                <a16:creationId xmlns:a16="http://schemas.microsoft.com/office/drawing/2014/main" id="{BE7C37CF-2360-CA24-D2BD-30C48810496E}"/>
               </a:ext>
             </a:extLst>
           </p:cNvPr>
@@ -22713,32 +21159,137 @@
             <p:ph type="subTitle" idx="1"/>
           </p:nvPr>
         </p:nvSpPr>
-        <p:spPr/>
-        <p:txBody>
-          <a:bodyPr/>
+        <p:spPr>
+          <a:xfrm>
+            <a:off x="1464366" y="1938462"/>
+            <a:ext cx="9163878" cy="5071011"/>
+          </a:xfrm>
+        </p:spPr>
+        <p:txBody>
+          <a:bodyPr anchor="ctr"/>
           <a:lstStyle/>
           <a:p>
-            <a:r>
-              <a:rPr lang="en-US" sz="1800" dirty="0">
+            <a:pPr marL="342900" indent="-342900" algn="l">
+              <a:lnSpc>
+                <a:spcPct val="150000"/>
+              </a:lnSpc>
+              <a:buFont typeface="Arial" panose="020B0604020202020204" pitchFamily="34" charset="0"/>
+              <a:buChar char="•"/>
+            </a:pPr>
+            <a:r>
+              <a:rPr lang="en-US" dirty="0"/>
+              <a:t>All models tested seemed to struggle with predicting the output for this dataset accurately.</a:t>
+            </a:r>
+          </a:p>
+          <a:p>
+            <a:pPr marL="342900" indent="-342900" algn="l">
+              <a:lnSpc>
+                <a:spcPct val="150000"/>
+              </a:lnSpc>
+              <a:buFont typeface="Arial" panose="020B0604020202020204" pitchFamily="34" charset="0"/>
+              <a:buChar char="•"/>
+            </a:pPr>
+            <a:r>
+              <a:rPr lang="en-US" dirty="0"/>
+              <a:t>This strongly suggests that the limitation lies in the dataset’s signal, not in the models used.</a:t>
+            </a:r>
+          </a:p>
+          <a:p>
+            <a:pPr marL="342900" indent="-342900" algn="l">
+              <a:lnSpc>
+                <a:spcPct val="150000"/>
+              </a:lnSpc>
+              <a:buFont typeface="Arial" panose="020B0604020202020204" pitchFamily="34" charset="0"/>
+              <a:buChar char="•"/>
+            </a:pPr>
+            <a:r>
+              <a:rPr lang="en-US" dirty="0"/>
+              <a:t>Stock price direction prediction using historical technical indicators alone is an inherently difficult problem, hence the low accuracy in all models used.</a:t>
+            </a:r>
+          </a:p>
+          <a:p>
+            <a:pPr marL="342900" indent="-342900" algn="l">
+              <a:lnSpc>
+                <a:spcPct val="150000"/>
+              </a:lnSpc>
+              <a:buFont typeface="Arial" panose="020B0604020202020204" pitchFamily="34" charset="0"/>
+              <a:buChar char="•"/>
+            </a:pPr>
+            <a:r>
+              <a:rPr lang="en-US" dirty="0"/>
+              <a:t>This project demonstrates that more complex models do not guarantee better predictions when the underlying data lacks predictive structure.</a:t>
+            </a:r>
+          </a:p>
+          <a:p>
+            <a:pPr marL="342900" indent="-342900" algn="l">
+              <a:lnSpc>
+                <a:spcPct val="150000"/>
+              </a:lnSpc>
+              <a:buFont typeface="Arial" panose="020B0604020202020204" pitchFamily="34" charset="0"/>
+              <a:buChar char="•"/>
+            </a:pPr>
+            <a:endParaRPr lang="en-US" dirty="0"/>
+          </a:p>
+        </p:txBody>
+      </p:sp>
+      <p:sp>
+        <p:nvSpPr>
+          <p:cNvPr id="3" name="Title 68">
+            <a:extLst>
+              <a:ext uri="{FF2B5EF4-FFF2-40B4-BE49-F238E27FC236}">
+                <a16:creationId xmlns:a16="http://schemas.microsoft.com/office/drawing/2014/main" id="{1589C763-5D22-DEC7-5EE2-141C6F73D6A0}"/>
+              </a:ext>
+            </a:extLst>
+          </p:cNvPr>
+          <p:cNvSpPr txBox="1">
+            <a:spLocks/>
+          </p:cNvSpPr>
+          <p:nvPr/>
+        </p:nvSpPr>
+        <p:spPr>
+          <a:xfrm>
+            <a:off x="1656588" y="921622"/>
+            <a:ext cx="8878824" cy="1069848"/>
+          </a:xfrm>
+          <a:prstGeom prst="rect">
+            <a:avLst/>
+          </a:prstGeom>
+        </p:spPr>
+        <p:txBody>
+          <a:bodyPr vert="horz" lIns="91440" tIns="45720" rIns="91440" bIns="45720" rtlCol="0" anchor="b">
+            <a:noAutofit/>
+          </a:bodyPr>
+          <a:lstStyle>
+            <a:lvl1pPr algn="ctr" defTabSz="914400" rtl="0" eaLnBrk="1" latinLnBrk="0" hangingPunct="1">
+              <a:lnSpc>
+                <a:spcPct val="90000"/>
+              </a:lnSpc>
+              <a:spcBef>
+                <a:spcPct val="0"/>
+              </a:spcBef>
+              <a:buNone/>
+              <a:defRPr sz="4000" b="1" kern="1200" cap="all" spc="600" baseline="0">
                 <a:solidFill>
                   <a:schemeClr val="bg1"/>
                 </a:solidFill>
-                <a:latin typeface="Segoe UI Light" panose="020B0502040204020203" pitchFamily="34" charset="0"/>
-                <a:ea typeface="+mn-lt"/>
-                <a:cs typeface="Segoe UI Light" panose="020B0502040204020203" pitchFamily="34" charset="0"/>
-              </a:rPr>
-              <a:t>At Krypto Logics, we believe in giving 110%. By using our next-generation data architecture, we help investors virtually manage their portfolios. We thrive because of our market knowledge and great team. As our CEO says, "Efficiencies will come from proactively transforming how we do business."</a:t>
-            </a:r>
-          </a:p>
-          <a:p>
-            <a:endParaRPr lang="en-US" dirty="0"/>
+                <a:latin typeface="+mj-lt"/>
+                <a:ea typeface="+mj-ea"/>
+                <a:cs typeface="+mj-cs"/>
+              </a:defRPr>
+            </a:lvl1pPr>
+          </a:lstStyle>
+          <a:p>
+            <a:r>
+              <a:rPr lang="en-US" sz="4800" dirty="0"/>
+              <a:t>Final Conclusion</a:t>
+            </a:r>
           </a:p>
         </p:txBody>
       </p:sp>
     </p:spTree>
     <p:extLst>
       <p:ext uri="{BB962C8B-B14F-4D97-AF65-F5344CB8AC3E}">
-        <p14:creationId xmlns:p14="http://schemas.microsoft.com/office/powerpoint/2010/main" val="1958759625"/>
+        <p14:creationId xmlns:p14="http://schemas.microsoft.com/office/powerpoint/2010/main" val="4089353589"/>
       </p:ext>
     </p:extLst>
   </p:cSld>
@@ -22770,7 +21321,7 @@
           <p:cNvPr id="2" name="Title 1">
             <a:extLst>
               <a:ext uri="{FF2B5EF4-FFF2-40B4-BE49-F238E27FC236}">
-                <a16:creationId xmlns:a16="http://schemas.microsoft.com/office/drawing/2014/main" id="{2C9E1892-81E6-551C-7B5A-DEA68224520B}"/>
+                <a16:creationId xmlns:a16="http://schemas.microsoft.com/office/drawing/2014/main" id="{D249E45E-D6A7-9780-F652-BAF86DFBCC00}"/>
               </a:ext>
             </a:extLst>
           </p:cNvPr>
@@ -22787,18 +21338,169 @@
           <a:lstStyle/>
           <a:p>
             <a:r>
-              <a:rPr lang="en-US" sz="4800" b="1" spc="600" dirty="0">
-                <a:ln w="28575">
-                  <a:noFill/>
-                  <a:prstDash val="solid"/>
-                </a:ln>
-                <a:solidFill>
-                  <a:schemeClr val="bg1"/>
-                </a:solidFill>
-                <a:latin typeface="Tw Cen MT" panose="020B0602020104020603" pitchFamily="34" charset="77"/>
-              </a:rPr>
-              <a:t>THANK YOU</a:t>
-            </a:r>
+              <a:rPr lang="en-US" dirty="0"/>
+              <a:t>Key Takeaways</a:t>
+            </a:r>
+          </a:p>
+        </p:txBody>
+      </p:sp>
+      <p:sp>
+        <p:nvSpPr>
+          <p:cNvPr id="8" name="Slide Number Placeholder 7">
+            <a:extLst>
+              <a:ext uri="{FF2B5EF4-FFF2-40B4-BE49-F238E27FC236}">
+                <a16:creationId xmlns:a16="http://schemas.microsoft.com/office/drawing/2014/main" id="{85577A64-4E94-69E1-3180-1E014BD06B3C}"/>
+              </a:ext>
+            </a:extLst>
+          </p:cNvPr>
+          <p:cNvSpPr>
+            <a:spLocks noGrp="1"/>
+          </p:cNvSpPr>
+          <p:nvPr>
+            <p:ph type="sldNum" sz="quarter" idx="12"/>
+          </p:nvPr>
+        </p:nvSpPr>
+        <p:spPr/>
+        <p:txBody>
+          <a:bodyPr/>
+          <a:lstStyle/>
+          <a:p>
+            <a:fld id="{294A09A9-5501-47C1-A89A-A340965A2BE2}" type="slidenum">
+              <a:rPr lang="en-US" smtClean="0"/>
+              <a:t>19</a:t>
+            </a:fld>
+            <a:endParaRPr lang="en-US" dirty="0"/>
+          </a:p>
+        </p:txBody>
+      </p:sp>
+      <p:sp>
+        <p:nvSpPr>
+          <p:cNvPr id="3" name="Text Placeholder 2">
+            <a:extLst>
+              <a:ext uri="{FF2B5EF4-FFF2-40B4-BE49-F238E27FC236}">
+                <a16:creationId xmlns:a16="http://schemas.microsoft.com/office/drawing/2014/main" id="{C31605EE-24B6-95D8-DE5E-BEC2F03ECECA}"/>
+              </a:ext>
+            </a:extLst>
+          </p:cNvPr>
+          <p:cNvSpPr>
+            <a:spLocks noGrp="1"/>
+          </p:cNvSpPr>
+          <p:nvPr>
+            <p:ph type="body" idx="1"/>
+          </p:nvPr>
+        </p:nvSpPr>
+        <p:spPr/>
+        <p:txBody>
+          <a:bodyPr/>
+          <a:lstStyle/>
+          <a:p>
+            <a:r>
+              <a:rPr lang="en-US" dirty="0"/>
+              <a:t>Reality</a:t>
+            </a:r>
+          </a:p>
+        </p:txBody>
+      </p:sp>
+      <p:sp>
+        <p:nvSpPr>
+          <p:cNvPr id="4" name="Content Placeholder 3">
+            <a:extLst>
+              <a:ext uri="{FF2B5EF4-FFF2-40B4-BE49-F238E27FC236}">
+                <a16:creationId xmlns:a16="http://schemas.microsoft.com/office/drawing/2014/main" id="{BE22F651-7ABC-015D-B5C4-622708A64CB1}"/>
+              </a:ext>
+            </a:extLst>
+          </p:cNvPr>
+          <p:cNvSpPr>
+            <a:spLocks noGrp="1"/>
+          </p:cNvSpPr>
+          <p:nvPr>
+            <p:ph sz="half" idx="2"/>
+          </p:nvPr>
+        </p:nvSpPr>
+        <p:spPr/>
+        <p:txBody>
+          <a:bodyPr/>
+          <a:lstStyle/>
+          <a:p>
+            <a:pPr lvl="0"/>
+            <a:r>
+              <a:rPr lang="en-US" dirty="0"/>
+              <a:t>Machine learning has limits in financial prediction</a:t>
+            </a:r>
+          </a:p>
+          <a:p>
+            <a:r>
+              <a:rPr lang="en-US" dirty="0"/>
+              <a:t>Financial markets remain highly volatile and noisy</a:t>
+            </a:r>
+          </a:p>
+          <a:p>
+            <a:pPr lvl="0"/>
+            <a:endParaRPr lang="en-US" dirty="0"/>
+          </a:p>
+        </p:txBody>
+      </p:sp>
+      <p:sp>
+        <p:nvSpPr>
+          <p:cNvPr id="5" name="Text Placeholder 4">
+            <a:extLst>
+              <a:ext uri="{FF2B5EF4-FFF2-40B4-BE49-F238E27FC236}">
+                <a16:creationId xmlns:a16="http://schemas.microsoft.com/office/drawing/2014/main" id="{6A1E0F07-3291-4EE2-1286-04C97165BA68}"/>
+              </a:ext>
+            </a:extLst>
+          </p:cNvPr>
+          <p:cNvSpPr>
+            <a:spLocks noGrp="1"/>
+          </p:cNvSpPr>
+          <p:nvPr>
+            <p:ph type="body" sz="quarter" idx="3"/>
+          </p:nvPr>
+        </p:nvSpPr>
+        <p:spPr/>
+        <p:txBody>
+          <a:bodyPr/>
+          <a:lstStyle/>
+          <a:p>
+            <a:r>
+              <a:rPr lang="en-US" dirty="0"/>
+              <a:t>Lessons</a:t>
+            </a:r>
+          </a:p>
+        </p:txBody>
+      </p:sp>
+      <p:sp>
+        <p:nvSpPr>
+          <p:cNvPr id="6" name="Content Placeholder 5">
+            <a:extLst>
+              <a:ext uri="{FF2B5EF4-FFF2-40B4-BE49-F238E27FC236}">
+                <a16:creationId xmlns:a16="http://schemas.microsoft.com/office/drawing/2014/main" id="{3DF22CC9-1295-2B21-05A9-68A44E669B8F}"/>
+              </a:ext>
+            </a:extLst>
+          </p:cNvPr>
+          <p:cNvSpPr>
+            <a:spLocks noGrp="1"/>
+          </p:cNvSpPr>
+          <p:nvPr>
+            <p:ph sz="quarter" idx="4"/>
+          </p:nvPr>
+        </p:nvSpPr>
+        <p:spPr/>
+        <p:txBody>
+          <a:bodyPr/>
+          <a:lstStyle/>
+          <a:p>
+            <a:r>
+              <a:rPr lang="en-US" dirty="0"/>
+              <a:t>Feature engineering is necessary but not sufficient</a:t>
+            </a:r>
+          </a:p>
+          <a:p>
+            <a:r>
+              <a:rPr lang="en-US" dirty="0"/>
+              <a:t>Model evaluation must go beyond accuracy (balance)</a:t>
+            </a:r>
+          </a:p>
+          <a:p>
             <a:endParaRPr lang="en-US" dirty="0"/>
           </a:p>
         </p:txBody>
@@ -22806,7 +21508,7 @@
     </p:spTree>
     <p:extLst>
       <p:ext uri="{BB962C8B-B14F-4D97-AF65-F5344CB8AC3E}">
-        <p14:creationId xmlns:p14="http://schemas.microsoft.com/office/powerpoint/2010/main" val="1877701230"/>
+        <p14:creationId xmlns:p14="http://schemas.microsoft.com/office/powerpoint/2010/main" val="765210901"/>
       </p:ext>
     </p:extLst>
   </p:cSld>
@@ -23057,6 +21759,74 @@
     <p:extLst>
       <p:ext uri="{BB962C8B-B14F-4D97-AF65-F5344CB8AC3E}">
         <p14:creationId xmlns:p14="http://schemas.microsoft.com/office/powerpoint/2010/main" val="3548027083"/>
+      </p:ext>
+    </p:extLst>
+  </p:cSld>
+  <p:clrMapOvr>
+    <a:masterClrMapping/>
+  </p:clrMapOvr>
+</p:sld>
+</file>
+
+<file path=ppt/slides/slide20.xml><?xml version="1.0" encoding="utf-8"?>
+<p:sld xmlns:a="http://schemas.openxmlformats.org/drawingml/2006/main" xmlns:r="http://schemas.openxmlformats.org/officeDocument/2006/relationships" xmlns:p="http://schemas.openxmlformats.org/presentationml/2006/main">
+  <p:cSld>
+    <p:spTree>
+      <p:nvGrpSpPr>
+        <p:cNvPr id="1" name=""/>
+        <p:cNvGrpSpPr/>
+        <p:nvPr/>
+      </p:nvGrpSpPr>
+      <p:grpSpPr>
+        <a:xfrm>
+          <a:off x="0" y="0"/>
+          <a:ext cx="0" cy="0"/>
+          <a:chOff x="0" y="0"/>
+          <a:chExt cx="0" cy="0"/>
+        </a:xfrm>
+      </p:grpSpPr>
+      <p:sp>
+        <p:nvSpPr>
+          <p:cNvPr id="2" name="Title 1">
+            <a:extLst>
+              <a:ext uri="{FF2B5EF4-FFF2-40B4-BE49-F238E27FC236}">
+                <a16:creationId xmlns:a16="http://schemas.microsoft.com/office/drawing/2014/main" id="{2C9E1892-81E6-551C-7B5A-DEA68224520B}"/>
+              </a:ext>
+            </a:extLst>
+          </p:cNvPr>
+          <p:cNvSpPr>
+            <a:spLocks noGrp="1"/>
+          </p:cNvSpPr>
+          <p:nvPr>
+            <p:ph type="title"/>
+          </p:nvPr>
+        </p:nvSpPr>
+        <p:spPr/>
+        <p:txBody>
+          <a:bodyPr/>
+          <a:lstStyle/>
+          <a:p>
+            <a:r>
+              <a:rPr lang="en-US" sz="4800" b="1" spc="600" dirty="0">
+                <a:ln w="28575">
+                  <a:noFill/>
+                  <a:prstDash val="solid"/>
+                </a:ln>
+                <a:solidFill>
+                  <a:schemeClr val="bg1"/>
+                </a:solidFill>
+                <a:latin typeface="Tw Cen MT" panose="020B0602020104020603" pitchFamily="34" charset="77"/>
+              </a:rPr>
+              <a:t>THANK YOU</a:t>
+            </a:r>
+            <a:endParaRPr lang="en-US" dirty="0"/>
+          </a:p>
+        </p:txBody>
+      </p:sp>
+    </p:spTree>
+    <p:extLst>
+      <p:ext uri="{BB962C8B-B14F-4D97-AF65-F5344CB8AC3E}">
+        <p14:creationId xmlns:p14="http://schemas.microsoft.com/office/powerpoint/2010/main" val="1877701230"/>
       </p:ext>
     </p:extLst>
   </p:cSld>

</xml_diff>

<commit_message>
Report and Presentation v1.4
</commit_message>
<xml_diff>
--- a/CSCI441 Project Presentation.pptx
+++ b/CSCI441 Project Presentation.pptx
@@ -17119,8 +17119,8 @@
         </p:nvSpPr>
         <p:spPr>
           <a:xfrm>
-            <a:off x="0" y="393856"/>
-            <a:ext cx="12192000" cy="1481328"/>
+            <a:off x="-1" y="393855"/>
+            <a:ext cx="12609443" cy="1958405"/>
           </a:xfrm>
         </p:spPr>
         <p:txBody>
@@ -17128,7 +17128,7 @@
           <a:lstStyle/>
           <a:p>
             <a:r>
-              <a:rPr lang="en-US" sz="5000" dirty="0"/>
+              <a:rPr lang="en-US" dirty="0"/>
               <a:t>CSCI44 Project Presentation</a:t>
             </a:r>
           </a:p>
@@ -17194,7 +17194,7 @@
         <p:spPr>
           <a:xfrm>
             <a:off x="0" y="2636230"/>
-            <a:ext cx="12192000" cy="1323439"/>
+            <a:ext cx="12192000" cy="1200329"/>
           </a:xfrm>
           <a:prstGeom prst="rect">
             <a:avLst/>
@@ -17209,7 +17209,7 @@
           <a:p>
             <a:pPr algn="ctr"/>
             <a:r>
-              <a:rPr lang="en-US" sz="4000" b="1" cap="all" spc="600" dirty="0">
+              <a:rPr lang="en-US" sz="3600" b="1" cap="all" spc="600" dirty="0">
                 <a:solidFill>
                   <a:schemeClr val="bg1"/>
                 </a:solidFill>
@@ -17223,7 +17223,7 @@
           <a:p>
             <a:pPr algn="ctr"/>
             <a:r>
-              <a:rPr lang="en-US" sz="4000" b="1" cap="all" spc="600" dirty="0">
+              <a:rPr lang="en-US" sz="3600" b="1" cap="all" spc="600" dirty="0">
                 <a:solidFill>
                   <a:schemeClr val="bg1"/>
                 </a:solidFill>
@@ -19724,7 +19724,7 @@
           <a:p>
             <a:r>
               <a:rPr lang="en-US" dirty="0"/>
-              <a:t>Despite being stronger than single trees, Random Forests were still unreliable for this task."</a:t>
+              <a:t>Despite being stronger than single trees, Random Forests were still unreliable for this task.</a:t>
             </a:r>
           </a:p>
           <a:p>
@@ -20138,20 +20138,34 @@
         </p:nvSpPr>
         <p:spPr>
           <a:xfrm>
-            <a:off x="1749287" y="2154009"/>
-            <a:ext cx="8693425" cy="1821644"/>
+            <a:off x="1749287" y="2154008"/>
+            <a:ext cx="8693425" cy="2881818"/>
           </a:xfrm>
         </p:spPr>
         <p:txBody>
           <a:bodyPr/>
           <a:lstStyle/>
           <a:p>
+            <a:pPr marL="342900" indent="-342900" algn="l">
+              <a:lnSpc>
+                <a:spcPct val="150000"/>
+              </a:lnSpc>
+              <a:buFont typeface="Arial" panose="020B0604020202020204" pitchFamily="34" charset="0"/>
+              <a:buChar char="•"/>
+            </a:pPr>
             <a:r>
               <a:rPr lang="en-US" dirty="0"/>
               <a:t>To determine whether the data naturally clusters into meaningful groups that resemble UP/DOWN behavior, we used the unsupervised clustering model K-Means</a:t>
             </a:r>
           </a:p>
           <a:p>
+            <a:pPr marL="342900" indent="-342900" algn="l">
+              <a:lnSpc>
+                <a:spcPct val="150000"/>
+              </a:lnSpc>
+              <a:buFont typeface="Arial" panose="020B0604020202020204" pitchFamily="34" charset="0"/>
+              <a:buChar char="•"/>
+            </a:pPr>
             <a:r>
               <a:rPr lang="en-US" dirty="0"/>
               <a:t>This model required scaling and reduction</a:t>
@@ -20799,8 +20813,8 @@
         </p:blipFill>
         <p:spPr>
           <a:xfrm>
-            <a:off x="5508658" y="2244786"/>
-            <a:ext cx="5717500" cy="4096380"/>
+            <a:off x="4881305" y="2155995"/>
+            <a:ext cx="6511065" cy="4297813"/>
           </a:xfrm>
           <a:prstGeom prst="rect">
             <a:avLst/>
@@ -20825,7 +20839,7 @@
         </p:nvSpPr>
         <p:spPr>
           <a:xfrm>
-            <a:off x="880207" y="2562838"/>
+            <a:off x="1019355" y="2663553"/>
             <a:ext cx="3174957" cy="3282696"/>
           </a:xfrm>
         </p:spPr>
@@ -21156,13 +21170,13 @@
             <a:spLocks noGrp="1"/>
           </p:cNvSpPr>
           <p:nvPr>
-            <p:ph type="subTitle" idx="1"/>
+            <p:ph idx="1"/>
           </p:nvPr>
         </p:nvSpPr>
         <p:spPr>
           <a:xfrm>
-            <a:off x="1464366" y="1938462"/>
-            <a:ext cx="9163878" cy="5071011"/>
+            <a:off x="707931" y="1464366"/>
+            <a:ext cx="6839183" cy="4717773"/>
           </a:xfrm>
         </p:spPr>
         <p:txBody>
@@ -21177,8 +21191,8 @@
               <a:buChar char="•"/>
             </a:pPr>
             <a:r>
-              <a:rPr lang="en-US" dirty="0"/>
-              <a:t>All models tested seemed to struggle with predicting the output for this dataset accurately.</a:t>
+              <a:rPr lang="en-US" sz="2000" dirty="0"/>
+              <a:t>All models tested seemed to struggle.</a:t>
             </a:r>
           </a:p>
           <a:p>
@@ -21190,8 +21204,8 @@
               <a:buChar char="•"/>
             </a:pPr>
             <a:r>
-              <a:rPr lang="en-US" dirty="0"/>
-              <a:t>This strongly suggests that the limitation lies in the dataset’s signal, not in the models used.</a:t>
+              <a:rPr lang="en-US" sz="2000" dirty="0"/>
+              <a:t>That proves that the limitation lies in the dataset’s signal, not in the models used.</a:t>
             </a:r>
           </a:p>
           <a:p>
@@ -21203,8 +21217,8 @@
               <a:buChar char="•"/>
             </a:pPr>
             <a:r>
-              <a:rPr lang="en-US" dirty="0"/>
-              <a:t>Stock price direction prediction using historical technical indicators alone is an inherently difficult problem, hence the low accuracy in all models used.</a:t>
+              <a:rPr lang="en-US" sz="2000" dirty="0"/>
+              <a:t>This problem is an inherently difficult one, hence the low accuracy in all models used.</a:t>
             </a:r>
           </a:p>
           <a:p>
@@ -21216,7 +21230,7 @@
               <a:buChar char="•"/>
             </a:pPr>
             <a:r>
-              <a:rPr lang="en-US" dirty="0"/>
+              <a:rPr lang="en-US" sz="2000" dirty="0"/>
               <a:t>This project demonstrates that more complex models do not guarantee better predictions when the underlying data lacks predictive structure.</a:t>
             </a:r>
           </a:p>
@@ -21228,7 +21242,7 @@
               <a:buFont typeface="Arial" panose="020B0604020202020204" pitchFamily="34" charset="0"/>
               <a:buChar char="•"/>
             </a:pPr>
-            <a:endParaRPr lang="en-US" dirty="0"/>
+            <a:endParaRPr lang="en-US" sz="2000" dirty="0"/>
           </a:p>
         </p:txBody>
       </p:sp>
@@ -21248,7 +21262,7 @@
         </p:nvSpPr>
         <p:spPr>
           <a:xfrm>
-            <a:off x="1656588" y="921622"/>
+            <a:off x="-424003" y="245165"/>
             <a:ext cx="8878824" cy="1069848"/>
           </a:xfrm>
           <a:prstGeom prst="rect">
@@ -24648,6 +24662,15 @@
 </file>
 
 <file path=customXml/item1.xml><?xml version="1.0" encoding="utf-8"?>
+<?mso-contentType ?>
+<FormTemplates xmlns="http://schemas.microsoft.com/sharepoint/v3/contenttype/forms">
+  <Display>DocumentLibraryForm</Display>
+  <Edit>DocumentLibraryForm</Edit>
+  <New>DocumentLibraryForm</New>
+</FormTemplates>
+</file>
+
+<file path=customXml/item2.xml><?xml version="1.0" encoding="utf-8"?>
 <ct:contentTypeSchema xmlns:ct="http://schemas.microsoft.com/office/2006/metadata/contentType" xmlns:ma="http://schemas.microsoft.com/office/2006/metadata/properties/metaAttributes" ct:_="" ma:_="" ma:contentTypeName="Document" ma:contentTypeID="0x01010079F111ED35F8CC479449609E8A0923A6" ma:contentTypeVersion="25" ma:contentTypeDescription="Create a new document." ma:contentTypeScope="" ma:versionID="e02306daf00165b375dc6a58966960be">
   <xsd:schema xmlns:xsd="http://www.w3.org/2001/XMLSchema" xmlns:xs="http://www.w3.org/2001/XMLSchema" xmlns:p="http://schemas.microsoft.com/office/2006/metadata/properties" xmlns:ns1="http://schemas.microsoft.com/sharepoint/v3" xmlns:ns2="71af3243-3dd4-4a8d-8c0d-dd76da1f02a5" xmlns:ns3="16c05727-aa75-4e4a-9b5f-8a80a1165891" xmlns:ns4="230e9df3-be65-4c73-a93b-d1236ebd677e" targetNamespace="http://schemas.microsoft.com/office/2006/metadata/properties" ma:root="true" ma:fieldsID="df88fb76bf5f555224557953949c1ec9" ns1:_="" ns2:_="" ns3:_="" ns4:_="">
     <xsd:import namespace="http://schemas.microsoft.com/sharepoint/v3"/>
@@ -24941,15 +24964,6 @@
 </ct:contentTypeSchema>
 </file>
 
-<file path=customXml/item2.xml><?xml version="1.0" encoding="utf-8"?>
-<?mso-contentType ?>
-<FormTemplates xmlns="http://schemas.microsoft.com/sharepoint/v3/contenttype/forms">
-  <Display>DocumentLibraryForm</Display>
-  <Edit>DocumentLibraryForm</Edit>
-  <New>DocumentLibraryForm</New>
-</FormTemplates>
-</file>
-
 <file path=customXml/item3.xml><?xml version="1.0" encoding="utf-8"?>
 <p:properties xmlns:p="http://schemas.microsoft.com/office/2006/metadata/properties" xmlns:xsi="http://www.w3.org/2001/XMLSchema-instance" xmlns:pc="http://schemas.microsoft.com/office/infopath/2007/PartnerControls">
   <documentManagement>
@@ -24971,6 +24985,14 @@
 </file>
 
 <file path=customXml/itemProps1.xml><?xml version="1.0" encoding="utf-8"?>
+<ds:datastoreItem xmlns:ds="http://schemas.openxmlformats.org/officeDocument/2006/customXml" ds:itemID="{4F1F1912-3146-44AF-A389-9E8B77BB3688}">
+  <ds:schemaRefs>
+    <ds:schemaRef ds:uri="http://schemas.microsoft.com/sharepoint/v3/contenttype/forms"/>
+  </ds:schemaRefs>
+</ds:datastoreItem>
+</file>
+
+<file path=customXml/itemProps2.xml><?xml version="1.0" encoding="utf-8"?>
 <ds:datastoreItem xmlns:ds="http://schemas.openxmlformats.org/officeDocument/2006/customXml" ds:itemID="{176493A3-2B83-4E58-86AD-56A2F2A20F12}">
   <ds:schemaRefs>
     <ds:schemaRef ds:uri="http://schemas.microsoft.com/office/2006/metadata/contentType"/>
@@ -24991,14 +25013,6 @@
 </ds:datastoreItem>
 </file>
 
-<file path=customXml/itemProps2.xml><?xml version="1.0" encoding="utf-8"?>
-<ds:datastoreItem xmlns:ds="http://schemas.openxmlformats.org/officeDocument/2006/customXml" ds:itemID="{4F1F1912-3146-44AF-A389-9E8B77BB3688}">
-  <ds:schemaRefs>
-    <ds:schemaRef ds:uri="http://schemas.microsoft.com/sharepoint/v3/contenttype/forms"/>
-  </ds:schemaRefs>
-</ds:datastoreItem>
-</file>
-
 <file path=customXml/itemProps3.xml><?xml version="1.0" encoding="utf-8"?>
 <ds:datastoreItem xmlns:ds="http://schemas.openxmlformats.org/officeDocument/2006/customXml" ds:itemID="{F8B8ECF1-2A9D-464C-AFE8-2B3295D0BF97}">
   <ds:schemaRefs>

</xml_diff>